<commit_message>
Storage Component class diagram updated
</commit_message>
<xml_diff>
--- a/docs/diagrams/StorageComponentClassDiagram.pptx
+++ b/docs/diagrams/StorageComponentClassDiagram.pptx
@@ -208,7 +208,7 @@
           <a:p>
             <a:fld id="{F5CC4B3F-88C1-4FFA-B1B6-F41C21DC6924}" type="datetimeFigureOut">
               <a:rPr lang="en-US" smtClean="0"/>
-              <a:t>12/1/2018</a:t>
+              <a:t>2/27/2019</a:t>
             </a:fld>
             <a:endParaRPr lang="en-US"/>
           </a:p>
@@ -654,7 +654,7 @@
           <a:p>
             <a:fld id="{78C97017-6FC3-485B-9764-EAC9E56C1D49}" type="datetimeFigureOut">
               <a:rPr lang="en-US" smtClean="0"/>
-              <a:t>12/1/2018</a:t>
+              <a:t>2/27/2019</a:t>
             </a:fld>
             <a:endParaRPr lang="en-US"/>
           </a:p>
@@ -822,7 +822,7 @@
           <a:p>
             <a:fld id="{78C97017-6FC3-485B-9764-EAC9E56C1D49}" type="datetimeFigureOut">
               <a:rPr lang="en-US" smtClean="0"/>
-              <a:t>12/1/2018</a:t>
+              <a:t>2/27/2019</a:t>
             </a:fld>
             <a:endParaRPr lang="en-US"/>
           </a:p>
@@ -1000,7 +1000,7 @@
           <a:p>
             <a:fld id="{78C97017-6FC3-485B-9764-EAC9E56C1D49}" type="datetimeFigureOut">
               <a:rPr lang="en-US" smtClean="0"/>
-              <a:t>12/1/2018</a:t>
+              <a:t>2/27/2019</a:t>
             </a:fld>
             <a:endParaRPr lang="en-US"/>
           </a:p>
@@ -1168,7 +1168,7 @@
           <a:p>
             <a:fld id="{78C97017-6FC3-485B-9764-EAC9E56C1D49}" type="datetimeFigureOut">
               <a:rPr lang="en-US" smtClean="0"/>
-              <a:t>12/1/2018</a:t>
+              <a:t>2/27/2019</a:t>
             </a:fld>
             <a:endParaRPr lang="en-US"/>
           </a:p>
@@ -1413,7 +1413,7 @@
           <a:p>
             <a:fld id="{78C97017-6FC3-485B-9764-EAC9E56C1D49}" type="datetimeFigureOut">
               <a:rPr lang="en-US" smtClean="0"/>
-              <a:t>12/1/2018</a:t>
+              <a:t>2/27/2019</a:t>
             </a:fld>
             <a:endParaRPr lang="en-US"/>
           </a:p>
@@ -1698,7 +1698,7 @@
           <a:p>
             <a:fld id="{78C97017-6FC3-485B-9764-EAC9E56C1D49}" type="datetimeFigureOut">
               <a:rPr lang="en-US" smtClean="0"/>
-              <a:t>12/1/2018</a:t>
+              <a:t>2/27/2019</a:t>
             </a:fld>
             <a:endParaRPr lang="en-US"/>
           </a:p>
@@ -2117,7 +2117,7 @@
           <a:p>
             <a:fld id="{78C97017-6FC3-485B-9764-EAC9E56C1D49}" type="datetimeFigureOut">
               <a:rPr lang="en-US" smtClean="0"/>
-              <a:t>12/1/2018</a:t>
+              <a:t>2/27/2019</a:t>
             </a:fld>
             <a:endParaRPr lang="en-US"/>
           </a:p>
@@ -2234,7 +2234,7 @@
           <a:p>
             <a:fld id="{78C97017-6FC3-485B-9764-EAC9E56C1D49}" type="datetimeFigureOut">
               <a:rPr lang="en-US" smtClean="0"/>
-              <a:t>12/1/2018</a:t>
+              <a:t>2/27/2019</a:t>
             </a:fld>
             <a:endParaRPr lang="en-US"/>
           </a:p>
@@ -2329,7 +2329,7 @@
           <a:p>
             <a:fld id="{78C97017-6FC3-485B-9764-EAC9E56C1D49}" type="datetimeFigureOut">
               <a:rPr lang="en-US" smtClean="0"/>
-              <a:t>12/1/2018</a:t>
+              <a:t>2/27/2019</a:t>
             </a:fld>
             <a:endParaRPr lang="en-US"/>
           </a:p>
@@ -2604,7 +2604,7 @@
           <a:p>
             <a:fld id="{78C97017-6FC3-485B-9764-EAC9E56C1D49}" type="datetimeFigureOut">
               <a:rPr lang="en-US" smtClean="0"/>
-              <a:t>12/1/2018</a:t>
+              <a:t>2/27/2019</a:t>
             </a:fld>
             <a:endParaRPr lang="en-US"/>
           </a:p>
@@ -2856,7 +2856,7 @@
           <a:p>
             <a:fld id="{78C97017-6FC3-485B-9764-EAC9E56C1D49}" type="datetimeFigureOut">
               <a:rPr lang="en-US" smtClean="0"/>
-              <a:t>12/1/2018</a:t>
+              <a:t>2/27/2019</a:t>
             </a:fld>
             <a:endParaRPr lang="en-US"/>
           </a:p>
@@ -3067,7 +3067,7 @@
           <a:p>
             <a:fld id="{78C97017-6FC3-485B-9764-EAC9E56C1D49}" type="datetimeFigureOut">
               <a:rPr lang="en-US" smtClean="0"/>
-              <a:t>12/1/2018</a:t>
+              <a:t>2/27/2019</a:t>
             </a:fld>
             <a:endParaRPr lang="en-US"/>
           </a:p>
@@ -3450,8 +3450,8 @@
         </p:nvSpPr>
         <p:spPr>
           <a:xfrm>
-            <a:off x="1119865" y="2086382"/>
-            <a:ext cx="7871735" cy="1723618"/>
+            <a:off x="762000" y="413729"/>
+            <a:ext cx="8077200" cy="5078535"/>
           </a:xfrm>
           <a:prstGeom prst="roundRect">
             <a:avLst>
@@ -3507,1299 +3507,3106 @@
           </a:p>
         </p:txBody>
       </p:sp>
-      <p:sp>
-        <p:nvSpPr>
-          <p:cNvPr id="2" name="Rectangle 8"/>
-          <p:cNvSpPr/>
+      <p:grpSp>
+        <p:nvGrpSpPr>
+          <p:cNvPr id="143" name="Group 142">
+            <a:extLst>
+              <a:ext uri="{FF2B5EF4-FFF2-40B4-BE49-F238E27FC236}">
+                <a16:creationId xmlns:a16="http://schemas.microsoft.com/office/drawing/2014/main" id="{31E167F8-7DB8-4047-91E2-25C5E098867D}"/>
+              </a:ext>
+            </a:extLst>
+          </p:cNvPr>
+          <p:cNvGrpSpPr/>
           <p:nvPr/>
-        </p:nvSpPr>
-        <p:spPr>
+        </p:nvGrpSpPr>
+        <p:grpSpPr>
           <a:xfrm>
-            <a:off x="2877180" y="3158440"/>
-            <a:ext cx="1323049" cy="346760"/>
+            <a:off x="609600" y="859437"/>
+            <a:ext cx="8083687" cy="4224300"/>
+            <a:chOff x="910091" y="954440"/>
+            <a:chExt cx="8083687" cy="4224300"/>
           </a:xfrm>
-          <a:prstGeom prst="rect">
-            <a:avLst/>
-          </a:prstGeom>
-          <a:solidFill>
-            <a:schemeClr val="accent6">
-              <a:lumMod val="75000"/>
-            </a:schemeClr>
-          </a:solidFill>
-          <a:ln w="19050">
+        </p:grpSpPr>
+        <p:sp>
+          <p:nvSpPr>
+            <p:cNvPr id="2" name="Rectangle 8"/>
+            <p:cNvSpPr/>
+            <p:nvPr/>
+          </p:nvSpPr>
+          <p:spPr>
+            <a:xfrm>
+              <a:off x="2877183" y="2865165"/>
+              <a:ext cx="1323049" cy="346760"/>
+            </a:xfrm>
+            <a:prstGeom prst="rect">
+              <a:avLst/>
+            </a:prstGeom>
             <a:solidFill>
               <a:schemeClr val="accent6">
                 <a:lumMod val="75000"/>
               </a:schemeClr>
             </a:solidFill>
-          </a:ln>
-          <a:effectLst/>
-        </p:spPr>
-        <p:style>
-          <a:lnRef idx="1">
-            <a:schemeClr val="accent2"/>
-          </a:lnRef>
-          <a:fillRef idx="2">
-            <a:schemeClr val="accent2"/>
-          </a:fillRef>
-          <a:effectRef idx="1">
-            <a:schemeClr val="accent2"/>
-          </a:effectRef>
-          <a:fontRef idx="minor">
-            <a:schemeClr val="dk1"/>
-          </a:fontRef>
-        </p:style>
-        <p:txBody>
-          <a:bodyPr rtlCol="0" anchor="ctr"/>
-          <a:lstStyle/>
-          <a:p>
-            <a:pPr algn="ctr"/>
-            <a:r>
-              <a:rPr lang="en-US" sz="1050" dirty="0">
+            <a:ln w="19050">
+              <a:solidFill>
+                <a:schemeClr val="accent6">
+                  <a:lumMod val="75000"/>
+                </a:schemeClr>
+              </a:solidFill>
+            </a:ln>
+            <a:effectLst/>
+          </p:spPr>
+          <p:style>
+            <a:lnRef idx="1">
+              <a:schemeClr val="accent2"/>
+            </a:lnRef>
+            <a:fillRef idx="2">
+              <a:schemeClr val="accent2"/>
+            </a:fillRef>
+            <a:effectRef idx="1">
+              <a:schemeClr val="accent2"/>
+            </a:effectRef>
+            <a:fontRef idx="minor">
+              <a:schemeClr val="dk1"/>
+            </a:fontRef>
+          </p:style>
+          <p:txBody>
+            <a:bodyPr rtlCol="0" anchor="ctr"/>
+            <a:lstStyle/>
+            <a:p>
+              <a:pPr algn="ctr"/>
+              <a:r>
+                <a:rPr lang="en-US" sz="1050" dirty="0">
+                  <a:solidFill>
+                    <a:schemeClr val="bg1"/>
+                  </a:solidFill>
+                </a:rPr>
+                <a:t>&lt;&lt;interface&gt;&gt;</a:t>
+              </a:r>
+              <a:br>
+                <a:rPr lang="en-US" sz="1050" dirty="0">
+                  <a:solidFill>
+                    <a:schemeClr val="bg1"/>
+                  </a:solidFill>
+                </a:rPr>
+              </a:br>
+              <a:r>
+                <a:rPr lang="en-US" sz="1050" dirty="0" err="1">
+                  <a:solidFill>
+                    <a:schemeClr val="bg1"/>
+                  </a:solidFill>
+                </a:rPr>
+                <a:t>AddressBookStorage</a:t>
+              </a:r>
+              <a:endParaRPr lang="en-SG" sz="1050" dirty="0">
                 <a:solidFill>
                   <a:schemeClr val="bg1"/>
                 </a:solidFill>
-              </a:rPr>
-              <a:t>&lt;&lt;interface&gt;&gt;</a:t>
-            </a:r>
-            <a:br>
-              <a:rPr lang="en-US" sz="1050" dirty="0">
-                <a:solidFill>
-                  <a:schemeClr val="bg1"/>
-                </a:solidFill>
-              </a:rPr>
-            </a:br>
-            <a:r>
-              <a:rPr lang="en-US" sz="1050" dirty="0" err="1">
-                <a:solidFill>
-                  <a:schemeClr val="bg1"/>
-                </a:solidFill>
-              </a:rPr>
-              <a:t>AddressBookStorage</a:t>
-            </a:r>
-            <a:endParaRPr lang="en-SG" sz="1050" dirty="0">
-              <a:solidFill>
-                <a:schemeClr val="bg1"/>
-              </a:solidFill>
-            </a:endParaRPr>
-          </a:p>
-        </p:txBody>
-      </p:sp>
-      <p:sp>
-        <p:nvSpPr>
-          <p:cNvPr id="9" name="Rectangle 62"/>
-          <p:cNvSpPr/>
-          <p:nvPr/>
-        </p:nvSpPr>
-        <p:spPr>
-          <a:xfrm rot="16200000">
-            <a:off x="1683963" y="2868687"/>
-            <a:ext cx="1093635" cy="346760"/>
-          </a:xfrm>
-          <a:prstGeom prst="rect">
-            <a:avLst/>
-          </a:prstGeom>
-          <a:solidFill>
-            <a:schemeClr val="accent6">
-              <a:lumMod val="75000"/>
-            </a:schemeClr>
-          </a:solidFill>
-          <a:ln w="19050">
+              </a:endParaRPr>
+            </a:p>
+          </p:txBody>
+        </p:sp>
+        <p:sp>
+          <p:nvSpPr>
+            <p:cNvPr id="9" name="Rectangle 62"/>
+            <p:cNvSpPr/>
+            <p:nvPr/>
+          </p:nvSpPr>
+          <p:spPr>
+            <a:xfrm rot="16200000">
+              <a:off x="249588" y="2874621"/>
+              <a:ext cx="3962392" cy="346760"/>
+            </a:xfrm>
+            <a:prstGeom prst="rect">
+              <a:avLst/>
+            </a:prstGeom>
             <a:solidFill>
               <a:schemeClr val="accent6">
                 <a:lumMod val="75000"/>
               </a:schemeClr>
             </a:solidFill>
-          </a:ln>
-          <a:effectLst/>
-        </p:spPr>
-        <p:style>
-          <a:lnRef idx="1">
-            <a:schemeClr val="accent2"/>
-          </a:lnRef>
-          <a:fillRef idx="2">
-            <a:schemeClr val="accent2"/>
-          </a:fillRef>
-          <a:effectRef idx="1">
-            <a:schemeClr val="accent2"/>
-          </a:effectRef>
-          <a:fontRef idx="minor">
-            <a:schemeClr val="dk1"/>
-          </a:fontRef>
-        </p:style>
-        <p:txBody>
-          <a:bodyPr rtlCol="0" anchor="ctr"/>
-          <a:lstStyle/>
-          <a:p>
-            <a:pPr algn="ctr"/>
-            <a:r>
-              <a:rPr lang="en-US" sz="1050" dirty="0" err="1">
+            <a:ln w="19050">
+              <a:solidFill>
+                <a:schemeClr val="accent6">
+                  <a:lumMod val="75000"/>
+                </a:schemeClr>
+              </a:solidFill>
+            </a:ln>
+            <a:effectLst/>
+          </p:spPr>
+          <p:style>
+            <a:lnRef idx="1">
+              <a:schemeClr val="accent2"/>
+            </a:lnRef>
+            <a:fillRef idx="2">
+              <a:schemeClr val="accent2"/>
+            </a:fillRef>
+            <a:effectRef idx="1">
+              <a:schemeClr val="accent2"/>
+            </a:effectRef>
+            <a:fontRef idx="minor">
+              <a:schemeClr val="dk1"/>
+            </a:fontRef>
+          </p:style>
+          <p:txBody>
+            <a:bodyPr rtlCol="0" anchor="ctr"/>
+            <a:lstStyle/>
+            <a:p>
+              <a:pPr algn="ctr"/>
+              <a:r>
+                <a:rPr lang="en-US" sz="1050" dirty="0" err="1">
+                  <a:solidFill>
+                    <a:schemeClr val="bg1"/>
+                  </a:solidFill>
+                </a:rPr>
+                <a:t>StorageManager</a:t>
+              </a:r>
+              <a:endParaRPr lang="en-SG" sz="1050" dirty="0">
                 <a:solidFill>
                   <a:schemeClr val="bg1"/>
                 </a:solidFill>
-              </a:rPr>
-              <a:t>StorageManager</a:t>
-            </a:r>
-            <a:endParaRPr lang="en-SG" sz="1050" dirty="0">
-              <a:solidFill>
-                <a:schemeClr val="bg1"/>
-              </a:solidFill>
-            </a:endParaRPr>
-          </a:p>
-        </p:txBody>
-      </p:sp>
-      <p:sp>
-        <p:nvSpPr>
-          <p:cNvPr id="119" name="Rectangle 62"/>
-          <p:cNvSpPr/>
-          <p:nvPr/>
-        </p:nvSpPr>
-        <p:spPr>
-          <a:xfrm rot="16200000">
-            <a:off x="956202" y="2861202"/>
-            <a:ext cx="1093635" cy="346760"/>
-          </a:xfrm>
-          <a:prstGeom prst="rect">
-            <a:avLst/>
-          </a:prstGeom>
-          <a:solidFill>
-            <a:schemeClr val="accent6">
-              <a:lumMod val="75000"/>
-            </a:schemeClr>
-          </a:solidFill>
-          <a:ln w="19050">
+              </a:endParaRPr>
+            </a:p>
+          </p:txBody>
+        </p:sp>
+        <p:sp>
+          <p:nvSpPr>
+            <p:cNvPr id="119" name="Rectangle 62"/>
+            <p:cNvSpPr/>
+            <p:nvPr/>
+          </p:nvSpPr>
+          <p:spPr>
+            <a:xfrm rot="16200000">
+              <a:off x="-609125" y="2893210"/>
+              <a:ext cx="4224300" cy="346760"/>
+            </a:xfrm>
+            <a:prstGeom prst="rect">
+              <a:avLst/>
+            </a:prstGeom>
             <a:solidFill>
               <a:schemeClr val="accent6">
                 <a:lumMod val="75000"/>
               </a:schemeClr>
             </a:solidFill>
-          </a:ln>
-          <a:effectLst/>
-        </p:spPr>
-        <p:style>
-          <a:lnRef idx="1">
-            <a:schemeClr val="accent2"/>
-          </a:lnRef>
-          <a:fillRef idx="2">
-            <a:schemeClr val="accent2"/>
-          </a:fillRef>
-          <a:effectRef idx="1">
-            <a:schemeClr val="accent2"/>
-          </a:effectRef>
-          <a:fontRef idx="minor">
-            <a:schemeClr val="dk1"/>
-          </a:fontRef>
-        </p:style>
-        <p:txBody>
-          <a:bodyPr rtlCol="0" anchor="ctr"/>
-          <a:lstStyle/>
-          <a:p>
-            <a:pPr algn="ctr"/>
-            <a:r>
-              <a:rPr lang="en-US" sz="1050" dirty="0">
+            <a:ln w="19050">
+              <a:solidFill>
+                <a:schemeClr val="accent6">
+                  <a:lumMod val="75000"/>
+                </a:schemeClr>
+              </a:solidFill>
+            </a:ln>
+            <a:effectLst/>
+          </p:spPr>
+          <p:style>
+            <a:lnRef idx="1">
+              <a:schemeClr val="accent2"/>
+            </a:lnRef>
+            <a:fillRef idx="2">
+              <a:schemeClr val="accent2"/>
+            </a:fillRef>
+            <a:effectRef idx="1">
+              <a:schemeClr val="accent2"/>
+            </a:effectRef>
+            <a:fontRef idx="minor">
+              <a:schemeClr val="dk1"/>
+            </a:fontRef>
+          </p:style>
+          <p:txBody>
+            <a:bodyPr rtlCol="0" anchor="ctr"/>
+            <a:lstStyle/>
+            <a:p>
+              <a:pPr algn="ctr"/>
+              <a:r>
+                <a:rPr lang="en-US" sz="1050" dirty="0">
+                  <a:solidFill>
+                    <a:schemeClr val="bg1"/>
+                  </a:solidFill>
+                </a:rPr>
+                <a:t>&lt;&lt;interface&gt;&gt;</a:t>
+              </a:r>
+            </a:p>
+            <a:p>
+              <a:pPr algn="ctr"/>
+              <a:r>
+                <a:rPr lang="en-US" sz="1050" dirty="0">
+                  <a:solidFill>
+                    <a:schemeClr val="bg1"/>
+                  </a:solidFill>
+                </a:rPr>
+                <a:t>Storage</a:t>
+              </a:r>
+              <a:endParaRPr lang="en-SG" sz="1050" dirty="0">
                 <a:solidFill>
                   <a:schemeClr val="bg1"/>
                 </a:solidFill>
-              </a:rPr>
-              <a:t>&lt;&lt;interface&gt;&gt;</a:t>
-            </a:r>
-          </a:p>
-          <a:p>
-            <a:pPr algn="ctr"/>
-            <a:r>
-              <a:rPr lang="en-US" sz="1050" dirty="0">
-                <a:solidFill>
-                  <a:schemeClr val="bg1"/>
-                </a:solidFill>
-              </a:rPr>
-              <a:t>Storage</a:t>
-            </a:r>
-            <a:endParaRPr lang="en-SG" sz="1050" dirty="0">
-              <a:solidFill>
-                <a:schemeClr val="bg1"/>
-              </a:solidFill>
-            </a:endParaRPr>
-          </a:p>
-        </p:txBody>
-      </p:sp>
-      <p:sp>
-        <p:nvSpPr>
-          <p:cNvPr id="120" name="Isosceles Triangle 102"/>
-          <p:cNvSpPr/>
-          <p:nvPr/>
-        </p:nvSpPr>
-        <p:spPr>
-          <a:xfrm rot="16200000">
-            <a:off x="1626910" y="2952291"/>
-            <a:ext cx="270504" cy="175523"/>
-          </a:xfrm>
-          <a:prstGeom prst="triangle">
-            <a:avLst/>
-          </a:prstGeom>
-          <a:solidFill>
-            <a:schemeClr val="accent6">
-              <a:lumMod val="75000"/>
-            </a:schemeClr>
-          </a:solidFill>
-          <a:ln w="19050">
+              </a:endParaRPr>
+            </a:p>
+          </p:txBody>
+        </p:sp>
+        <p:sp>
+          <p:nvSpPr>
+            <p:cNvPr id="120" name="Isosceles Triangle 102"/>
+            <p:cNvSpPr/>
+            <p:nvPr/>
+          </p:nvSpPr>
+          <p:spPr>
+            <a:xfrm rot="16200000">
+              <a:off x="1626914" y="2952293"/>
+              <a:ext cx="270504" cy="175523"/>
+            </a:xfrm>
+            <a:prstGeom prst="triangle">
+              <a:avLst/>
+            </a:prstGeom>
             <a:solidFill>
               <a:schemeClr val="accent6">
                 <a:lumMod val="75000"/>
               </a:schemeClr>
             </a:solidFill>
-          </a:ln>
-          <a:effectLst/>
-        </p:spPr>
-        <p:style>
-          <a:lnRef idx="1">
-            <a:schemeClr val="accent2"/>
-          </a:lnRef>
-          <a:fillRef idx="2">
-            <a:schemeClr val="accent2"/>
-          </a:fillRef>
-          <a:effectRef idx="1">
-            <a:schemeClr val="accent2"/>
-          </a:effectRef>
-          <a:fontRef idx="minor">
-            <a:schemeClr val="dk1"/>
-          </a:fontRef>
-        </p:style>
-        <p:txBody>
-          <a:bodyPr rtlCol="0" anchor="ctr"/>
-          <a:lstStyle/>
-          <a:p>
-            <a:pPr algn="ctr"/>
-            <a:endParaRPr lang="en-SG" sz="1050">
+            <a:ln w="19050">
               <a:solidFill>
-                <a:schemeClr val="bg1"/>
+                <a:schemeClr val="accent6">
+                  <a:lumMod val="75000"/>
+                </a:schemeClr>
               </a:solidFill>
-            </a:endParaRPr>
-          </a:p>
-        </p:txBody>
-      </p:sp>
-      <p:cxnSp>
-        <p:nvCxnSpPr>
-          <p:cNvPr id="58" name="Straight Arrow Connector 57"/>
-          <p:cNvCxnSpPr>
-            <a:stCxn id="42" idx="3"/>
-            <a:endCxn id="2" idx="1"/>
-          </p:cNvCxnSpPr>
-          <p:nvPr/>
-        </p:nvCxnSpPr>
-        <p:spPr>
-          <a:xfrm>
-            <a:off x="2656370" y="3326536"/>
-            <a:ext cx="220810" cy="5284"/>
-          </a:xfrm>
-          <a:prstGeom prst="straightConnector1">
-            <a:avLst/>
-          </a:prstGeom>
-          <a:ln w="19050">
+            </a:ln>
+            <a:effectLst/>
+          </p:spPr>
+          <p:style>
+            <a:lnRef idx="1">
+              <a:schemeClr val="accent2"/>
+            </a:lnRef>
+            <a:fillRef idx="2">
+              <a:schemeClr val="accent2"/>
+            </a:fillRef>
+            <a:effectRef idx="1">
+              <a:schemeClr val="accent2"/>
+            </a:effectRef>
+            <a:fontRef idx="minor">
+              <a:schemeClr val="dk1"/>
+            </a:fontRef>
+          </p:style>
+          <p:txBody>
+            <a:bodyPr rtlCol="0" anchor="ctr"/>
+            <a:lstStyle/>
+            <a:p>
+              <a:pPr algn="ctr"/>
+              <a:endParaRPr lang="en-SG" sz="1050">
+                <a:solidFill>
+                  <a:schemeClr val="bg1"/>
+                </a:solidFill>
+              </a:endParaRPr>
+            </a:p>
+          </p:txBody>
+        </p:sp>
+        <p:cxnSp>
+          <p:nvCxnSpPr>
+            <p:cNvPr id="58" name="Straight Arrow Connector 57"/>
+            <p:cNvCxnSpPr>
+              <a:stCxn id="42" idx="3"/>
+              <a:endCxn id="2" idx="1"/>
+            </p:cNvCxnSpPr>
+            <p:nvPr/>
+          </p:nvCxnSpPr>
+          <p:spPr>
+            <a:xfrm>
+              <a:off x="2656373" y="3033261"/>
+              <a:ext cx="220810" cy="5284"/>
+            </a:xfrm>
+            <a:prstGeom prst="straightConnector1">
+              <a:avLst/>
+            </a:prstGeom>
+            <a:ln w="19050">
+              <a:solidFill>
+                <a:schemeClr val="accent6">
+                  <a:lumMod val="75000"/>
+                </a:schemeClr>
+              </a:solidFill>
+              <a:headEnd type="none" w="med" len="med"/>
+              <a:tailEnd type="arrow" w="med" len="med"/>
+            </a:ln>
+            <a:effectLst/>
+          </p:spPr>
+          <p:style>
+            <a:lnRef idx="1">
+              <a:schemeClr val="accent2"/>
+            </a:lnRef>
+            <a:fillRef idx="2">
+              <a:schemeClr val="accent2"/>
+            </a:fillRef>
+            <a:effectRef idx="1">
+              <a:schemeClr val="accent2"/>
+            </a:effectRef>
+            <a:fontRef idx="minor">
+              <a:schemeClr val="dk1"/>
+            </a:fontRef>
+          </p:style>
+        </p:cxnSp>
+        <p:cxnSp>
+          <p:nvCxnSpPr>
+            <p:cNvPr id="75" name="Elbow Connector 122"/>
+            <p:cNvCxnSpPr/>
+            <p:nvPr/>
+          </p:nvCxnSpPr>
+          <p:spPr>
+            <a:xfrm>
+              <a:off x="910091" y="3040053"/>
+              <a:ext cx="419548" cy="2860"/>
+            </a:xfrm>
+            <a:prstGeom prst="bentConnector3">
+              <a:avLst>
+                <a:gd name="adj1" fmla="val 50000"/>
+              </a:avLst>
+            </a:prstGeom>
+            <a:ln w="19050">
+              <a:solidFill>
+                <a:schemeClr val="bg1">
+                  <a:lumMod val="75000"/>
+                </a:schemeClr>
+              </a:solidFill>
+              <a:prstDash val="sysDot"/>
+              <a:headEnd type="none" w="med" len="med"/>
+              <a:tailEnd type="arrow" w="med" len="med"/>
+            </a:ln>
+            <a:effectLst/>
+          </p:spPr>
+          <p:style>
+            <a:lnRef idx="1">
+              <a:schemeClr val="accent2"/>
+            </a:lnRef>
+            <a:fillRef idx="2">
+              <a:schemeClr val="accent2"/>
+            </a:fillRef>
+            <a:effectRef idx="1">
+              <a:schemeClr val="accent2"/>
+            </a:effectRef>
+            <a:fontRef idx="minor">
+              <a:schemeClr val="dk1"/>
+            </a:fontRef>
+          </p:style>
+        </p:cxnSp>
+        <p:cxnSp>
+          <p:nvCxnSpPr>
+            <p:cNvPr id="21" name="Straight Connector 20"/>
+            <p:cNvCxnSpPr>
+              <a:stCxn id="120" idx="3"/>
+            </p:cNvCxnSpPr>
+            <p:nvPr/>
+          </p:nvCxnSpPr>
+          <p:spPr>
+            <a:xfrm flipV="1">
+              <a:off x="1849928" y="3040054"/>
+              <a:ext cx="216105" cy="1"/>
+            </a:xfrm>
+            <a:prstGeom prst="line">
+              <a:avLst/>
+            </a:prstGeom>
+            <a:ln w="19050">
+              <a:solidFill>
+                <a:schemeClr val="accent6">
+                  <a:lumMod val="75000"/>
+                </a:schemeClr>
+              </a:solidFill>
+              <a:prstDash val="sysDot"/>
+              <a:headEnd type="none" w="med" len="med"/>
+              <a:tailEnd type="none" w="med" len="med"/>
+            </a:ln>
+            <a:effectLst/>
+          </p:spPr>
+          <p:style>
+            <a:lnRef idx="1">
+              <a:schemeClr val="accent2"/>
+            </a:lnRef>
+            <a:fillRef idx="2">
+              <a:schemeClr val="accent2"/>
+            </a:fillRef>
+            <a:effectRef idx="1">
+              <a:schemeClr val="accent2"/>
+            </a:effectRef>
+            <a:fontRef idx="minor">
+              <a:schemeClr val="dk1"/>
+            </a:fontRef>
+          </p:style>
+        </p:cxnSp>
+        <p:sp>
+          <p:nvSpPr>
+            <p:cNvPr id="42" name="Flowchart: Decision 96"/>
+            <p:cNvSpPr/>
+            <p:nvPr/>
+          </p:nvSpPr>
+          <p:spPr>
+            <a:xfrm>
+              <a:off x="2420325" y="2946571"/>
+              <a:ext cx="236048" cy="173380"/>
+            </a:xfrm>
+            <a:prstGeom prst="flowChartDecision">
+              <a:avLst/>
+            </a:prstGeom>
+            <a:noFill/>
+            <a:ln w="19050">
+              <a:solidFill>
+                <a:schemeClr val="accent6">
+                  <a:lumMod val="75000"/>
+                </a:schemeClr>
+              </a:solidFill>
+            </a:ln>
+            <a:effectLst/>
+          </p:spPr>
+          <p:style>
+            <a:lnRef idx="1">
+              <a:schemeClr val="accent2"/>
+            </a:lnRef>
+            <a:fillRef idx="2">
+              <a:schemeClr val="accent2"/>
+            </a:fillRef>
+            <a:effectRef idx="1">
+              <a:schemeClr val="accent2"/>
+            </a:effectRef>
+            <a:fontRef idx="minor">
+              <a:schemeClr val="dk1"/>
+            </a:fontRef>
+          </p:style>
+          <p:txBody>
+            <a:bodyPr rtlCol="0" anchor="ctr"/>
+            <a:lstStyle/>
+            <a:p>
+              <a:pPr algn="ctr"/>
+              <a:endParaRPr lang="en-US" sz="1050">
+                <a:solidFill>
+                  <a:schemeClr val="bg1"/>
+                </a:solidFill>
+              </a:endParaRPr>
+            </a:p>
+          </p:txBody>
+        </p:sp>
+        <p:cxnSp>
+          <p:nvCxnSpPr>
+            <p:cNvPr id="97" name="Elbow Connector 63"/>
+            <p:cNvCxnSpPr>
+              <a:stCxn id="99" idx="3"/>
+              <a:endCxn id="50" idx="1"/>
+            </p:cNvCxnSpPr>
+            <p:nvPr/>
+          </p:nvCxnSpPr>
+          <p:spPr>
+            <a:xfrm flipV="1">
+              <a:off x="4398044" y="3038543"/>
+              <a:ext cx="223322" cy="3"/>
+            </a:xfrm>
+            <a:prstGeom prst="bentConnector3">
+              <a:avLst>
+                <a:gd name="adj1" fmla="val 50000"/>
+              </a:avLst>
+            </a:prstGeom>
+            <a:ln w="19050">
+              <a:solidFill>
+                <a:schemeClr val="accent6">
+                  <a:lumMod val="75000"/>
+                </a:schemeClr>
+              </a:solidFill>
+              <a:prstDash val="sysDot"/>
+              <a:headEnd type="none" w="med" len="med"/>
+              <a:tailEnd type="none" w="med" len="med"/>
+            </a:ln>
+            <a:effectLst/>
+          </p:spPr>
+          <p:style>
+            <a:lnRef idx="1">
+              <a:schemeClr val="accent2"/>
+            </a:lnRef>
+            <a:fillRef idx="2">
+              <a:schemeClr val="accent2"/>
+            </a:fillRef>
+            <a:effectRef idx="1">
+              <a:schemeClr val="accent2"/>
+            </a:effectRef>
+            <a:fontRef idx="minor">
+              <a:schemeClr val="dk1"/>
+            </a:fontRef>
+          </p:style>
+        </p:cxnSp>
+        <p:sp>
+          <p:nvSpPr>
+            <p:cNvPr id="99" name="Isosceles Triangle 102"/>
+            <p:cNvSpPr/>
+            <p:nvPr/>
+          </p:nvSpPr>
+          <p:spPr>
+            <a:xfrm rot="5400000" flipV="1">
+              <a:off x="4175030" y="2950784"/>
+              <a:ext cx="270504" cy="175523"/>
+            </a:xfrm>
+            <a:prstGeom prst="triangle">
+              <a:avLst/>
+            </a:prstGeom>
             <a:solidFill>
               <a:schemeClr val="accent6">
                 <a:lumMod val="75000"/>
               </a:schemeClr>
             </a:solidFill>
-            <a:headEnd type="none" w="med" len="med"/>
-            <a:tailEnd type="arrow" w="med" len="med"/>
-          </a:ln>
-          <a:effectLst/>
-        </p:spPr>
-        <p:style>
-          <a:lnRef idx="1">
-            <a:schemeClr val="accent2"/>
-          </a:lnRef>
-          <a:fillRef idx="2">
-            <a:schemeClr val="accent2"/>
-          </a:fillRef>
-          <a:effectRef idx="1">
-            <a:schemeClr val="accent2"/>
-          </a:effectRef>
-          <a:fontRef idx="minor">
-            <a:schemeClr val="dk1"/>
-          </a:fontRef>
-        </p:style>
-      </p:cxnSp>
-      <p:cxnSp>
-        <p:nvCxnSpPr>
-          <p:cNvPr id="75" name="Elbow Connector 122"/>
-          <p:cNvCxnSpPr/>
-          <p:nvPr/>
-        </p:nvCxnSpPr>
-        <p:spPr>
-          <a:xfrm>
-            <a:off x="910091" y="3040053"/>
-            <a:ext cx="419548" cy="2860"/>
-          </a:xfrm>
-          <a:prstGeom prst="bentConnector3">
-            <a:avLst>
-              <a:gd name="adj1" fmla="val 50000"/>
-            </a:avLst>
-          </a:prstGeom>
-          <a:ln w="19050">
-            <a:solidFill>
-              <a:schemeClr val="bg1">
-                <a:lumMod val="75000"/>
-              </a:schemeClr>
-            </a:solidFill>
-            <a:prstDash val="sysDot"/>
-            <a:headEnd type="none" w="med" len="med"/>
-            <a:tailEnd type="arrow" w="med" len="med"/>
-          </a:ln>
-          <a:effectLst/>
-        </p:spPr>
-        <p:style>
-          <a:lnRef idx="1">
-            <a:schemeClr val="accent2"/>
-          </a:lnRef>
-          <a:fillRef idx="2">
-            <a:schemeClr val="accent2"/>
-          </a:fillRef>
-          <a:effectRef idx="1">
-            <a:schemeClr val="accent2"/>
-          </a:effectRef>
-          <a:fontRef idx="minor">
-            <a:schemeClr val="dk1"/>
-          </a:fontRef>
-        </p:style>
-      </p:cxnSp>
-      <p:cxnSp>
-        <p:nvCxnSpPr>
-          <p:cNvPr id="21" name="Straight Connector 20"/>
-          <p:cNvCxnSpPr>
-            <a:stCxn id="120" idx="3"/>
-          </p:cNvCxnSpPr>
-          <p:nvPr/>
-        </p:nvCxnSpPr>
-        <p:spPr>
-          <a:xfrm flipV="1">
-            <a:off x="1849924" y="3040052"/>
-            <a:ext cx="216105" cy="1"/>
-          </a:xfrm>
-          <a:prstGeom prst="line">
-            <a:avLst/>
-          </a:prstGeom>
-          <a:ln w="19050">
+            <a:ln w="19050">
+              <a:solidFill>
+                <a:schemeClr val="accent6">
+                  <a:lumMod val="75000"/>
+                </a:schemeClr>
+              </a:solidFill>
+            </a:ln>
+            <a:effectLst/>
+          </p:spPr>
+          <p:style>
+            <a:lnRef idx="1">
+              <a:schemeClr val="accent2"/>
+            </a:lnRef>
+            <a:fillRef idx="2">
+              <a:schemeClr val="accent2"/>
+            </a:fillRef>
+            <a:effectRef idx="1">
+              <a:schemeClr val="accent2"/>
+            </a:effectRef>
+            <a:fontRef idx="minor">
+              <a:schemeClr val="dk1"/>
+            </a:fontRef>
+          </p:style>
+          <p:txBody>
+            <a:bodyPr rtlCol="0" anchor="ctr"/>
+            <a:lstStyle/>
+            <a:p>
+              <a:pPr algn="ctr"/>
+              <a:endParaRPr lang="en-SG" sz="1050">
+                <a:solidFill>
+                  <a:schemeClr val="bg1"/>
+                </a:solidFill>
+              </a:endParaRPr>
+            </a:p>
+          </p:txBody>
+        </p:sp>
+        <p:cxnSp>
+          <p:nvCxnSpPr>
+            <p:cNvPr id="124" name="Elbow Connector 122"/>
+            <p:cNvCxnSpPr>
+              <a:stCxn id="50" idx="3"/>
+              <a:endCxn id="66" idx="1"/>
+            </p:cNvCxnSpPr>
+            <p:nvPr/>
+          </p:nvCxnSpPr>
+          <p:spPr>
+            <a:xfrm>
+              <a:off x="5791201" y="3038543"/>
+              <a:ext cx="228600" cy="1970"/>
+            </a:xfrm>
+            <a:prstGeom prst="bentConnector3">
+              <a:avLst>
+                <a:gd name="adj1" fmla="val 50000"/>
+              </a:avLst>
+            </a:prstGeom>
+            <a:ln w="19050">
+              <a:solidFill>
+                <a:schemeClr val="accent6">
+                  <a:lumMod val="75000"/>
+                </a:schemeClr>
+              </a:solidFill>
+              <a:prstDash val="sysDot"/>
+              <a:headEnd type="none" w="med" len="med"/>
+              <a:tailEnd type="arrow" w="med" len="med"/>
+            </a:ln>
+            <a:effectLst/>
+          </p:spPr>
+          <p:style>
+            <a:lnRef idx="1">
+              <a:schemeClr val="accent2"/>
+            </a:lnRef>
+            <a:fillRef idx="2">
+              <a:schemeClr val="accent2"/>
+            </a:fillRef>
+            <a:effectRef idx="1">
+              <a:schemeClr val="accent2"/>
+            </a:effectRef>
+            <a:fontRef idx="minor">
+              <a:schemeClr val="dk1"/>
+            </a:fontRef>
+          </p:style>
+        </p:cxnSp>
+        <p:sp>
+          <p:nvSpPr>
+            <p:cNvPr id="50" name="Rectangle 8"/>
+            <p:cNvSpPr/>
+            <p:nvPr/>
+          </p:nvSpPr>
+          <p:spPr>
+            <a:xfrm>
+              <a:off x="4621366" y="2865163"/>
+              <a:ext cx="1169835" cy="346760"/>
+            </a:xfrm>
+            <a:prstGeom prst="rect">
+              <a:avLst/>
+            </a:prstGeom>
+            <a:ln w="19050"/>
+            <a:effectLst/>
+          </p:spPr>
+          <p:style>
+            <a:lnRef idx="1">
+              <a:schemeClr val="accent6"/>
+            </a:lnRef>
+            <a:fillRef idx="2">
+              <a:schemeClr val="accent6"/>
+            </a:fillRef>
+            <a:effectRef idx="1">
+              <a:schemeClr val="accent6"/>
+            </a:effectRef>
+            <a:fontRef idx="minor">
+              <a:schemeClr val="dk1"/>
+            </a:fontRef>
+          </p:style>
+          <p:txBody>
+            <a:bodyPr rtlCol="0" anchor="ctr"/>
+            <a:lstStyle/>
+            <a:p>
+              <a:pPr algn="ctr"/>
+              <a:r>
+                <a:rPr lang="en-US" sz="1050" b="1" dirty="0" err="1">
+                  <a:solidFill>
+                    <a:schemeClr val="accent6">
+                      <a:lumMod val="75000"/>
+                    </a:schemeClr>
+                  </a:solidFill>
+                </a:rPr>
+                <a:t>JsonOrders</a:t>
+              </a:r>
+              <a:br>
+                <a:rPr lang="en-US" sz="1050" b="1" dirty="0">
+                  <a:solidFill>
+                    <a:schemeClr val="accent6">
+                      <a:lumMod val="75000"/>
+                    </a:schemeClr>
+                  </a:solidFill>
+                </a:rPr>
+              </a:br>
+              <a:r>
+                <a:rPr lang="en-US" sz="1050" b="1" dirty="0">
+                  <a:solidFill>
+                    <a:schemeClr val="accent6">
+                      <a:lumMod val="75000"/>
+                    </a:schemeClr>
+                  </a:solidFill>
+                </a:rPr>
+                <a:t>Storage</a:t>
+              </a:r>
+              <a:endParaRPr lang="en-SG" sz="1050" b="1" dirty="0">
+                <a:solidFill>
+                  <a:schemeClr val="accent6">
+                    <a:lumMod val="75000"/>
+                  </a:schemeClr>
+                </a:solidFill>
+              </a:endParaRPr>
+            </a:p>
+          </p:txBody>
+        </p:sp>
+        <p:sp>
+          <p:nvSpPr>
+            <p:cNvPr id="52" name="Rectangle 8"/>
+            <p:cNvSpPr/>
+            <p:nvPr/>
+          </p:nvSpPr>
+          <p:spPr>
+            <a:xfrm>
+              <a:off x="2873945" y="4606240"/>
+              <a:ext cx="1323049" cy="346760"/>
+            </a:xfrm>
+            <a:prstGeom prst="rect">
+              <a:avLst/>
+            </a:prstGeom>
             <a:solidFill>
               <a:schemeClr val="accent6">
                 <a:lumMod val="75000"/>
               </a:schemeClr>
             </a:solidFill>
-            <a:prstDash val="sysDot"/>
-            <a:headEnd type="none" w="med" len="med"/>
-            <a:tailEnd type="none" w="med" len="med"/>
-          </a:ln>
-          <a:effectLst/>
-        </p:spPr>
-        <p:style>
-          <a:lnRef idx="1">
-            <a:schemeClr val="accent2"/>
-          </a:lnRef>
-          <a:fillRef idx="2">
-            <a:schemeClr val="accent2"/>
-          </a:fillRef>
-          <a:effectRef idx="1">
-            <a:schemeClr val="accent2"/>
-          </a:effectRef>
-          <a:fontRef idx="minor">
-            <a:schemeClr val="dk1"/>
-          </a:fontRef>
-        </p:style>
-      </p:cxnSp>
-      <p:sp>
-        <p:nvSpPr>
-          <p:cNvPr id="42" name="Flowchart: Decision 96"/>
-          <p:cNvSpPr/>
-          <p:nvPr/>
-        </p:nvSpPr>
-        <p:spPr>
-          <a:xfrm>
-            <a:off x="2420322" y="3239846"/>
-            <a:ext cx="236048" cy="173380"/>
-          </a:xfrm>
-          <a:prstGeom prst="flowChartDecision">
-            <a:avLst/>
-          </a:prstGeom>
-          <a:noFill/>
-          <a:ln w="19050">
+            <a:ln w="19050">
+              <a:solidFill>
+                <a:schemeClr val="accent6">
+                  <a:lumMod val="75000"/>
+                </a:schemeClr>
+              </a:solidFill>
+            </a:ln>
+            <a:effectLst/>
+          </p:spPr>
+          <p:style>
+            <a:lnRef idx="1">
+              <a:schemeClr val="accent2"/>
+            </a:lnRef>
+            <a:fillRef idx="2">
+              <a:schemeClr val="accent2"/>
+            </a:fillRef>
+            <a:effectRef idx="1">
+              <a:schemeClr val="accent2"/>
+            </a:effectRef>
+            <a:fontRef idx="minor">
+              <a:schemeClr val="dk1"/>
+            </a:fontRef>
+          </p:style>
+          <p:txBody>
+            <a:bodyPr rtlCol="0" anchor="ctr"/>
+            <a:lstStyle/>
+            <a:p>
+              <a:pPr algn="ctr"/>
+              <a:r>
+                <a:rPr lang="en-US" sz="1050" dirty="0">
+                  <a:solidFill>
+                    <a:schemeClr val="bg1"/>
+                  </a:solidFill>
+                </a:rPr>
+                <a:t>&lt;&lt;interface&gt;&gt;</a:t>
+              </a:r>
+              <a:br>
+                <a:rPr lang="en-US" sz="1050" dirty="0">
+                  <a:solidFill>
+                    <a:schemeClr val="bg1"/>
+                  </a:solidFill>
+                </a:rPr>
+              </a:br>
+              <a:r>
+                <a:rPr lang="en-US" sz="1050" dirty="0" err="1">
+                  <a:solidFill>
+                    <a:schemeClr val="bg1"/>
+                  </a:solidFill>
+                </a:rPr>
+                <a:t>UserPrefsStorage</a:t>
+              </a:r>
+              <a:endParaRPr lang="en-SG" sz="1050" dirty="0">
+                <a:solidFill>
+                  <a:schemeClr val="bg1"/>
+                </a:solidFill>
+              </a:endParaRPr>
+            </a:p>
+          </p:txBody>
+        </p:sp>
+        <p:cxnSp>
+          <p:nvCxnSpPr>
+            <p:cNvPr id="54" name="Straight Arrow Connector 53"/>
+            <p:cNvCxnSpPr>
+              <a:cxnSpLocks/>
+              <a:endCxn id="52" idx="1"/>
+            </p:cNvCxnSpPr>
+            <p:nvPr/>
+          </p:nvCxnSpPr>
+          <p:spPr>
+            <a:xfrm>
+              <a:off x="2653135" y="4774336"/>
+              <a:ext cx="220810" cy="5284"/>
+            </a:xfrm>
+            <a:prstGeom prst="straightConnector1">
+              <a:avLst/>
+            </a:prstGeom>
+            <a:ln w="19050">
+              <a:solidFill>
+                <a:schemeClr val="accent6">
+                  <a:lumMod val="75000"/>
+                </a:schemeClr>
+              </a:solidFill>
+              <a:headEnd type="none" w="med" len="med"/>
+              <a:tailEnd type="arrow" w="med" len="med"/>
+            </a:ln>
+            <a:effectLst/>
+          </p:spPr>
+          <p:style>
+            <a:lnRef idx="1">
+              <a:schemeClr val="accent2"/>
+            </a:lnRef>
+            <a:fillRef idx="2">
+              <a:schemeClr val="accent2"/>
+            </a:fillRef>
+            <a:effectRef idx="1">
+              <a:schemeClr val="accent2"/>
+            </a:effectRef>
+            <a:fontRef idx="minor">
+              <a:schemeClr val="dk1"/>
+            </a:fontRef>
+          </p:style>
+        </p:cxnSp>
+        <p:sp>
+          <p:nvSpPr>
+            <p:cNvPr id="56" name="Flowchart: Decision 96"/>
+            <p:cNvSpPr/>
+            <p:nvPr/>
+          </p:nvSpPr>
+          <p:spPr>
+            <a:xfrm>
+              <a:off x="2416753" y="4687646"/>
+              <a:ext cx="236048" cy="173380"/>
+            </a:xfrm>
+            <a:prstGeom prst="flowChartDecision">
+              <a:avLst/>
+            </a:prstGeom>
+            <a:noFill/>
+            <a:ln w="19050">
+              <a:solidFill>
+                <a:schemeClr val="accent6">
+                  <a:lumMod val="75000"/>
+                </a:schemeClr>
+              </a:solidFill>
+            </a:ln>
+            <a:effectLst/>
+          </p:spPr>
+          <p:style>
+            <a:lnRef idx="1">
+              <a:schemeClr val="accent2"/>
+            </a:lnRef>
+            <a:fillRef idx="2">
+              <a:schemeClr val="accent2"/>
+            </a:fillRef>
+            <a:effectRef idx="1">
+              <a:schemeClr val="accent2"/>
+            </a:effectRef>
+            <a:fontRef idx="minor">
+              <a:schemeClr val="dk1"/>
+            </a:fontRef>
+          </p:style>
+          <p:txBody>
+            <a:bodyPr rtlCol="0" anchor="ctr"/>
+            <a:lstStyle/>
+            <a:p>
+              <a:pPr algn="ctr"/>
+              <a:endParaRPr lang="en-US" sz="1050" dirty="0">
+                <a:solidFill>
+                  <a:schemeClr val="bg1"/>
+                </a:solidFill>
+              </a:endParaRPr>
+            </a:p>
+          </p:txBody>
+        </p:sp>
+        <p:cxnSp>
+          <p:nvCxnSpPr>
+            <p:cNvPr id="60" name="Elbow Connector 63"/>
+            <p:cNvCxnSpPr>
+              <a:stCxn id="61" idx="3"/>
+              <a:endCxn id="65" idx="1"/>
+            </p:cNvCxnSpPr>
+            <p:nvPr/>
+          </p:nvCxnSpPr>
+          <p:spPr>
+            <a:xfrm flipV="1">
+              <a:off x="4394806" y="4779619"/>
+              <a:ext cx="223323" cy="2"/>
+            </a:xfrm>
+            <a:prstGeom prst="bentConnector3">
+              <a:avLst>
+                <a:gd name="adj1" fmla="val 50000"/>
+              </a:avLst>
+            </a:prstGeom>
+            <a:ln w="19050">
+              <a:solidFill>
+                <a:schemeClr val="accent6">
+                  <a:lumMod val="75000"/>
+                </a:schemeClr>
+              </a:solidFill>
+              <a:prstDash val="sysDot"/>
+              <a:headEnd type="none" w="med" len="med"/>
+              <a:tailEnd type="none" w="med" len="med"/>
+            </a:ln>
+            <a:effectLst/>
+          </p:spPr>
+          <p:style>
+            <a:lnRef idx="1">
+              <a:schemeClr val="accent2"/>
+            </a:lnRef>
+            <a:fillRef idx="2">
+              <a:schemeClr val="accent2"/>
+            </a:fillRef>
+            <a:effectRef idx="1">
+              <a:schemeClr val="accent2"/>
+            </a:effectRef>
+            <a:fontRef idx="minor">
+              <a:schemeClr val="dk1"/>
+            </a:fontRef>
+          </p:style>
+        </p:cxnSp>
+        <p:sp>
+          <p:nvSpPr>
+            <p:cNvPr id="61" name="Isosceles Triangle 102"/>
+            <p:cNvSpPr/>
+            <p:nvPr/>
+          </p:nvSpPr>
+          <p:spPr>
+            <a:xfrm rot="5400000" flipV="1">
+              <a:off x="4171792" y="4691859"/>
+              <a:ext cx="270504" cy="175523"/>
+            </a:xfrm>
+            <a:prstGeom prst="triangle">
+              <a:avLst/>
+            </a:prstGeom>
             <a:solidFill>
               <a:schemeClr val="accent6">
                 <a:lumMod val="75000"/>
               </a:schemeClr>
             </a:solidFill>
-          </a:ln>
-          <a:effectLst/>
-        </p:spPr>
-        <p:style>
-          <a:lnRef idx="1">
-            <a:schemeClr val="accent2"/>
-          </a:lnRef>
-          <a:fillRef idx="2">
-            <a:schemeClr val="accent2"/>
-          </a:fillRef>
-          <a:effectRef idx="1">
-            <a:schemeClr val="accent2"/>
-          </a:effectRef>
-          <a:fontRef idx="minor">
-            <a:schemeClr val="dk1"/>
-          </a:fontRef>
-        </p:style>
-        <p:txBody>
-          <a:bodyPr rtlCol="0" anchor="ctr"/>
-          <a:lstStyle/>
-          <a:p>
-            <a:pPr algn="ctr"/>
-            <a:endParaRPr lang="en-US" sz="1050">
+            <a:ln w="19050">
               <a:solidFill>
-                <a:schemeClr val="bg1"/>
+                <a:schemeClr val="accent6">
+                  <a:lumMod val="75000"/>
+                </a:schemeClr>
               </a:solidFill>
-            </a:endParaRPr>
-          </a:p>
-        </p:txBody>
-      </p:sp>
-      <p:cxnSp>
-        <p:nvCxnSpPr>
-          <p:cNvPr id="97" name="Elbow Connector 63"/>
-          <p:cNvCxnSpPr>
-            <a:stCxn id="99" idx="3"/>
-            <a:endCxn id="50" idx="1"/>
-          </p:cNvCxnSpPr>
-          <p:nvPr/>
-        </p:nvCxnSpPr>
-        <p:spPr>
-          <a:xfrm flipV="1">
-            <a:off x="4398041" y="3331820"/>
-            <a:ext cx="223324" cy="1"/>
-          </a:xfrm>
-          <a:prstGeom prst="bentConnector3">
-            <a:avLst>
-              <a:gd name="adj1" fmla="val 50000"/>
-            </a:avLst>
-          </a:prstGeom>
-          <a:ln w="19050">
+            </a:ln>
+            <a:effectLst/>
+          </p:spPr>
+          <p:style>
+            <a:lnRef idx="1">
+              <a:schemeClr val="accent2"/>
+            </a:lnRef>
+            <a:fillRef idx="2">
+              <a:schemeClr val="accent2"/>
+            </a:fillRef>
+            <a:effectRef idx="1">
+              <a:schemeClr val="accent2"/>
+            </a:effectRef>
+            <a:fontRef idx="minor">
+              <a:schemeClr val="dk1"/>
+            </a:fontRef>
+          </p:style>
+          <p:txBody>
+            <a:bodyPr rtlCol="0" anchor="ctr"/>
+            <a:lstStyle/>
+            <a:p>
+              <a:pPr algn="ctr"/>
+              <a:endParaRPr lang="en-SG" sz="1050">
+                <a:solidFill>
+                  <a:schemeClr val="bg1"/>
+                </a:solidFill>
+              </a:endParaRPr>
+            </a:p>
+          </p:txBody>
+        </p:sp>
+        <p:sp>
+          <p:nvSpPr>
+            <p:cNvPr id="65" name="Rectangle 8"/>
+            <p:cNvSpPr/>
+            <p:nvPr/>
+          </p:nvSpPr>
+          <p:spPr>
+            <a:xfrm>
+              <a:off x="4618129" y="4606239"/>
+              <a:ext cx="1093635" cy="346760"/>
+            </a:xfrm>
+            <a:prstGeom prst="rect">
+              <a:avLst/>
+            </a:prstGeom>
             <a:solidFill>
               <a:schemeClr val="accent6">
                 <a:lumMod val="75000"/>
               </a:schemeClr>
             </a:solidFill>
-            <a:prstDash val="sysDot"/>
-            <a:headEnd type="none" w="med" len="med"/>
-            <a:tailEnd type="none" w="med" len="med"/>
-          </a:ln>
-          <a:effectLst/>
-        </p:spPr>
-        <p:style>
-          <a:lnRef idx="1">
-            <a:schemeClr val="accent2"/>
-          </a:lnRef>
-          <a:fillRef idx="2">
-            <a:schemeClr val="accent2"/>
-          </a:fillRef>
-          <a:effectRef idx="1">
-            <a:schemeClr val="accent2"/>
-          </a:effectRef>
-          <a:fontRef idx="minor">
-            <a:schemeClr val="dk1"/>
-          </a:fontRef>
-        </p:style>
-      </p:cxnSp>
-      <p:sp>
-        <p:nvSpPr>
-          <p:cNvPr id="99" name="Isosceles Triangle 102"/>
-          <p:cNvSpPr/>
-          <p:nvPr/>
-        </p:nvSpPr>
-        <p:spPr>
-          <a:xfrm rot="5400000" flipV="1">
-            <a:off x="4175027" y="3244059"/>
-            <a:ext cx="270504" cy="175523"/>
-          </a:xfrm>
-          <a:prstGeom prst="triangle">
-            <a:avLst/>
-          </a:prstGeom>
-          <a:solidFill>
-            <a:schemeClr val="accent6">
-              <a:lumMod val="75000"/>
-            </a:schemeClr>
-          </a:solidFill>
-          <a:ln w="19050">
+            <a:ln w="19050">
+              <a:solidFill>
+                <a:schemeClr val="accent6">
+                  <a:lumMod val="75000"/>
+                </a:schemeClr>
+              </a:solidFill>
+            </a:ln>
+            <a:effectLst/>
+          </p:spPr>
+          <p:style>
+            <a:lnRef idx="1">
+              <a:schemeClr val="accent2"/>
+            </a:lnRef>
+            <a:fillRef idx="2">
+              <a:schemeClr val="accent2"/>
+            </a:fillRef>
+            <a:effectRef idx="1">
+              <a:schemeClr val="accent2"/>
+            </a:effectRef>
+            <a:fontRef idx="minor">
+              <a:schemeClr val="dk1"/>
+            </a:fontRef>
+          </p:style>
+          <p:txBody>
+            <a:bodyPr rtlCol="0" anchor="ctr"/>
+            <a:lstStyle/>
+            <a:p>
+              <a:pPr algn="ctr"/>
+              <a:r>
+                <a:rPr lang="en-US" sz="1050" dirty="0" err="1">
+                  <a:solidFill>
+                    <a:schemeClr val="bg1"/>
+                  </a:solidFill>
+                </a:rPr>
+                <a:t>JsonUserPrefs</a:t>
+              </a:r>
+              <a:br>
+                <a:rPr lang="en-US" sz="1050" dirty="0">
+                  <a:solidFill>
+                    <a:schemeClr val="bg1"/>
+                  </a:solidFill>
+                </a:rPr>
+              </a:br>
+              <a:r>
+                <a:rPr lang="en-US" sz="1050" dirty="0">
+                  <a:solidFill>
+                    <a:schemeClr val="bg1"/>
+                  </a:solidFill>
+                </a:rPr>
+                <a:t>Storage</a:t>
+              </a:r>
+              <a:endParaRPr lang="en-SG" sz="1050" dirty="0">
+                <a:solidFill>
+                  <a:schemeClr val="bg1"/>
+                </a:solidFill>
+              </a:endParaRPr>
+            </a:p>
+          </p:txBody>
+        </p:sp>
+        <p:sp>
+          <p:nvSpPr>
+            <p:cNvPr id="66" name="Rectangle 8"/>
+            <p:cNvSpPr/>
+            <p:nvPr/>
+          </p:nvSpPr>
+          <p:spPr>
+            <a:xfrm>
+              <a:off x="6019801" y="2867133"/>
+              <a:ext cx="1200707" cy="346760"/>
+            </a:xfrm>
+            <a:prstGeom prst="rect">
+              <a:avLst/>
+            </a:prstGeom>
+            <a:ln w="19050"/>
+            <a:effectLst/>
+          </p:spPr>
+          <p:style>
+            <a:lnRef idx="1">
+              <a:schemeClr val="accent6"/>
+            </a:lnRef>
+            <a:fillRef idx="2">
+              <a:schemeClr val="accent6"/>
+            </a:fillRef>
+            <a:effectRef idx="1">
+              <a:schemeClr val="accent6"/>
+            </a:effectRef>
+            <a:fontRef idx="minor">
+              <a:schemeClr val="dk1"/>
+            </a:fontRef>
+          </p:style>
+          <p:txBody>
+            <a:bodyPr rtlCol="0" anchor="ctr"/>
+            <a:lstStyle/>
+            <a:p>
+              <a:pPr algn="ctr"/>
+              <a:r>
+                <a:rPr lang="en-US" sz="1050" b="1" dirty="0" err="1">
+                  <a:solidFill>
+                    <a:schemeClr val="accent6">
+                      <a:lumMod val="75000"/>
+                    </a:schemeClr>
+                  </a:solidFill>
+                </a:rPr>
+                <a:t>JsonSerializable</a:t>
+              </a:r>
+              <a:br>
+                <a:rPr lang="en-US" sz="1050" b="1" dirty="0">
+                  <a:solidFill>
+                    <a:schemeClr val="accent6">
+                      <a:lumMod val="75000"/>
+                    </a:schemeClr>
+                  </a:solidFill>
+                </a:rPr>
+              </a:br>
+              <a:r>
+                <a:rPr lang="en-US" sz="1050" b="1" dirty="0">
+                  <a:solidFill>
+                    <a:schemeClr val="accent6">
+                      <a:lumMod val="75000"/>
+                    </a:schemeClr>
+                  </a:solidFill>
+                </a:rPr>
+                <a:t>Orders</a:t>
+              </a:r>
+              <a:endParaRPr lang="en-SG" sz="1050" b="1" dirty="0">
+                <a:solidFill>
+                  <a:schemeClr val="accent6">
+                    <a:lumMod val="75000"/>
+                  </a:schemeClr>
+                </a:solidFill>
+              </a:endParaRPr>
+            </a:p>
+          </p:txBody>
+        </p:sp>
+        <p:sp>
+          <p:nvSpPr>
+            <p:cNvPr id="74" name="Rectangle 8"/>
+            <p:cNvSpPr/>
+            <p:nvPr/>
+          </p:nvSpPr>
+          <p:spPr>
+            <a:xfrm>
+              <a:off x="7615739" y="2866347"/>
+              <a:ext cx="1259718" cy="346760"/>
+            </a:xfrm>
+            <a:prstGeom prst="rect">
+              <a:avLst/>
+            </a:prstGeom>
+            <a:ln w="19050"/>
+            <a:effectLst/>
+          </p:spPr>
+          <p:style>
+            <a:lnRef idx="1">
+              <a:schemeClr val="accent6"/>
+            </a:lnRef>
+            <a:fillRef idx="2">
+              <a:schemeClr val="accent6"/>
+            </a:fillRef>
+            <a:effectRef idx="1">
+              <a:schemeClr val="accent6"/>
+            </a:effectRef>
+            <a:fontRef idx="minor">
+              <a:schemeClr val="dk1"/>
+            </a:fontRef>
+          </p:style>
+          <p:txBody>
+            <a:bodyPr rtlCol="0" anchor="ctr"/>
+            <a:lstStyle/>
+            <a:p>
+              <a:pPr algn="ctr"/>
+              <a:r>
+                <a:rPr lang="en-US" sz="1030" b="1" dirty="0" err="1">
+                  <a:solidFill>
+                    <a:schemeClr val="accent6">
+                      <a:lumMod val="75000"/>
+                    </a:schemeClr>
+                  </a:solidFill>
+                </a:rPr>
+                <a:t>JsonAdaptedOrders</a:t>
+              </a:r>
+              <a:endParaRPr lang="en-SG" sz="1030" b="1" dirty="0">
+                <a:solidFill>
+                  <a:schemeClr val="accent6">
+                    <a:lumMod val="75000"/>
+                  </a:schemeClr>
+                </a:solidFill>
+              </a:endParaRPr>
+            </a:p>
+          </p:txBody>
+        </p:sp>
+        <p:cxnSp>
+          <p:nvCxnSpPr>
+            <p:cNvPr id="77" name="Elbow Connector 122"/>
+            <p:cNvCxnSpPr>
+              <a:cxnSpLocks/>
+              <a:stCxn id="66" idx="3"/>
+              <a:endCxn id="74" idx="1"/>
+            </p:cNvCxnSpPr>
+            <p:nvPr/>
+          </p:nvCxnSpPr>
+          <p:spPr>
+            <a:xfrm flipV="1">
+              <a:off x="7220508" y="3039727"/>
+              <a:ext cx="395231" cy="786"/>
+            </a:xfrm>
+            <a:prstGeom prst="bentConnector3">
+              <a:avLst>
+                <a:gd name="adj1" fmla="val 50000"/>
+              </a:avLst>
+            </a:prstGeom>
+            <a:ln w="19050">
+              <a:prstDash val="sysDot"/>
+              <a:headEnd type="none" w="med" len="med"/>
+              <a:tailEnd type="arrow" w="med" len="med"/>
+            </a:ln>
+            <a:effectLst/>
+          </p:spPr>
+          <p:style>
+            <a:lnRef idx="1">
+              <a:schemeClr val="accent6"/>
+            </a:lnRef>
+            <a:fillRef idx="2">
+              <a:schemeClr val="accent6"/>
+            </a:fillRef>
+            <a:effectRef idx="1">
+              <a:schemeClr val="accent6"/>
+            </a:effectRef>
+            <a:fontRef idx="minor">
+              <a:schemeClr val="dk1"/>
+            </a:fontRef>
+          </p:style>
+        </p:cxnSp>
+        <p:sp>
+          <p:nvSpPr>
+            <p:cNvPr id="55" name="Rectangle 8">
+              <a:extLst>
+                <a:ext uri="{FF2B5EF4-FFF2-40B4-BE49-F238E27FC236}">
+                  <a16:creationId xmlns:a16="http://schemas.microsoft.com/office/drawing/2014/main" id="{E4DD0726-81C2-45A1-829A-D0B0D47C58AA}"/>
+                </a:ext>
+              </a:extLst>
+            </p:cNvPr>
+            <p:cNvSpPr/>
+            <p:nvPr/>
+          </p:nvSpPr>
+          <p:spPr>
+            <a:xfrm>
+              <a:off x="2873611" y="1152816"/>
+              <a:ext cx="1323049" cy="346760"/>
+            </a:xfrm>
+            <a:prstGeom prst="rect">
+              <a:avLst/>
+            </a:prstGeom>
             <a:solidFill>
               <a:schemeClr val="accent6">
                 <a:lumMod val="75000"/>
               </a:schemeClr>
             </a:solidFill>
-          </a:ln>
-          <a:effectLst/>
-        </p:spPr>
-        <p:style>
-          <a:lnRef idx="1">
-            <a:schemeClr val="accent2"/>
-          </a:lnRef>
-          <a:fillRef idx="2">
-            <a:schemeClr val="accent2"/>
-          </a:fillRef>
-          <a:effectRef idx="1">
-            <a:schemeClr val="accent2"/>
-          </a:effectRef>
-          <a:fontRef idx="minor">
-            <a:schemeClr val="dk1"/>
-          </a:fontRef>
-        </p:style>
-        <p:txBody>
-          <a:bodyPr rtlCol="0" anchor="ctr"/>
-          <a:lstStyle/>
-          <a:p>
-            <a:pPr algn="ctr"/>
-            <a:endParaRPr lang="en-SG" sz="1050">
+            <a:ln w="19050">
               <a:solidFill>
-                <a:schemeClr val="bg1"/>
+                <a:schemeClr val="accent6">
+                  <a:lumMod val="75000"/>
+                </a:schemeClr>
               </a:solidFill>
-            </a:endParaRPr>
-          </a:p>
-        </p:txBody>
-      </p:sp>
-      <p:cxnSp>
-        <p:nvCxnSpPr>
-          <p:cNvPr id="124" name="Elbow Connector 122"/>
-          <p:cNvCxnSpPr>
-            <a:stCxn id="50" idx="3"/>
-            <a:endCxn id="66" idx="1"/>
-          </p:cNvCxnSpPr>
-          <p:nvPr/>
-        </p:nvCxnSpPr>
-        <p:spPr>
-          <a:xfrm>
-            <a:off x="5791200" y="3331820"/>
-            <a:ext cx="228600" cy="1970"/>
-          </a:xfrm>
-          <a:prstGeom prst="bentConnector3">
-            <a:avLst>
-              <a:gd name="adj1" fmla="val 50000"/>
-            </a:avLst>
-          </a:prstGeom>
-          <a:ln w="19050">
+            </a:ln>
+            <a:effectLst/>
+          </p:spPr>
+          <p:style>
+            <a:lnRef idx="1">
+              <a:schemeClr val="accent2"/>
+            </a:lnRef>
+            <a:fillRef idx="2">
+              <a:schemeClr val="accent2"/>
+            </a:fillRef>
+            <a:effectRef idx="1">
+              <a:schemeClr val="accent2"/>
+            </a:effectRef>
+            <a:fontRef idx="minor">
+              <a:schemeClr val="dk1"/>
+            </a:fontRef>
+          </p:style>
+          <p:txBody>
+            <a:bodyPr rtlCol="0" anchor="ctr"/>
+            <a:lstStyle/>
+            <a:p>
+              <a:pPr algn="ctr"/>
+              <a:r>
+                <a:rPr lang="en-US" sz="1050" dirty="0">
+                  <a:solidFill>
+                    <a:schemeClr val="bg1"/>
+                  </a:solidFill>
+                </a:rPr>
+                <a:t>&lt;&lt;interface&gt;&gt;</a:t>
+              </a:r>
+              <a:br>
+                <a:rPr lang="en-US" sz="1050" dirty="0">
+                  <a:solidFill>
+                    <a:schemeClr val="bg1"/>
+                  </a:solidFill>
+                </a:rPr>
+              </a:br>
+              <a:r>
+                <a:rPr lang="en-US" sz="1050" dirty="0" err="1">
+                  <a:solidFill>
+                    <a:schemeClr val="bg1"/>
+                  </a:solidFill>
+                </a:rPr>
+                <a:t>AddressBookStorage</a:t>
+              </a:r>
+              <a:endParaRPr lang="en-SG" sz="1050" dirty="0">
+                <a:solidFill>
+                  <a:schemeClr val="bg1"/>
+                </a:solidFill>
+              </a:endParaRPr>
+            </a:p>
+          </p:txBody>
+        </p:sp>
+        <p:cxnSp>
+          <p:nvCxnSpPr>
+            <p:cNvPr id="57" name="Straight Arrow Connector 56">
+              <a:extLst>
+                <a:ext uri="{FF2B5EF4-FFF2-40B4-BE49-F238E27FC236}">
+                  <a16:creationId xmlns:a16="http://schemas.microsoft.com/office/drawing/2014/main" id="{42A129BB-0240-419C-A652-BBFC42B15CC1}"/>
+                </a:ext>
+              </a:extLst>
+            </p:cNvPr>
+            <p:cNvCxnSpPr>
+              <a:stCxn id="59" idx="3"/>
+              <a:endCxn id="55" idx="1"/>
+            </p:cNvCxnSpPr>
+            <p:nvPr/>
+          </p:nvCxnSpPr>
+          <p:spPr>
+            <a:xfrm>
+              <a:off x="2652801" y="1320912"/>
+              <a:ext cx="220810" cy="5284"/>
+            </a:xfrm>
+            <a:prstGeom prst="straightConnector1">
+              <a:avLst/>
+            </a:prstGeom>
+            <a:ln w="19050">
+              <a:solidFill>
+                <a:schemeClr val="accent6">
+                  <a:lumMod val="75000"/>
+                </a:schemeClr>
+              </a:solidFill>
+              <a:headEnd type="none" w="med" len="med"/>
+              <a:tailEnd type="arrow" w="med" len="med"/>
+            </a:ln>
+            <a:effectLst/>
+          </p:spPr>
+          <p:style>
+            <a:lnRef idx="1">
+              <a:schemeClr val="accent2"/>
+            </a:lnRef>
+            <a:fillRef idx="2">
+              <a:schemeClr val="accent2"/>
+            </a:fillRef>
+            <a:effectRef idx="1">
+              <a:schemeClr val="accent2"/>
+            </a:effectRef>
+            <a:fontRef idx="minor">
+              <a:schemeClr val="dk1"/>
+            </a:fontRef>
+          </p:style>
+        </p:cxnSp>
+        <p:sp>
+          <p:nvSpPr>
+            <p:cNvPr id="59" name="Flowchart: Decision 96">
+              <a:extLst>
+                <a:ext uri="{FF2B5EF4-FFF2-40B4-BE49-F238E27FC236}">
+                  <a16:creationId xmlns:a16="http://schemas.microsoft.com/office/drawing/2014/main" id="{EE0BCA9C-2DC4-4C8E-8700-9229B0BFD177}"/>
+                </a:ext>
+              </a:extLst>
+            </p:cNvPr>
+            <p:cNvSpPr/>
+            <p:nvPr/>
+          </p:nvSpPr>
+          <p:spPr>
+            <a:xfrm>
+              <a:off x="2416753" y="1234222"/>
+              <a:ext cx="236048" cy="173380"/>
+            </a:xfrm>
+            <a:prstGeom prst="flowChartDecision">
+              <a:avLst/>
+            </a:prstGeom>
+            <a:noFill/>
+            <a:ln w="19050">
+              <a:solidFill>
+                <a:schemeClr val="accent6">
+                  <a:lumMod val="75000"/>
+                </a:schemeClr>
+              </a:solidFill>
+            </a:ln>
+            <a:effectLst/>
+          </p:spPr>
+          <p:style>
+            <a:lnRef idx="1">
+              <a:schemeClr val="accent2"/>
+            </a:lnRef>
+            <a:fillRef idx="2">
+              <a:schemeClr val="accent2"/>
+            </a:fillRef>
+            <a:effectRef idx="1">
+              <a:schemeClr val="accent2"/>
+            </a:effectRef>
+            <a:fontRef idx="minor">
+              <a:schemeClr val="dk1"/>
+            </a:fontRef>
+          </p:style>
+          <p:txBody>
+            <a:bodyPr rtlCol="0" anchor="ctr"/>
+            <a:lstStyle/>
+            <a:p>
+              <a:pPr algn="ctr"/>
+              <a:endParaRPr lang="en-US" sz="1050">
+                <a:solidFill>
+                  <a:schemeClr val="bg1"/>
+                </a:solidFill>
+              </a:endParaRPr>
+            </a:p>
+          </p:txBody>
+        </p:sp>
+        <p:cxnSp>
+          <p:nvCxnSpPr>
+            <p:cNvPr id="62" name="Elbow Connector 63">
+              <a:extLst>
+                <a:ext uri="{FF2B5EF4-FFF2-40B4-BE49-F238E27FC236}">
+                  <a16:creationId xmlns:a16="http://schemas.microsoft.com/office/drawing/2014/main" id="{F9DBD3AC-3759-48E9-A4D1-C117535AD035}"/>
+                </a:ext>
+              </a:extLst>
+            </p:cNvPr>
+            <p:cNvCxnSpPr>
+              <a:stCxn id="63" idx="3"/>
+              <a:endCxn id="67" idx="1"/>
+            </p:cNvCxnSpPr>
+            <p:nvPr/>
+          </p:nvCxnSpPr>
+          <p:spPr>
+            <a:xfrm flipV="1">
+              <a:off x="4394471" y="1326193"/>
+              <a:ext cx="223322" cy="3"/>
+            </a:xfrm>
+            <a:prstGeom prst="bentConnector3">
+              <a:avLst>
+                <a:gd name="adj1" fmla="val 50000"/>
+              </a:avLst>
+            </a:prstGeom>
+            <a:ln w="19050">
+              <a:solidFill>
+                <a:schemeClr val="accent6">
+                  <a:lumMod val="75000"/>
+                </a:schemeClr>
+              </a:solidFill>
+              <a:prstDash val="sysDot"/>
+              <a:headEnd type="none" w="med" len="med"/>
+              <a:tailEnd type="none" w="med" len="med"/>
+            </a:ln>
+            <a:effectLst/>
+          </p:spPr>
+          <p:style>
+            <a:lnRef idx="1">
+              <a:schemeClr val="accent2"/>
+            </a:lnRef>
+            <a:fillRef idx="2">
+              <a:schemeClr val="accent2"/>
+            </a:fillRef>
+            <a:effectRef idx="1">
+              <a:schemeClr val="accent2"/>
+            </a:effectRef>
+            <a:fontRef idx="minor">
+              <a:schemeClr val="dk1"/>
+            </a:fontRef>
+          </p:style>
+        </p:cxnSp>
+        <p:sp>
+          <p:nvSpPr>
+            <p:cNvPr id="63" name="Isosceles Triangle 102">
+              <a:extLst>
+                <a:ext uri="{FF2B5EF4-FFF2-40B4-BE49-F238E27FC236}">
+                  <a16:creationId xmlns:a16="http://schemas.microsoft.com/office/drawing/2014/main" id="{F05E022F-CACC-4080-87AC-39CE1A63126A}"/>
+                </a:ext>
+              </a:extLst>
+            </p:cNvPr>
+            <p:cNvSpPr/>
+            <p:nvPr/>
+          </p:nvSpPr>
+          <p:spPr>
+            <a:xfrm rot="5400000" flipV="1">
+              <a:off x="4171457" y="1238434"/>
+              <a:ext cx="270504" cy="175523"/>
+            </a:xfrm>
+            <a:prstGeom prst="triangle">
+              <a:avLst/>
+            </a:prstGeom>
             <a:solidFill>
               <a:schemeClr val="accent6">
                 <a:lumMod val="75000"/>
               </a:schemeClr>
             </a:solidFill>
-            <a:prstDash val="sysDot"/>
-            <a:headEnd type="none" w="med" len="med"/>
-            <a:tailEnd type="arrow" w="med" len="med"/>
-          </a:ln>
-          <a:effectLst/>
-        </p:spPr>
-        <p:style>
-          <a:lnRef idx="1">
-            <a:schemeClr val="accent2"/>
-          </a:lnRef>
-          <a:fillRef idx="2">
-            <a:schemeClr val="accent2"/>
-          </a:fillRef>
-          <a:effectRef idx="1">
-            <a:schemeClr val="accent2"/>
-          </a:effectRef>
-          <a:fontRef idx="minor">
-            <a:schemeClr val="dk1"/>
-          </a:fontRef>
-        </p:style>
-      </p:cxnSp>
-      <p:sp>
-        <p:nvSpPr>
-          <p:cNvPr id="50" name="Rectangle 8"/>
-          <p:cNvSpPr/>
-          <p:nvPr/>
-        </p:nvSpPr>
-        <p:spPr>
-          <a:xfrm>
-            <a:off x="4621365" y="3158440"/>
-            <a:ext cx="1169835" cy="346760"/>
-          </a:xfrm>
-          <a:prstGeom prst="rect">
-            <a:avLst/>
-          </a:prstGeom>
-          <a:ln w="19050"/>
-          <a:effectLst/>
-        </p:spPr>
-        <p:style>
-          <a:lnRef idx="1">
-            <a:schemeClr val="accent6"/>
-          </a:lnRef>
-          <a:fillRef idx="2">
-            <a:schemeClr val="accent6"/>
-          </a:fillRef>
-          <a:effectRef idx="1">
-            <a:schemeClr val="accent6"/>
-          </a:effectRef>
-          <a:fontRef idx="minor">
-            <a:schemeClr val="dk1"/>
-          </a:fontRef>
-        </p:style>
-        <p:txBody>
-          <a:bodyPr rtlCol="0" anchor="ctr"/>
-          <a:lstStyle/>
-          <a:p>
-            <a:pPr algn="ctr"/>
-            <a:r>
-              <a:rPr lang="en-US" sz="1050" b="1" dirty="0" err="1">
+            <a:ln w="19050">
+              <a:solidFill>
+                <a:schemeClr val="accent6">
+                  <a:lumMod val="75000"/>
+                </a:schemeClr>
+              </a:solidFill>
+            </a:ln>
+            <a:effectLst/>
+          </p:spPr>
+          <p:style>
+            <a:lnRef idx="1">
+              <a:schemeClr val="accent2"/>
+            </a:lnRef>
+            <a:fillRef idx="2">
+              <a:schemeClr val="accent2"/>
+            </a:fillRef>
+            <a:effectRef idx="1">
+              <a:schemeClr val="accent2"/>
+            </a:effectRef>
+            <a:fontRef idx="minor">
+              <a:schemeClr val="dk1"/>
+            </a:fontRef>
+          </p:style>
+          <p:txBody>
+            <a:bodyPr rtlCol="0" anchor="ctr"/>
+            <a:lstStyle/>
+            <a:p>
+              <a:pPr algn="ctr"/>
+              <a:endParaRPr lang="en-SG" sz="1050">
+                <a:solidFill>
+                  <a:schemeClr val="bg1"/>
+                </a:solidFill>
+              </a:endParaRPr>
+            </a:p>
+          </p:txBody>
+        </p:sp>
+        <p:cxnSp>
+          <p:nvCxnSpPr>
+            <p:cNvPr id="64" name="Elbow Connector 122">
+              <a:extLst>
+                <a:ext uri="{FF2B5EF4-FFF2-40B4-BE49-F238E27FC236}">
+                  <a16:creationId xmlns:a16="http://schemas.microsoft.com/office/drawing/2014/main" id="{C92DC855-E47D-4B36-8F85-8A0D54F51E19}"/>
+                </a:ext>
+              </a:extLst>
+            </p:cNvPr>
+            <p:cNvCxnSpPr>
+              <a:stCxn id="67" idx="3"/>
+              <a:endCxn id="68" idx="1"/>
+            </p:cNvCxnSpPr>
+            <p:nvPr/>
+          </p:nvCxnSpPr>
+          <p:spPr>
+            <a:xfrm>
+              <a:off x="5787628" y="1326193"/>
+              <a:ext cx="228600" cy="1970"/>
+            </a:xfrm>
+            <a:prstGeom prst="bentConnector3">
+              <a:avLst>
+                <a:gd name="adj1" fmla="val 50000"/>
+              </a:avLst>
+            </a:prstGeom>
+            <a:ln w="19050">
+              <a:solidFill>
+                <a:schemeClr val="accent6">
+                  <a:lumMod val="75000"/>
+                </a:schemeClr>
+              </a:solidFill>
+              <a:prstDash val="sysDot"/>
+              <a:headEnd type="none" w="med" len="med"/>
+              <a:tailEnd type="arrow" w="med" len="med"/>
+            </a:ln>
+            <a:effectLst/>
+          </p:spPr>
+          <p:style>
+            <a:lnRef idx="1">
+              <a:schemeClr val="accent2"/>
+            </a:lnRef>
+            <a:fillRef idx="2">
+              <a:schemeClr val="accent2"/>
+            </a:fillRef>
+            <a:effectRef idx="1">
+              <a:schemeClr val="accent2"/>
+            </a:effectRef>
+            <a:fontRef idx="minor">
+              <a:schemeClr val="dk1"/>
+            </a:fontRef>
+          </p:style>
+        </p:cxnSp>
+        <p:sp>
+          <p:nvSpPr>
+            <p:cNvPr id="67" name="Rectangle 8">
+              <a:extLst>
+                <a:ext uri="{FF2B5EF4-FFF2-40B4-BE49-F238E27FC236}">
+                  <a16:creationId xmlns:a16="http://schemas.microsoft.com/office/drawing/2014/main" id="{78DAA991-A206-47AD-BDEE-A42A67C4D40B}"/>
+                </a:ext>
+              </a:extLst>
+            </p:cNvPr>
+            <p:cNvSpPr/>
+            <p:nvPr/>
+          </p:nvSpPr>
+          <p:spPr>
+            <a:xfrm>
+              <a:off x="4617793" y="1152813"/>
+              <a:ext cx="1169835" cy="346760"/>
+            </a:xfrm>
+            <a:prstGeom prst="rect">
+              <a:avLst/>
+            </a:prstGeom>
+            <a:ln w="19050"/>
+            <a:effectLst/>
+          </p:spPr>
+          <p:style>
+            <a:lnRef idx="1">
+              <a:schemeClr val="accent6"/>
+            </a:lnRef>
+            <a:fillRef idx="2">
+              <a:schemeClr val="accent6"/>
+            </a:fillRef>
+            <a:effectRef idx="1">
+              <a:schemeClr val="accent6"/>
+            </a:effectRef>
+            <a:fontRef idx="minor">
+              <a:schemeClr val="dk1"/>
+            </a:fontRef>
+          </p:style>
+          <p:txBody>
+            <a:bodyPr rtlCol="0" anchor="ctr"/>
+            <a:lstStyle/>
+            <a:p>
+              <a:pPr algn="ctr"/>
+              <a:r>
+                <a:rPr lang="en-US" sz="1050" b="1" dirty="0" err="1">
+                  <a:solidFill>
+                    <a:schemeClr val="accent6">
+                      <a:lumMod val="75000"/>
+                    </a:schemeClr>
+                  </a:solidFill>
+                </a:rPr>
+                <a:t>JsonStatistics</a:t>
+              </a:r>
+              <a:br>
+                <a:rPr lang="en-US" sz="1050" b="1" dirty="0">
+                  <a:solidFill>
+                    <a:schemeClr val="accent6">
+                      <a:lumMod val="75000"/>
+                    </a:schemeClr>
+                  </a:solidFill>
+                </a:rPr>
+              </a:br>
+              <a:r>
+                <a:rPr lang="en-US" sz="1050" b="1" dirty="0">
+                  <a:solidFill>
+                    <a:schemeClr val="accent6">
+                      <a:lumMod val="75000"/>
+                    </a:schemeClr>
+                  </a:solidFill>
+                </a:rPr>
+                <a:t>Storage</a:t>
+              </a:r>
+              <a:endParaRPr lang="en-SG" sz="1050" b="1" dirty="0">
                 <a:solidFill>
                   <a:schemeClr val="accent6">
                     <a:lumMod val="75000"/>
                   </a:schemeClr>
                 </a:solidFill>
-              </a:rPr>
-              <a:t>JsonAddressBook</a:t>
-            </a:r>
-            <a:br>
-              <a:rPr lang="en-US" sz="1050" b="1" dirty="0">
+              </a:endParaRPr>
+            </a:p>
+          </p:txBody>
+        </p:sp>
+        <p:sp>
+          <p:nvSpPr>
+            <p:cNvPr id="68" name="Rectangle 8">
+              <a:extLst>
+                <a:ext uri="{FF2B5EF4-FFF2-40B4-BE49-F238E27FC236}">
+                  <a16:creationId xmlns:a16="http://schemas.microsoft.com/office/drawing/2014/main" id="{D9A76FDE-EEDD-4EAB-ADB4-975E216AFBF4}"/>
+                </a:ext>
+              </a:extLst>
+            </p:cNvPr>
+            <p:cNvSpPr/>
+            <p:nvPr/>
+          </p:nvSpPr>
+          <p:spPr>
+            <a:xfrm>
+              <a:off x="6016228" y="1154783"/>
+              <a:ext cx="1200707" cy="346760"/>
+            </a:xfrm>
+            <a:prstGeom prst="rect">
+              <a:avLst/>
+            </a:prstGeom>
+            <a:ln w="19050"/>
+            <a:effectLst/>
+          </p:spPr>
+          <p:style>
+            <a:lnRef idx="1">
+              <a:schemeClr val="accent6"/>
+            </a:lnRef>
+            <a:fillRef idx="2">
+              <a:schemeClr val="accent6"/>
+            </a:fillRef>
+            <a:effectRef idx="1">
+              <a:schemeClr val="accent6"/>
+            </a:effectRef>
+            <a:fontRef idx="minor">
+              <a:schemeClr val="dk1"/>
+            </a:fontRef>
+          </p:style>
+          <p:txBody>
+            <a:bodyPr rtlCol="0" anchor="ctr"/>
+            <a:lstStyle/>
+            <a:p>
+              <a:pPr algn="ctr"/>
+              <a:r>
+                <a:rPr lang="en-US" sz="1050" b="1" dirty="0" err="1">
+                  <a:solidFill>
+                    <a:schemeClr val="accent6">
+                      <a:lumMod val="75000"/>
+                    </a:schemeClr>
+                  </a:solidFill>
+                </a:rPr>
+                <a:t>JsonSerializable</a:t>
+              </a:r>
+              <a:br>
+                <a:rPr lang="en-US" sz="1050" b="1" dirty="0">
+                  <a:solidFill>
+                    <a:schemeClr val="accent6">
+                      <a:lumMod val="75000"/>
+                    </a:schemeClr>
+                  </a:solidFill>
+                </a:rPr>
+              </a:br>
+              <a:r>
+                <a:rPr lang="en-US" sz="1050" b="1" dirty="0">
+                  <a:solidFill>
+                    <a:schemeClr val="accent6">
+                      <a:lumMod val="75000"/>
+                    </a:schemeClr>
+                  </a:solidFill>
+                </a:rPr>
+                <a:t>Statistics</a:t>
+              </a:r>
+              <a:endParaRPr lang="en-SG" sz="1050" b="1" dirty="0">
                 <a:solidFill>
                   <a:schemeClr val="accent6">
                     <a:lumMod val="75000"/>
                   </a:schemeClr>
                 </a:solidFill>
-              </a:rPr>
-            </a:br>
-            <a:r>
-              <a:rPr lang="en-US" sz="1050" b="1" dirty="0">
+              </a:endParaRPr>
+            </a:p>
+          </p:txBody>
+        </p:sp>
+        <p:sp>
+          <p:nvSpPr>
+            <p:cNvPr id="72" name="Rectangle 8">
+              <a:extLst>
+                <a:ext uri="{FF2B5EF4-FFF2-40B4-BE49-F238E27FC236}">
+                  <a16:creationId xmlns:a16="http://schemas.microsoft.com/office/drawing/2014/main" id="{761A066B-BFA5-4064-8240-7F9CDB47245C}"/>
+                </a:ext>
+              </a:extLst>
+            </p:cNvPr>
+            <p:cNvSpPr/>
+            <p:nvPr/>
+          </p:nvSpPr>
+          <p:spPr>
+            <a:xfrm>
+              <a:off x="7612165" y="1153997"/>
+              <a:ext cx="1381613" cy="346760"/>
+            </a:xfrm>
+            <a:prstGeom prst="rect">
+              <a:avLst/>
+            </a:prstGeom>
+            <a:ln w="19050"/>
+            <a:effectLst/>
+          </p:spPr>
+          <p:style>
+            <a:lnRef idx="1">
+              <a:schemeClr val="accent6"/>
+            </a:lnRef>
+            <a:fillRef idx="2">
+              <a:schemeClr val="accent6"/>
+            </a:fillRef>
+            <a:effectRef idx="1">
+              <a:schemeClr val="accent6"/>
+            </a:effectRef>
+            <a:fontRef idx="minor">
+              <a:schemeClr val="dk1"/>
+            </a:fontRef>
+          </p:style>
+          <p:txBody>
+            <a:bodyPr rtlCol="0" anchor="ctr"/>
+            <a:lstStyle/>
+            <a:p>
+              <a:pPr algn="ctr"/>
+              <a:r>
+                <a:rPr lang="en-US" sz="1030" b="1" dirty="0" err="1">
+                  <a:solidFill>
+                    <a:schemeClr val="accent6">
+                      <a:lumMod val="75000"/>
+                    </a:schemeClr>
+                  </a:solidFill>
+                </a:rPr>
+                <a:t>JsonAdaptedStatistics</a:t>
+              </a:r>
+              <a:endParaRPr lang="en-SG" sz="1030" b="1" dirty="0">
                 <a:solidFill>
                   <a:schemeClr val="accent6">
                     <a:lumMod val="75000"/>
                   </a:schemeClr>
                 </a:solidFill>
-              </a:rPr>
-              <a:t>Storage</a:t>
-            </a:r>
-            <a:endParaRPr lang="en-SG" sz="1050" b="1" dirty="0">
+              </a:endParaRPr>
+            </a:p>
+          </p:txBody>
+        </p:sp>
+        <p:cxnSp>
+          <p:nvCxnSpPr>
+            <p:cNvPr id="76" name="Elbow Connector 122">
+              <a:extLst>
+                <a:ext uri="{FF2B5EF4-FFF2-40B4-BE49-F238E27FC236}">
+                  <a16:creationId xmlns:a16="http://schemas.microsoft.com/office/drawing/2014/main" id="{2BFF2C97-DD15-4AFD-AACF-4F7663692D86}"/>
+                </a:ext>
+              </a:extLst>
+            </p:cNvPr>
+            <p:cNvCxnSpPr>
+              <a:cxnSpLocks/>
+              <a:stCxn id="68" idx="3"/>
+              <a:endCxn id="72" idx="1"/>
+            </p:cNvCxnSpPr>
+            <p:nvPr/>
+          </p:nvCxnSpPr>
+          <p:spPr>
+            <a:xfrm flipV="1">
+              <a:off x="7216935" y="1327377"/>
+              <a:ext cx="395230" cy="786"/>
+            </a:xfrm>
+            <a:prstGeom prst="bentConnector3">
+              <a:avLst>
+                <a:gd name="adj1" fmla="val 50000"/>
+              </a:avLst>
+            </a:prstGeom>
+            <a:ln w="19050">
+              <a:prstDash val="sysDot"/>
+              <a:headEnd type="none" w="med" len="med"/>
+              <a:tailEnd type="arrow" w="med" len="med"/>
+            </a:ln>
+            <a:effectLst/>
+          </p:spPr>
+          <p:style>
+            <a:lnRef idx="1">
+              <a:schemeClr val="accent6"/>
+            </a:lnRef>
+            <a:fillRef idx="2">
+              <a:schemeClr val="accent6"/>
+            </a:fillRef>
+            <a:effectRef idx="1">
+              <a:schemeClr val="accent6"/>
+            </a:effectRef>
+            <a:fontRef idx="minor">
+              <a:schemeClr val="dk1"/>
+            </a:fontRef>
+          </p:style>
+        </p:cxnSp>
+        <p:sp>
+          <p:nvSpPr>
+            <p:cNvPr id="104" name="Rectangle 8">
+              <a:extLst>
+                <a:ext uri="{FF2B5EF4-FFF2-40B4-BE49-F238E27FC236}">
+                  <a16:creationId xmlns:a16="http://schemas.microsoft.com/office/drawing/2014/main" id="{67B15D1B-414C-4F61-A8FB-AE6907129068}"/>
+                </a:ext>
+              </a:extLst>
+            </p:cNvPr>
+            <p:cNvSpPr/>
+            <p:nvPr/>
+          </p:nvSpPr>
+          <p:spPr>
+            <a:xfrm>
+              <a:off x="2873611" y="1962649"/>
+              <a:ext cx="1323049" cy="346760"/>
+            </a:xfrm>
+            <a:prstGeom prst="rect">
+              <a:avLst/>
+            </a:prstGeom>
+            <a:solidFill>
+              <a:schemeClr val="accent6">
+                <a:lumMod val="75000"/>
+              </a:schemeClr>
+            </a:solidFill>
+            <a:ln w="19050">
               <a:solidFill>
                 <a:schemeClr val="accent6">
                   <a:lumMod val="75000"/>
                 </a:schemeClr>
               </a:solidFill>
-            </a:endParaRPr>
-          </a:p>
-        </p:txBody>
-      </p:sp>
-      <p:sp>
-        <p:nvSpPr>
-          <p:cNvPr id="52" name="Rectangle 8"/>
-          <p:cNvSpPr/>
-          <p:nvPr/>
-        </p:nvSpPr>
-        <p:spPr>
-          <a:xfrm>
-            <a:off x="2873943" y="2558040"/>
-            <a:ext cx="1323049" cy="346760"/>
-          </a:xfrm>
-          <a:prstGeom prst="rect">
-            <a:avLst/>
-          </a:prstGeom>
-          <a:solidFill>
-            <a:schemeClr val="accent6">
-              <a:lumMod val="75000"/>
-            </a:schemeClr>
-          </a:solidFill>
-          <a:ln w="19050">
+            </a:ln>
+            <a:effectLst/>
+          </p:spPr>
+          <p:style>
+            <a:lnRef idx="1">
+              <a:schemeClr val="accent2"/>
+            </a:lnRef>
+            <a:fillRef idx="2">
+              <a:schemeClr val="accent2"/>
+            </a:fillRef>
+            <a:effectRef idx="1">
+              <a:schemeClr val="accent2"/>
+            </a:effectRef>
+            <a:fontRef idx="minor">
+              <a:schemeClr val="dk1"/>
+            </a:fontRef>
+          </p:style>
+          <p:txBody>
+            <a:bodyPr rtlCol="0" anchor="ctr"/>
+            <a:lstStyle/>
+            <a:p>
+              <a:pPr algn="ctr"/>
+              <a:r>
+                <a:rPr lang="en-US" sz="1050" dirty="0">
+                  <a:solidFill>
+                    <a:schemeClr val="bg1"/>
+                  </a:solidFill>
+                </a:rPr>
+                <a:t>&lt;&lt;interface&gt;&gt;</a:t>
+              </a:r>
+              <a:br>
+                <a:rPr lang="en-US" sz="1050" dirty="0">
+                  <a:solidFill>
+                    <a:schemeClr val="bg1"/>
+                  </a:solidFill>
+                </a:rPr>
+              </a:br>
+              <a:r>
+                <a:rPr lang="en-US" sz="1050" dirty="0" err="1">
+                  <a:solidFill>
+                    <a:schemeClr val="bg1"/>
+                  </a:solidFill>
+                </a:rPr>
+                <a:t>AddressBookStorage</a:t>
+              </a:r>
+              <a:endParaRPr lang="en-SG" sz="1050" dirty="0">
+                <a:solidFill>
+                  <a:schemeClr val="bg1"/>
+                </a:solidFill>
+              </a:endParaRPr>
+            </a:p>
+          </p:txBody>
+        </p:sp>
+        <p:cxnSp>
+          <p:nvCxnSpPr>
+            <p:cNvPr id="105" name="Straight Arrow Connector 104">
+              <a:extLst>
+                <a:ext uri="{FF2B5EF4-FFF2-40B4-BE49-F238E27FC236}">
+                  <a16:creationId xmlns:a16="http://schemas.microsoft.com/office/drawing/2014/main" id="{2657515C-596D-4A85-9B23-4A935EE8E140}"/>
+                </a:ext>
+              </a:extLst>
+            </p:cNvPr>
+            <p:cNvCxnSpPr>
+              <a:stCxn id="106" idx="3"/>
+              <a:endCxn id="104" idx="1"/>
+            </p:cNvCxnSpPr>
+            <p:nvPr/>
+          </p:nvCxnSpPr>
+          <p:spPr>
+            <a:xfrm>
+              <a:off x="2652801" y="2130745"/>
+              <a:ext cx="220810" cy="5284"/>
+            </a:xfrm>
+            <a:prstGeom prst="straightConnector1">
+              <a:avLst/>
+            </a:prstGeom>
+            <a:ln w="19050">
+              <a:solidFill>
+                <a:schemeClr val="accent6">
+                  <a:lumMod val="75000"/>
+                </a:schemeClr>
+              </a:solidFill>
+              <a:headEnd type="none" w="med" len="med"/>
+              <a:tailEnd type="arrow" w="med" len="med"/>
+            </a:ln>
+            <a:effectLst/>
+          </p:spPr>
+          <p:style>
+            <a:lnRef idx="1">
+              <a:schemeClr val="accent2"/>
+            </a:lnRef>
+            <a:fillRef idx="2">
+              <a:schemeClr val="accent2"/>
+            </a:fillRef>
+            <a:effectRef idx="1">
+              <a:schemeClr val="accent2"/>
+            </a:effectRef>
+            <a:fontRef idx="minor">
+              <a:schemeClr val="dk1"/>
+            </a:fontRef>
+          </p:style>
+        </p:cxnSp>
+        <p:sp>
+          <p:nvSpPr>
+            <p:cNvPr id="106" name="Flowchart: Decision 96">
+              <a:extLst>
+                <a:ext uri="{FF2B5EF4-FFF2-40B4-BE49-F238E27FC236}">
+                  <a16:creationId xmlns:a16="http://schemas.microsoft.com/office/drawing/2014/main" id="{AB89345C-B514-440E-8516-33AF5DE43F2B}"/>
+                </a:ext>
+              </a:extLst>
+            </p:cNvPr>
+            <p:cNvSpPr/>
+            <p:nvPr/>
+          </p:nvSpPr>
+          <p:spPr>
+            <a:xfrm>
+              <a:off x="2416753" y="2044055"/>
+              <a:ext cx="236048" cy="173380"/>
+            </a:xfrm>
+            <a:prstGeom prst="flowChartDecision">
+              <a:avLst/>
+            </a:prstGeom>
+            <a:noFill/>
+            <a:ln w="19050">
+              <a:solidFill>
+                <a:schemeClr val="accent6">
+                  <a:lumMod val="75000"/>
+                </a:schemeClr>
+              </a:solidFill>
+            </a:ln>
+            <a:effectLst/>
+          </p:spPr>
+          <p:style>
+            <a:lnRef idx="1">
+              <a:schemeClr val="accent2"/>
+            </a:lnRef>
+            <a:fillRef idx="2">
+              <a:schemeClr val="accent2"/>
+            </a:fillRef>
+            <a:effectRef idx="1">
+              <a:schemeClr val="accent2"/>
+            </a:effectRef>
+            <a:fontRef idx="minor">
+              <a:schemeClr val="dk1"/>
+            </a:fontRef>
+          </p:style>
+          <p:txBody>
+            <a:bodyPr rtlCol="0" anchor="ctr"/>
+            <a:lstStyle/>
+            <a:p>
+              <a:pPr algn="ctr"/>
+              <a:endParaRPr lang="en-US" sz="1050">
+                <a:solidFill>
+                  <a:schemeClr val="bg1"/>
+                </a:solidFill>
+              </a:endParaRPr>
+            </a:p>
+          </p:txBody>
+        </p:sp>
+        <p:cxnSp>
+          <p:nvCxnSpPr>
+            <p:cNvPr id="107" name="Elbow Connector 63">
+              <a:extLst>
+                <a:ext uri="{FF2B5EF4-FFF2-40B4-BE49-F238E27FC236}">
+                  <a16:creationId xmlns:a16="http://schemas.microsoft.com/office/drawing/2014/main" id="{64CD6CB5-AD77-43EC-B262-91F904E6A835}"/>
+                </a:ext>
+              </a:extLst>
+            </p:cNvPr>
+            <p:cNvCxnSpPr>
+              <a:stCxn id="108" idx="3"/>
+              <a:endCxn id="110" idx="1"/>
+            </p:cNvCxnSpPr>
+            <p:nvPr/>
+          </p:nvCxnSpPr>
+          <p:spPr>
+            <a:xfrm flipV="1">
+              <a:off x="4394471" y="2136026"/>
+              <a:ext cx="223322" cy="3"/>
+            </a:xfrm>
+            <a:prstGeom prst="bentConnector3">
+              <a:avLst>
+                <a:gd name="adj1" fmla="val 50000"/>
+              </a:avLst>
+            </a:prstGeom>
+            <a:ln w="19050">
+              <a:solidFill>
+                <a:schemeClr val="accent6">
+                  <a:lumMod val="75000"/>
+                </a:schemeClr>
+              </a:solidFill>
+              <a:prstDash val="sysDot"/>
+              <a:headEnd type="none" w="med" len="med"/>
+              <a:tailEnd type="none" w="med" len="med"/>
+            </a:ln>
+            <a:effectLst/>
+          </p:spPr>
+          <p:style>
+            <a:lnRef idx="1">
+              <a:schemeClr val="accent2"/>
+            </a:lnRef>
+            <a:fillRef idx="2">
+              <a:schemeClr val="accent2"/>
+            </a:fillRef>
+            <a:effectRef idx="1">
+              <a:schemeClr val="accent2"/>
+            </a:effectRef>
+            <a:fontRef idx="minor">
+              <a:schemeClr val="dk1"/>
+            </a:fontRef>
+          </p:style>
+        </p:cxnSp>
+        <p:sp>
+          <p:nvSpPr>
+            <p:cNvPr id="108" name="Isosceles Triangle 102">
+              <a:extLst>
+                <a:ext uri="{FF2B5EF4-FFF2-40B4-BE49-F238E27FC236}">
+                  <a16:creationId xmlns:a16="http://schemas.microsoft.com/office/drawing/2014/main" id="{7D0305CA-448A-41D0-BA0D-2ED0A1766859}"/>
+                </a:ext>
+              </a:extLst>
+            </p:cNvPr>
+            <p:cNvSpPr/>
+            <p:nvPr/>
+          </p:nvSpPr>
+          <p:spPr>
+            <a:xfrm rot="5400000" flipV="1">
+              <a:off x="4171457" y="2048267"/>
+              <a:ext cx="270504" cy="175523"/>
+            </a:xfrm>
+            <a:prstGeom prst="triangle">
+              <a:avLst/>
+            </a:prstGeom>
             <a:solidFill>
               <a:schemeClr val="accent6">
                 <a:lumMod val="75000"/>
               </a:schemeClr>
             </a:solidFill>
-          </a:ln>
-          <a:effectLst/>
-        </p:spPr>
-        <p:style>
-          <a:lnRef idx="1">
-            <a:schemeClr val="accent2"/>
-          </a:lnRef>
-          <a:fillRef idx="2">
-            <a:schemeClr val="accent2"/>
-          </a:fillRef>
-          <a:effectRef idx="1">
-            <a:schemeClr val="accent2"/>
-          </a:effectRef>
-          <a:fontRef idx="minor">
-            <a:schemeClr val="dk1"/>
-          </a:fontRef>
-        </p:style>
-        <p:txBody>
-          <a:bodyPr rtlCol="0" anchor="ctr"/>
-          <a:lstStyle/>
-          <a:p>
-            <a:pPr algn="ctr"/>
-            <a:r>
-              <a:rPr lang="en-US" sz="1050" dirty="0">
+            <a:ln w="19050">
+              <a:solidFill>
+                <a:schemeClr val="accent6">
+                  <a:lumMod val="75000"/>
+                </a:schemeClr>
+              </a:solidFill>
+            </a:ln>
+            <a:effectLst/>
+          </p:spPr>
+          <p:style>
+            <a:lnRef idx="1">
+              <a:schemeClr val="accent2"/>
+            </a:lnRef>
+            <a:fillRef idx="2">
+              <a:schemeClr val="accent2"/>
+            </a:fillRef>
+            <a:effectRef idx="1">
+              <a:schemeClr val="accent2"/>
+            </a:effectRef>
+            <a:fontRef idx="minor">
+              <a:schemeClr val="dk1"/>
+            </a:fontRef>
+          </p:style>
+          <p:txBody>
+            <a:bodyPr rtlCol="0" anchor="ctr"/>
+            <a:lstStyle/>
+            <a:p>
+              <a:pPr algn="ctr"/>
+              <a:endParaRPr lang="en-SG" sz="1050">
                 <a:solidFill>
                   <a:schemeClr val="bg1"/>
                 </a:solidFill>
-              </a:rPr>
-              <a:t>&lt;&lt;interface&gt;&gt;</a:t>
-            </a:r>
-            <a:br>
-              <a:rPr lang="en-US" sz="1050" dirty="0">
+              </a:endParaRPr>
+            </a:p>
+          </p:txBody>
+        </p:sp>
+        <p:cxnSp>
+          <p:nvCxnSpPr>
+            <p:cNvPr id="109" name="Elbow Connector 122">
+              <a:extLst>
+                <a:ext uri="{FF2B5EF4-FFF2-40B4-BE49-F238E27FC236}">
+                  <a16:creationId xmlns:a16="http://schemas.microsoft.com/office/drawing/2014/main" id="{5E8CA0F0-6AEF-4117-A247-B89FB6C6AFFE}"/>
+                </a:ext>
+              </a:extLst>
+            </p:cNvPr>
+            <p:cNvCxnSpPr>
+              <a:stCxn id="110" idx="3"/>
+              <a:endCxn id="111" idx="1"/>
+            </p:cNvCxnSpPr>
+            <p:nvPr/>
+          </p:nvCxnSpPr>
+          <p:spPr>
+            <a:xfrm>
+              <a:off x="5787628" y="2136026"/>
+              <a:ext cx="228600" cy="1970"/>
+            </a:xfrm>
+            <a:prstGeom prst="bentConnector3">
+              <a:avLst>
+                <a:gd name="adj1" fmla="val 50000"/>
+              </a:avLst>
+            </a:prstGeom>
+            <a:ln w="19050">
+              <a:solidFill>
+                <a:schemeClr val="accent6">
+                  <a:lumMod val="75000"/>
+                </a:schemeClr>
+              </a:solidFill>
+              <a:prstDash val="sysDot"/>
+              <a:headEnd type="none" w="med" len="med"/>
+              <a:tailEnd type="arrow" w="med" len="med"/>
+            </a:ln>
+            <a:effectLst/>
+          </p:spPr>
+          <p:style>
+            <a:lnRef idx="1">
+              <a:schemeClr val="accent2"/>
+            </a:lnRef>
+            <a:fillRef idx="2">
+              <a:schemeClr val="accent2"/>
+            </a:fillRef>
+            <a:effectRef idx="1">
+              <a:schemeClr val="accent2"/>
+            </a:effectRef>
+            <a:fontRef idx="minor">
+              <a:schemeClr val="dk1"/>
+            </a:fontRef>
+          </p:style>
+        </p:cxnSp>
+        <p:sp>
+          <p:nvSpPr>
+            <p:cNvPr id="110" name="Rectangle 8">
+              <a:extLst>
+                <a:ext uri="{FF2B5EF4-FFF2-40B4-BE49-F238E27FC236}">
+                  <a16:creationId xmlns:a16="http://schemas.microsoft.com/office/drawing/2014/main" id="{2C2EDDD5-8608-486B-8AF7-298EF77F6E3C}"/>
+                </a:ext>
+              </a:extLst>
+            </p:cNvPr>
+            <p:cNvSpPr/>
+            <p:nvPr/>
+          </p:nvSpPr>
+          <p:spPr>
+            <a:xfrm>
+              <a:off x="4617793" y="1962646"/>
+              <a:ext cx="1169835" cy="346760"/>
+            </a:xfrm>
+            <a:prstGeom prst="rect">
+              <a:avLst/>
+            </a:prstGeom>
+            <a:ln w="19050"/>
+            <a:effectLst/>
+          </p:spPr>
+          <p:style>
+            <a:lnRef idx="1">
+              <a:schemeClr val="accent6"/>
+            </a:lnRef>
+            <a:fillRef idx="2">
+              <a:schemeClr val="accent6"/>
+            </a:fillRef>
+            <a:effectRef idx="1">
+              <a:schemeClr val="accent6"/>
+            </a:effectRef>
+            <a:fontRef idx="minor">
+              <a:schemeClr val="dk1"/>
+            </a:fontRef>
+          </p:style>
+          <p:txBody>
+            <a:bodyPr rtlCol="0" anchor="ctr"/>
+            <a:lstStyle/>
+            <a:p>
+              <a:pPr algn="ctr"/>
+              <a:r>
+                <a:rPr lang="en-US" sz="1050" b="1" dirty="0" err="1">
+                  <a:solidFill>
+                    <a:schemeClr val="accent6">
+                      <a:lumMod val="75000"/>
+                    </a:schemeClr>
+                  </a:solidFill>
+                </a:rPr>
+                <a:t>JsonTable</a:t>
+              </a:r>
+              <a:br>
+                <a:rPr lang="en-US" sz="1050" b="1" dirty="0">
+                  <a:solidFill>
+                    <a:schemeClr val="accent6">
+                      <a:lumMod val="75000"/>
+                    </a:schemeClr>
+                  </a:solidFill>
+                </a:rPr>
+              </a:br>
+              <a:r>
+                <a:rPr lang="en-US" sz="1050" b="1" dirty="0">
+                  <a:solidFill>
+                    <a:schemeClr val="accent6">
+                      <a:lumMod val="75000"/>
+                    </a:schemeClr>
+                  </a:solidFill>
+                </a:rPr>
+                <a:t>Storage</a:t>
+              </a:r>
+              <a:endParaRPr lang="en-SG" sz="1050" b="1" dirty="0">
                 <a:solidFill>
-                  <a:schemeClr val="bg1"/>
+                  <a:schemeClr val="accent6">
+                    <a:lumMod val="75000"/>
+                  </a:schemeClr>
                 </a:solidFill>
-              </a:rPr>
-            </a:br>
-            <a:r>
-              <a:rPr lang="en-US" sz="1050" dirty="0" err="1">
+              </a:endParaRPr>
+            </a:p>
+          </p:txBody>
+        </p:sp>
+        <p:sp>
+          <p:nvSpPr>
+            <p:cNvPr id="111" name="Rectangle 8">
+              <a:extLst>
+                <a:ext uri="{FF2B5EF4-FFF2-40B4-BE49-F238E27FC236}">
+                  <a16:creationId xmlns:a16="http://schemas.microsoft.com/office/drawing/2014/main" id="{FF74BAE6-AD0F-4247-8097-0EDA6C1E7C1D}"/>
+                </a:ext>
+              </a:extLst>
+            </p:cNvPr>
+            <p:cNvSpPr/>
+            <p:nvPr/>
+          </p:nvSpPr>
+          <p:spPr>
+            <a:xfrm>
+              <a:off x="6016228" y="1964616"/>
+              <a:ext cx="1200707" cy="346760"/>
+            </a:xfrm>
+            <a:prstGeom prst="rect">
+              <a:avLst/>
+            </a:prstGeom>
+            <a:ln w="19050"/>
+            <a:effectLst/>
+          </p:spPr>
+          <p:style>
+            <a:lnRef idx="1">
+              <a:schemeClr val="accent6"/>
+            </a:lnRef>
+            <a:fillRef idx="2">
+              <a:schemeClr val="accent6"/>
+            </a:fillRef>
+            <a:effectRef idx="1">
+              <a:schemeClr val="accent6"/>
+            </a:effectRef>
+            <a:fontRef idx="minor">
+              <a:schemeClr val="dk1"/>
+            </a:fontRef>
+          </p:style>
+          <p:txBody>
+            <a:bodyPr rtlCol="0" anchor="ctr"/>
+            <a:lstStyle/>
+            <a:p>
+              <a:pPr algn="ctr"/>
+              <a:r>
+                <a:rPr lang="en-US" sz="1050" b="1" dirty="0" err="1">
+                  <a:solidFill>
+                    <a:schemeClr val="accent6">
+                      <a:lumMod val="75000"/>
+                    </a:schemeClr>
+                  </a:solidFill>
+                </a:rPr>
+                <a:t>JsonSerializable</a:t>
+              </a:r>
+              <a:br>
+                <a:rPr lang="en-US" sz="1050" b="1" dirty="0">
+                  <a:solidFill>
+                    <a:schemeClr val="accent6">
+                      <a:lumMod val="75000"/>
+                    </a:schemeClr>
+                  </a:solidFill>
+                </a:rPr>
+              </a:br>
+              <a:r>
+                <a:rPr lang="en-US" sz="1050" b="1" dirty="0">
+                  <a:solidFill>
+                    <a:schemeClr val="accent6">
+                      <a:lumMod val="75000"/>
+                    </a:schemeClr>
+                  </a:solidFill>
+                </a:rPr>
+                <a:t>Table</a:t>
+              </a:r>
+              <a:endParaRPr lang="en-SG" sz="1050" b="1" dirty="0">
                 <a:solidFill>
-                  <a:schemeClr val="bg1"/>
+                  <a:schemeClr val="accent6">
+                    <a:lumMod val="75000"/>
+                  </a:schemeClr>
                 </a:solidFill>
-              </a:rPr>
-              <a:t>UserPrefsStorage</a:t>
-            </a:r>
-            <a:endParaRPr lang="en-SG" sz="1050" dirty="0">
-              <a:solidFill>
-                <a:schemeClr val="bg1"/>
-              </a:solidFill>
-            </a:endParaRPr>
-          </a:p>
-        </p:txBody>
-      </p:sp>
-      <p:cxnSp>
-        <p:nvCxnSpPr>
-          <p:cNvPr id="54" name="Straight Arrow Connector 53"/>
-          <p:cNvCxnSpPr>
-            <a:stCxn id="56" idx="3"/>
-            <a:endCxn id="52" idx="1"/>
-          </p:cNvCxnSpPr>
-          <p:nvPr/>
-        </p:nvCxnSpPr>
-        <p:spPr>
-          <a:xfrm>
-            <a:off x="2653133" y="2726136"/>
-            <a:ext cx="220810" cy="5284"/>
-          </a:xfrm>
-          <a:prstGeom prst="straightConnector1">
-            <a:avLst/>
-          </a:prstGeom>
-          <a:ln w="19050">
+              </a:endParaRPr>
+            </a:p>
+          </p:txBody>
+        </p:sp>
+        <p:sp>
+          <p:nvSpPr>
+            <p:cNvPr id="114" name="Rectangle 8">
+              <a:extLst>
+                <a:ext uri="{FF2B5EF4-FFF2-40B4-BE49-F238E27FC236}">
+                  <a16:creationId xmlns:a16="http://schemas.microsoft.com/office/drawing/2014/main" id="{5CD5A744-0904-497B-8221-F5F3D92D0CD3}"/>
+                </a:ext>
+              </a:extLst>
+            </p:cNvPr>
+            <p:cNvSpPr/>
+            <p:nvPr/>
+          </p:nvSpPr>
+          <p:spPr>
+            <a:xfrm>
+              <a:off x="7612166" y="1963830"/>
+              <a:ext cx="1259718" cy="346760"/>
+            </a:xfrm>
+            <a:prstGeom prst="rect">
+              <a:avLst/>
+            </a:prstGeom>
+            <a:ln w="19050"/>
+            <a:effectLst/>
+          </p:spPr>
+          <p:style>
+            <a:lnRef idx="1">
+              <a:schemeClr val="accent6"/>
+            </a:lnRef>
+            <a:fillRef idx="2">
+              <a:schemeClr val="accent6"/>
+            </a:fillRef>
+            <a:effectRef idx="1">
+              <a:schemeClr val="accent6"/>
+            </a:effectRef>
+            <a:fontRef idx="minor">
+              <a:schemeClr val="dk1"/>
+            </a:fontRef>
+          </p:style>
+          <p:txBody>
+            <a:bodyPr rtlCol="0" anchor="ctr"/>
+            <a:lstStyle/>
+            <a:p>
+              <a:pPr algn="ctr"/>
+              <a:r>
+                <a:rPr lang="en-US" sz="1030" b="1" dirty="0" err="1">
+                  <a:solidFill>
+                    <a:schemeClr val="accent6">
+                      <a:lumMod val="75000"/>
+                    </a:schemeClr>
+                  </a:solidFill>
+                </a:rPr>
+                <a:t>JsonAdaptedTable</a:t>
+              </a:r>
+              <a:endParaRPr lang="en-SG" sz="1030" b="1" dirty="0">
+                <a:solidFill>
+                  <a:schemeClr val="accent6">
+                    <a:lumMod val="75000"/>
+                  </a:schemeClr>
+                </a:solidFill>
+              </a:endParaRPr>
+            </a:p>
+          </p:txBody>
+        </p:sp>
+        <p:cxnSp>
+          <p:nvCxnSpPr>
+            <p:cNvPr id="115" name="Elbow Connector 122">
+              <a:extLst>
+                <a:ext uri="{FF2B5EF4-FFF2-40B4-BE49-F238E27FC236}">
+                  <a16:creationId xmlns:a16="http://schemas.microsoft.com/office/drawing/2014/main" id="{727C1BE8-E1EB-4ED6-8A64-E0C428B8E359}"/>
+                </a:ext>
+              </a:extLst>
+            </p:cNvPr>
+            <p:cNvCxnSpPr>
+              <a:cxnSpLocks/>
+              <a:stCxn id="111" idx="3"/>
+              <a:endCxn id="114" idx="1"/>
+            </p:cNvCxnSpPr>
+            <p:nvPr/>
+          </p:nvCxnSpPr>
+          <p:spPr>
+            <a:xfrm flipV="1">
+              <a:off x="7216935" y="2137210"/>
+              <a:ext cx="395231" cy="786"/>
+            </a:xfrm>
+            <a:prstGeom prst="bentConnector3">
+              <a:avLst>
+                <a:gd name="adj1" fmla="val 50000"/>
+              </a:avLst>
+            </a:prstGeom>
+            <a:ln w="19050">
+              <a:prstDash val="sysDot"/>
+              <a:headEnd type="none" w="med" len="med"/>
+              <a:tailEnd type="arrow" w="med" len="med"/>
+            </a:ln>
+            <a:effectLst/>
+          </p:spPr>
+          <p:style>
+            <a:lnRef idx="1">
+              <a:schemeClr val="accent6"/>
+            </a:lnRef>
+            <a:fillRef idx="2">
+              <a:schemeClr val="accent6"/>
+            </a:fillRef>
+            <a:effectRef idx="1">
+              <a:schemeClr val="accent6"/>
+            </a:effectRef>
+            <a:fontRef idx="minor">
+              <a:schemeClr val="dk1"/>
+            </a:fontRef>
+          </p:style>
+        </p:cxnSp>
+        <p:sp>
+          <p:nvSpPr>
+            <p:cNvPr id="116" name="Rectangle 8">
+              <a:extLst>
+                <a:ext uri="{FF2B5EF4-FFF2-40B4-BE49-F238E27FC236}">
+                  <a16:creationId xmlns:a16="http://schemas.microsoft.com/office/drawing/2014/main" id="{CA073D42-6F74-4B55-81D6-6E9DA449C158}"/>
+                </a:ext>
+              </a:extLst>
+            </p:cNvPr>
+            <p:cNvSpPr/>
+            <p:nvPr/>
+          </p:nvSpPr>
+          <p:spPr>
+            <a:xfrm>
+              <a:off x="2873611" y="3772965"/>
+              <a:ext cx="1323049" cy="346760"/>
+            </a:xfrm>
+            <a:prstGeom prst="rect">
+              <a:avLst/>
+            </a:prstGeom>
             <a:solidFill>
               <a:schemeClr val="accent6">
                 <a:lumMod val="75000"/>
               </a:schemeClr>
             </a:solidFill>
-            <a:headEnd type="none" w="med" len="med"/>
-            <a:tailEnd type="arrow" w="med" len="med"/>
-          </a:ln>
-          <a:effectLst/>
-        </p:spPr>
-        <p:style>
-          <a:lnRef idx="1">
-            <a:schemeClr val="accent2"/>
-          </a:lnRef>
-          <a:fillRef idx="2">
-            <a:schemeClr val="accent2"/>
-          </a:fillRef>
-          <a:effectRef idx="1">
-            <a:schemeClr val="accent2"/>
-          </a:effectRef>
-          <a:fontRef idx="minor">
-            <a:schemeClr val="dk1"/>
-          </a:fontRef>
-        </p:style>
-      </p:cxnSp>
-      <p:sp>
-        <p:nvSpPr>
-          <p:cNvPr id="56" name="Flowchart: Decision 96"/>
-          <p:cNvSpPr/>
-          <p:nvPr/>
-        </p:nvSpPr>
-        <p:spPr>
-          <a:xfrm>
-            <a:off x="2417085" y="2639446"/>
-            <a:ext cx="236048" cy="173380"/>
-          </a:xfrm>
-          <a:prstGeom prst="flowChartDecision">
-            <a:avLst/>
-          </a:prstGeom>
-          <a:noFill/>
-          <a:ln w="19050">
+            <a:ln w="19050">
+              <a:solidFill>
+                <a:schemeClr val="accent6">
+                  <a:lumMod val="75000"/>
+                </a:schemeClr>
+              </a:solidFill>
+            </a:ln>
+            <a:effectLst/>
+          </p:spPr>
+          <p:style>
+            <a:lnRef idx="1">
+              <a:schemeClr val="accent2"/>
+            </a:lnRef>
+            <a:fillRef idx="2">
+              <a:schemeClr val="accent2"/>
+            </a:fillRef>
+            <a:effectRef idx="1">
+              <a:schemeClr val="accent2"/>
+            </a:effectRef>
+            <a:fontRef idx="minor">
+              <a:schemeClr val="dk1"/>
+            </a:fontRef>
+          </p:style>
+          <p:txBody>
+            <a:bodyPr rtlCol="0" anchor="ctr"/>
+            <a:lstStyle/>
+            <a:p>
+              <a:pPr algn="ctr"/>
+              <a:r>
+                <a:rPr lang="en-US" sz="1050" dirty="0">
+                  <a:solidFill>
+                    <a:schemeClr val="bg1"/>
+                  </a:solidFill>
+                </a:rPr>
+                <a:t>&lt;&lt;interface&gt;&gt;</a:t>
+              </a:r>
+              <a:br>
+                <a:rPr lang="en-US" sz="1050" dirty="0">
+                  <a:solidFill>
+                    <a:schemeClr val="bg1"/>
+                  </a:solidFill>
+                </a:rPr>
+              </a:br>
+              <a:r>
+                <a:rPr lang="en-US" sz="1050" dirty="0" err="1">
+                  <a:solidFill>
+                    <a:schemeClr val="bg1"/>
+                  </a:solidFill>
+                </a:rPr>
+                <a:t>MenuStorage</a:t>
+              </a:r>
+              <a:endParaRPr lang="en-SG" sz="1050" dirty="0">
+                <a:solidFill>
+                  <a:schemeClr val="bg1"/>
+                </a:solidFill>
+              </a:endParaRPr>
+            </a:p>
+          </p:txBody>
+        </p:sp>
+        <p:cxnSp>
+          <p:nvCxnSpPr>
+            <p:cNvPr id="117" name="Straight Arrow Connector 116">
+              <a:extLst>
+                <a:ext uri="{FF2B5EF4-FFF2-40B4-BE49-F238E27FC236}">
+                  <a16:creationId xmlns:a16="http://schemas.microsoft.com/office/drawing/2014/main" id="{7C10D355-99D2-4FB3-81F1-20CAF130CE02}"/>
+                </a:ext>
+              </a:extLst>
+            </p:cNvPr>
+            <p:cNvCxnSpPr>
+              <a:stCxn id="121" idx="3"/>
+              <a:endCxn id="116" idx="1"/>
+            </p:cNvCxnSpPr>
+            <p:nvPr/>
+          </p:nvCxnSpPr>
+          <p:spPr>
+            <a:xfrm>
+              <a:off x="2652801" y="3941061"/>
+              <a:ext cx="220810" cy="5284"/>
+            </a:xfrm>
+            <a:prstGeom prst="straightConnector1">
+              <a:avLst/>
+            </a:prstGeom>
+            <a:ln w="19050">
+              <a:solidFill>
+                <a:schemeClr val="accent6">
+                  <a:lumMod val="75000"/>
+                </a:schemeClr>
+              </a:solidFill>
+              <a:headEnd type="none" w="med" len="med"/>
+              <a:tailEnd type="arrow" w="med" len="med"/>
+            </a:ln>
+            <a:effectLst/>
+          </p:spPr>
+          <p:style>
+            <a:lnRef idx="1">
+              <a:schemeClr val="accent2"/>
+            </a:lnRef>
+            <a:fillRef idx="2">
+              <a:schemeClr val="accent2"/>
+            </a:fillRef>
+            <a:effectRef idx="1">
+              <a:schemeClr val="accent2"/>
+            </a:effectRef>
+            <a:fontRef idx="minor">
+              <a:schemeClr val="dk1"/>
+            </a:fontRef>
+          </p:style>
+        </p:cxnSp>
+        <p:sp>
+          <p:nvSpPr>
+            <p:cNvPr id="121" name="Flowchart: Decision 96">
+              <a:extLst>
+                <a:ext uri="{FF2B5EF4-FFF2-40B4-BE49-F238E27FC236}">
+                  <a16:creationId xmlns:a16="http://schemas.microsoft.com/office/drawing/2014/main" id="{D74CD88A-4943-451F-8A65-2C8209E3F110}"/>
+                </a:ext>
+              </a:extLst>
+            </p:cNvPr>
+            <p:cNvSpPr/>
+            <p:nvPr/>
+          </p:nvSpPr>
+          <p:spPr>
+            <a:xfrm>
+              <a:off x="2416753" y="3854371"/>
+              <a:ext cx="236048" cy="173380"/>
+            </a:xfrm>
+            <a:prstGeom prst="flowChartDecision">
+              <a:avLst/>
+            </a:prstGeom>
+            <a:noFill/>
+            <a:ln w="19050">
+              <a:solidFill>
+                <a:schemeClr val="accent6">
+                  <a:lumMod val="75000"/>
+                </a:schemeClr>
+              </a:solidFill>
+            </a:ln>
+            <a:effectLst/>
+          </p:spPr>
+          <p:style>
+            <a:lnRef idx="1">
+              <a:schemeClr val="accent2"/>
+            </a:lnRef>
+            <a:fillRef idx="2">
+              <a:schemeClr val="accent2"/>
+            </a:fillRef>
+            <a:effectRef idx="1">
+              <a:schemeClr val="accent2"/>
+            </a:effectRef>
+            <a:fontRef idx="minor">
+              <a:schemeClr val="dk1"/>
+            </a:fontRef>
+          </p:style>
+          <p:txBody>
+            <a:bodyPr rtlCol="0" anchor="ctr"/>
+            <a:lstStyle/>
+            <a:p>
+              <a:pPr algn="ctr"/>
+              <a:endParaRPr lang="en-US" sz="1050">
+                <a:solidFill>
+                  <a:schemeClr val="bg1"/>
+                </a:solidFill>
+              </a:endParaRPr>
+            </a:p>
+          </p:txBody>
+        </p:sp>
+        <p:cxnSp>
+          <p:nvCxnSpPr>
+            <p:cNvPr id="122" name="Elbow Connector 63">
+              <a:extLst>
+                <a:ext uri="{FF2B5EF4-FFF2-40B4-BE49-F238E27FC236}">
+                  <a16:creationId xmlns:a16="http://schemas.microsoft.com/office/drawing/2014/main" id="{EA627310-CC1F-4987-A783-5008E32D3425}"/>
+                </a:ext>
+              </a:extLst>
+            </p:cNvPr>
+            <p:cNvCxnSpPr>
+              <a:cxnSpLocks/>
+              <a:stCxn id="123" idx="3"/>
+              <a:endCxn id="126" idx="1"/>
+            </p:cNvCxnSpPr>
+            <p:nvPr/>
+          </p:nvCxnSpPr>
+          <p:spPr>
+            <a:xfrm flipV="1">
+              <a:off x="4394471" y="3946342"/>
+              <a:ext cx="223322" cy="3"/>
+            </a:xfrm>
+            <a:prstGeom prst="bentConnector3">
+              <a:avLst>
+                <a:gd name="adj1" fmla="val 50000"/>
+              </a:avLst>
+            </a:prstGeom>
+            <a:ln w="19050">
+              <a:solidFill>
+                <a:schemeClr val="accent6">
+                  <a:lumMod val="75000"/>
+                </a:schemeClr>
+              </a:solidFill>
+              <a:prstDash val="sysDot"/>
+              <a:headEnd type="none" w="med" len="med"/>
+              <a:tailEnd type="none" w="med" len="med"/>
+            </a:ln>
+            <a:effectLst/>
+          </p:spPr>
+          <p:style>
+            <a:lnRef idx="1">
+              <a:schemeClr val="accent2"/>
+            </a:lnRef>
+            <a:fillRef idx="2">
+              <a:schemeClr val="accent2"/>
+            </a:fillRef>
+            <a:effectRef idx="1">
+              <a:schemeClr val="accent2"/>
+            </a:effectRef>
+            <a:fontRef idx="minor">
+              <a:schemeClr val="dk1"/>
+            </a:fontRef>
+          </p:style>
+        </p:cxnSp>
+        <p:sp>
+          <p:nvSpPr>
+            <p:cNvPr id="123" name="Isosceles Triangle 102">
+              <a:extLst>
+                <a:ext uri="{FF2B5EF4-FFF2-40B4-BE49-F238E27FC236}">
+                  <a16:creationId xmlns:a16="http://schemas.microsoft.com/office/drawing/2014/main" id="{AF1D22DD-78B0-441D-8B05-18C64901A82D}"/>
+                </a:ext>
+              </a:extLst>
+            </p:cNvPr>
+            <p:cNvSpPr/>
+            <p:nvPr/>
+          </p:nvSpPr>
+          <p:spPr>
+            <a:xfrm rot="5400000" flipV="1">
+              <a:off x="4171457" y="3858583"/>
+              <a:ext cx="270504" cy="175523"/>
+            </a:xfrm>
+            <a:prstGeom prst="triangle">
+              <a:avLst/>
+            </a:prstGeom>
             <a:solidFill>
               <a:schemeClr val="accent6">
                 <a:lumMod val="75000"/>
               </a:schemeClr>
             </a:solidFill>
-          </a:ln>
-          <a:effectLst/>
-        </p:spPr>
-        <p:style>
-          <a:lnRef idx="1">
-            <a:schemeClr val="accent2"/>
-          </a:lnRef>
-          <a:fillRef idx="2">
-            <a:schemeClr val="accent2"/>
-          </a:fillRef>
-          <a:effectRef idx="1">
-            <a:schemeClr val="accent2"/>
-          </a:effectRef>
-          <a:fontRef idx="minor">
-            <a:schemeClr val="dk1"/>
-          </a:fontRef>
-        </p:style>
-        <p:txBody>
-          <a:bodyPr rtlCol="0" anchor="ctr"/>
-          <a:lstStyle/>
-          <a:p>
-            <a:pPr algn="ctr"/>
-            <a:endParaRPr lang="en-US" sz="1050">
+            <a:ln w="19050">
               <a:solidFill>
-                <a:schemeClr val="bg1"/>
+                <a:schemeClr val="accent6">
+                  <a:lumMod val="75000"/>
+                </a:schemeClr>
               </a:solidFill>
-            </a:endParaRPr>
-          </a:p>
-        </p:txBody>
-      </p:sp>
-      <p:cxnSp>
-        <p:nvCxnSpPr>
-          <p:cNvPr id="60" name="Elbow Connector 63"/>
-          <p:cNvCxnSpPr>
-            <a:stCxn id="61" idx="3"/>
-            <a:endCxn id="65" idx="1"/>
-          </p:cNvCxnSpPr>
-          <p:nvPr/>
-        </p:nvCxnSpPr>
-        <p:spPr>
-          <a:xfrm flipV="1">
-            <a:off x="4394804" y="2731420"/>
-            <a:ext cx="223324" cy="1"/>
-          </a:xfrm>
-          <a:prstGeom prst="bentConnector3">
-            <a:avLst>
-              <a:gd name="adj1" fmla="val 50000"/>
-            </a:avLst>
-          </a:prstGeom>
-          <a:ln w="19050">
-            <a:solidFill>
-              <a:schemeClr val="accent6">
-                <a:lumMod val="75000"/>
-              </a:schemeClr>
-            </a:solidFill>
-            <a:prstDash val="sysDot"/>
-            <a:headEnd type="none" w="med" len="med"/>
-            <a:tailEnd type="none" w="med" len="med"/>
-          </a:ln>
-          <a:effectLst/>
-        </p:spPr>
-        <p:style>
-          <a:lnRef idx="1">
-            <a:schemeClr val="accent2"/>
-          </a:lnRef>
-          <a:fillRef idx="2">
-            <a:schemeClr val="accent2"/>
-          </a:fillRef>
-          <a:effectRef idx="1">
-            <a:schemeClr val="accent2"/>
-          </a:effectRef>
-          <a:fontRef idx="minor">
-            <a:schemeClr val="dk1"/>
-          </a:fontRef>
-        </p:style>
-      </p:cxnSp>
-      <p:sp>
-        <p:nvSpPr>
-          <p:cNvPr id="61" name="Isosceles Triangle 102"/>
-          <p:cNvSpPr/>
-          <p:nvPr/>
-        </p:nvSpPr>
-        <p:spPr>
-          <a:xfrm rot="5400000" flipV="1">
-            <a:off x="4171790" y="2643659"/>
-            <a:ext cx="270504" cy="175523"/>
-          </a:xfrm>
-          <a:prstGeom prst="triangle">
-            <a:avLst/>
-          </a:prstGeom>
-          <a:solidFill>
-            <a:schemeClr val="accent6">
-              <a:lumMod val="75000"/>
-            </a:schemeClr>
-          </a:solidFill>
-          <a:ln w="19050">
-            <a:solidFill>
-              <a:schemeClr val="accent6">
-                <a:lumMod val="75000"/>
-              </a:schemeClr>
-            </a:solidFill>
-          </a:ln>
-          <a:effectLst/>
-        </p:spPr>
-        <p:style>
-          <a:lnRef idx="1">
-            <a:schemeClr val="accent2"/>
-          </a:lnRef>
-          <a:fillRef idx="2">
-            <a:schemeClr val="accent2"/>
-          </a:fillRef>
-          <a:effectRef idx="1">
-            <a:schemeClr val="accent2"/>
-          </a:effectRef>
-          <a:fontRef idx="minor">
-            <a:schemeClr val="dk1"/>
-          </a:fontRef>
-        </p:style>
-        <p:txBody>
-          <a:bodyPr rtlCol="0" anchor="ctr"/>
-          <a:lstStyle/>
-          <a:p>
-            <a:pPr algn="ctr"/>
-            <a:endParaRPr lang="en-SG" sz="1050">
-              <a:solidFill>
-                <a:schemeClr val="bg1"/>
-              </a:solidFill>
-            </a:endParaRPr>
-          </a:p>
-        </p:txBody>
-      </p:sp>
-      <p:sp>
-        <p:nvSpPr>
-          <p:cNvPr id="65" name="Rectangle 8"/>
-          <p:cNvSpPr/>
-          <p:nvPr/>
-        </p:nvSpPr>
-        <p:spPr>
-          <a:xfrm>
-            <a:off x="4618128" y="2558040"/>
-            <a:ext cx="1093635" cy="346760"/>
-          </a:xfrm>
-          <a:prstGeom prst="rect">
-            <a:avLst/>
-          </a:prstGeom>
-          <a:solidFill>
-            <a:schemeClr val="accent6">
-              <a:lumMod val="75000"/>
-            </a:schemeClr>
-          </a:solidFill>
-          <a:ln w="19050">
-            <a:solidFill>
-              <a:schemeClr val="accent6">
-                <a:lumMod val="75000"/>
-              </a:schemeClr>
-            </a:solidFill>
-          </a:ln>
-          <a:effectLst/>
-        </p:spPr>
-        <p:style>
-          <a:lnRef idx="1">
-            <a:schemeClr val="accent2"/>
-          </a:lnRef>
-          <a:fillRef idx="2">
-            <a:schemeClr val="accent2"/>
-          </a:fillRef>
-          <a:effectRef idx="1">
-            <a:schemeClr val="accent2"/>
-          </a:effectRef>
-          <a:fontRef idx="minor">
-            <a:schemeClr val="dk1"/>
-          </a:fontRef>
-        </p:style>
-        <p:txBody>
-          <a:bodyPr rtlCol="0" anchor="ctr"/>
-          <a:lstStyle/>
-          <a:p>
-            <a:pPr algn="ctr"/>
-            <a:r>
-              <a:rPr lang="en-US" sz="1050" dirty="0" err="1">
+            </a:ln>
+            <a:effectLst/>
+          </p:spPr>
+          <p:style>
+            <a:lnRef idx="1">
+              <a:schemeClr val="accent2"/>
+            </a:lnRef>
+            <a:fillRef idx="2">
+              <a:schemeClr val="accent2"/>
+            </a:fillRef>
+            <a:effectRef idx="1">
+              <a:schemeClr val="accent2"/>
+            </a:effectRef>
+            <a:fontRef idx="minor">
+              <a:schemeClr val="dk1"/>
+            </a:fontRef>
+          </p:style>
+          <p:txBody>
+            <a:bodyPr rtlCol="0" anchor="ctr"/>
+            <a:lstStyle/>
+            <a:p>
+              <a:pPr algn="ctr"/>
+              <a:endParaRPr lang="en-SG" sz="1050">
                 <a:solidFill>
                   <a:schemeClr val="bg1"/>
                 </a:solidFill>
-              </a:rPr>
-              <a:t>JsonUserPrefs</a:t>
-            </a:r>
-            <a:br>
-              <a:rPr lang="en-US" sz="1050" dirty="0">
-                <a:solidFill>
-                  <a:schemeClr val="bg1"/>
-                </a:solidFill>
-              </a:rPr>
-            </a:br>
-            <a:r>
-              <a:rPr lang="en-US" sz="1050" dirty="0">
-                <a:solidFill>
-                  <a:schemeClr val="bg1"/>
-                </a:solidFill>
-              </a:rPr>
-              <a:t>Storage</a:t>
-            </a:r>
-            <a:endParaRPr lang="en-SG" sz="1050" dirty="0">
+              </a:endParaRPr>
+            </a:p>
+          </p:txBody>
+        </p:sp>
+        <p:cxnSp>
+          <p:nvCxnSpPr>
+            <p:cNvPr id="125" name="Elbow Connector 122">
+              <a:extLst>
+                <a:ext uri="{FF2B5EF4-FFF2-40B4-BE49-F238E27FC236}">
+                  <a16:creationId xmlns:a16="http://schemas.microsoft.com/office/drawing/2014/main" id="{B544C282-03A8-4E45-BE98-22CF1272F2D7}"/>
+                </a:ext>
+              </a:extLst>
+            </p:cNvPr>
+            <p:cNvCxnSpPr>
+              <a:stCxn id="126" idx="3"/>
+              <a:endCxn id="127" idx="1"/>
+            </p:cNvCxnSpPr>
+            <p:nvPr/>
+          </p:nvCxnSpPr>
+          <p:spPr>
+            <a:xfrm>
+              <a:off x="5787628" y="3946342"/>
+              <a:ext cx="228600" cy="1970"/>
+            </a:xfrm>
+            <a:prstGeom prst="bentConnector3">
+              <a:avLst>
+                <a:gd name="adj1" fmla="val 50000"/>
+              </a:avLst>
+            </a:prstGeom>
+            <a:ln w="19050">
               <a:solidFill>
-                <a:schemeClr val="bg1"/>
+                <a:schemeClr val="accent6">
+                  <a:lumMod val="75000"/>
+                </a:schemeClr>
               </a:solidFill>
-            </a:endParaRPr>
-          </a:p>
-        </p:txBody>
-      </p:sp>
-      <p:sp>
-        <p:nvSpPr>
-          <p:cNvPr id="66" name="Rectangle 8"/>
-          <p:cNvSpPr/>
-          <p:nvPr/>
-        </p:nvSpPr>
-        <p:spPr>
-          <a:xfrm>
-            <a:off x="6019800" y="3160410"/>
-            <a:ext cx="1200707" cy="346760"/>
-          </a:xfrm>
-          <a:prstGeom prst="rect">
-            <a:avLst/>
-          </a:prstGeom>
-          <a:ln w="19050"/>
-          <a:effectLst/>
-        </p:spPr>
-        <p:style>
-          <a:lnRef idx="1">
-            <a:schemeClr val="accent6"/>
-          </a:lnRef>
-          <a:fillRef idx="2">
-            <a:schemeClr val="accent6"/>
-          </a:fillRef>
-          <a:effectRef idx="1">
-            <a:schemeClr val="accent6"/>
-          </a:effectRef>
-          <a:fontRef idx="minor">
-            <a:schemeClr val="dk1"/>
-          </a:fontRef>
-        </p:style>
-        <p:txBody>
-          <a:bodyPr rtlCol="0" anchor="ctr"/>
-          <a:lstStyle/>
-          <a:p>
-            <a:pPr algn="ctr"/>
-            <a:r>
-              <a:rPr lang="en-US" sz="1050" b="1" dirty="0" err="1">
+              <a:prstDash val="sysDot"/>
+              <a:headEnd type="none" w="med" len="med"/>
+              <a:tailEnd type="arrow" w="med" len="med"/>
+            </a:ln>
+            <a:effectLst/>
+          </p:spPr>
+          <p:style>
+            <a:lnRef idx="1">
+              <a:schemeClr val="accent2"/>
+            </a:lnRef>
+            <a:fillRef idx="2">
+              <a:schemeClr val="accent2"/>
+            </a:fillRef>
+            <a:effectRef idx="1">
+              <a:schemeClr val="accent2"/>
+            </a:effectRef>
+            <a:fontRef idx="minor">
+              <a:schemeClr val="dk1"/>
+            </a:fontRef>
+          </p:style>
+        </p:cxnSp>
+        <p:sp>
+          <p:nvSpPr>
+            <p:cNvPr id="126" name="Rectangle 8">
+              <a:extLst>
+                <a:ext uri="{FF2B5EF4-FFF2-40B4-BE49-F238E27FC236}">
+                  <a16:creationId xmlns:a16="http://schemas.microsoft.com/office/drawing/2014/main" id="{1F1B19D8-58D7-4BE2-898A-3C98CADDE22E}"/>
+                </a:ext>
+              </a:extLst>
+            </p:cNvPr>
+            <p:cNvSpPr/>
+            <p:nvPr/>
+          </p:nvSpPr>
+          <p:spPr>
+            <a:xfrm>
+              <a:off x="4617793" y="3772962"/>
+              <a:ext cx="1169835" cy="346760"/>
+            </a:xfrm>
+            <a:prstGeom prst="rect">
+              <a:avLst/>
+            </a:prstGeom>
+            <a:ln w="19050"/>
+            <a:effectLst/>
+          </p:spPr>
+          <p:style>
+            <a:lnRef idx="1">
+              <a:schemeClr val="accent6"/>
+            </a:lnRef>
+            <a:fillRef idx="2">
+              <a:schemeClr val="accent6"/>
+            </a:fillRef>
+            <a:effectRef idx="1">
+              <a:schemeClr val="accent6"/>
+            </a:effectRef>
+            <a:fontRef idx="minor">
+              <a:schemeClr val="dk1"/>
+            </a:fontRef>
+          </p:style>
+          <p:txBody>
+            <a:bodyPr rtlCol="0" anchor="ctr"/>
+            <a:lstStyle/>
+            <a:p>
+              <a:pPr algn="ctr"/>
+              <a:r>
+                <a:rPr lang="en-US" sz="1050" b="1" dirty="0" err="1">
+                  <a:solidFill>
+                    <a:schemeClr val="accent6">
+                      <a:lumMod val="75000"/>
+                    </a:schemeClr>
+                  </a:solidFill>
+                </a:rPr>
+                <a:t>JsonMenu</a:t>
+              </a:r>
+              <a:endParaRPr lang="en-US" sz="1050" b="1" dirty="0">
                 <a:solidFill>
                   <a:schemeClr val="accent6">
                     <a:lumMod val="75000"/>
                   </a:schemeClr>
                 </a:solidFill>
-              </a:rPr>
-              <a:t>JsonSerializable</a:t>
-            </a:r>
-            <a:br>
-              <a:rPr lang="en-US" sz="1050" b="1" dirty="0">
+              </a:endParaRPr>
+            </a:p>
+            <a:p>
+              <a:pPr algn="ctr"/>
+              <a:r>
+                <a:rPr lang="en-US" sz="1050" b="1" dirty="0">
+                  <a:solidFill>
+                    <a:schemeClr val="accent6">
+                      <a:lumMod val="75000"/>
+                    </a:schemeClr>
+                  </a:solidFill>
+                </a:rPr>
+                <a:t>Storage</a:t>
+              </a:r>
+              <a:endParaRPr lang="en-SG" sz="1050" b="1" dirty="0">
                 <a:solidFill>
                   <a:schemeClr val="accent6">
                     <a:lumMod val="75000"/>
                   </a:schemeClr>
                 </a:solidFill>
-              </a:rPr>
-            </a:br>
-            <a:r>
-              <a:rPr lang="en-US" sz="1050" b="1" dirty="0" err="1">
+              </a:endParaRPr>
+            </a:p>
+          </p:txBody>
+        </p:sp>
+        <p:sp>
+          <p:nvSpPr>
+            <p:cNvPr id="127" name="Rectangle 8">
+              <a:extLst>
+                <a:ext uri="{FF2B5EF4-FFF2-40B4-BE49-F238E27FC236}">
+                  <a16:creationId xmlns:a16="http://schemas.microsoft.com/office/drawing/2014/main" id="{5FA5ACBC-4ACF-4E40-B67C-472B24E6C7D7}"/>
+                </a:ext>
+              </a:extLst>
+            </p:cNvPr>
+            <p:cNvSpPr/>
+            <p:nvPr/>
+          </p:nvSpPr>
+          <p:spPr>
+            <a:xfrm>
+              <a:off x="6016228" y="3774932"/>
+              <a:ext cx="1200707" cy="346760"/>
+            </a:xfrm>
+            <a:prstGeom prst="rect">
+              <a:avLst/>
+            </a:prstGeom>
+            <a:ln w="19050"/>
+            <a:effectLst/>
+          </p:spPr>
+          <p:style>
+            <a:lnRef idx="1">
+              <a:schemeClr val="accent6"/>
+            </a:lnRef>
+            <a:fillRef idx="2">
+              <a:schemeClr val="accent6"/>
+            </a:fillRef>
+            <a:effectRef idx="1">
+              <a:schemeClr val="accent6"/>
+            </a:effectRef>
+            <a:fontRef idx="minor">
+              <a:schemeClr val="dk1"/>
+            </a:fontRef>
+          </p:style>
+          <p:txBody>
+            <a:bodyPr rtlCol="0" anchor="ctr"/>
+            <a:lstStyle/>
+            <a:p>
+              <a:pPr algn="ctr"/>
+              <a:r>
+                <a:rPr lang="en-US" sz="1050" b="1" dirty="0" err="1">
+                  <a:solidFill>
+                    <a:schemeClr val="accent6">
+                      <a:lumMod val="75000"/>
+                    </a:schemeClr>
+                  </a:solidFill>
+                </a:rPr>
+                <a:t>JsonSerializable</a:t>
+              </a:r>
+              <a:br>
+                <a:rPr lang="en-US" sz="1050" b="1" dirty="0">
+                  <a:solidFill>
+                    <a:schemeClr val="accent6">
+                      <a:lumMod val="75000"/>
+                    </a:schemeClr>
+                  </a:solidFill>
+                </a:rPr>
+              </a:br>
+              <a:r>
+                <a:rPr lang="en-US" sz="1050" b="1" dirty="0">
+                  <a:solidFill>
+                    <a:schemeClr val="accent6">
+                      <a:lumMod val="75000"/>
+                    </a:schemeClr>
+                  </a:solidFill>
+                </a:rPr>
+                <a:t>Menu</a:t>
+              </a:r>
+              <a:endParaRPr lang="en-SG" sz="1050" b="1" dirty="0">
                 <a:solidFill>
                   <a:schemeClr val="accent6">
                     <a:lumMod val="75000"/>
                   </a:schemeClr>
                 </a:solidFill>
-              </a:rPr>
-              <a:t>AddressBook</a:t>
-            </a:r>
-            <a:endParaRPr lang="en-SG" sz="1050" b="1" dirty="0">
-              <a:solidFill>
-                <a:schemeClr val="accent6">
-                  <a:lumMod val="75000"/>
-                </a:schemeClr>
-              </a:solidFill>
-            </a:endParaRPr>
-          </a:p>
-        </p:txBody>
-      </p:sp>
-      <p:cxnSp>
-        <p:nvCxnSpPr>
-          <p:cNvPr id="70" name="Elbow Connector 122"/>
-          <p:cNvCxnSpPr>
-            <a:cxnSpLocks/>
-            <a:stCxn id="74" idx="0"/>
-            <a:endCxn id="73" idx="2"/>
-          </p:cNvCxnSpPr>
-          <p:nvPr/>
-        </p:nvCxnSpPr>
-        <p:spPr>
-          <a:xfrm rot="16200000" flipV="1">
-            <a:off x="8077993" y="2992019"/>
-            <a:ext cx="335208" cy="1"/>
-          </a:xfrm>
-          <a:prstGeom prst="bentConnector3">
-            <a:avLst>
-              <a:gd name="adj1" fmla="val 50000"/>
-            </a:avLst>
-          </a:prstGeom>
-          <a:ln w="19050">
-            <a:prstDash val="sysDot"/>
-            <a:headEnd type="none" w="med" len="med"/>
-            <a:tailEnd type="arrow" w="med" len="med"/>
-          </a:ln>
-          <a:effectLst/>
-        </p:spPr>
-        <p:style>
-          <a:lnRef idx="1">
-            <a:schemeClr val="accent6"/>
-          </a:lnRef>
-          <a:fillRef idx="2">
-            <a:schemeClr val="accent6"/>
-          </a:fillRef>
-          <a:effectRef idx="1">
-            <a:schemeClr val="accent6"/>
-          </a:effectRef>
-          <a:fontRef idx="minor">
-            <a:schemeClr val="dk1"/>
-          </a:fontRef>
-        </p:style>
-      </p:cxnSp>
-      <p:sp>
-        <p:nvSpPr>
-          <p:cNvPr id="73" name="Rectangle 8"/>
-          <p:cNvSpPr/>
-          <p:nvPr/>
-        </p:nvSpPr>
-        <p:spPr>
-          <a:xfrm>
-            <a:off x="7615736" y="2477656"/>
-            <a:ext cx="1259719" cy="346760"/>
-          </a:xfrm>
-          <a:prstGeom prst="rect">
-            <a:avLst/>
-          </a:prstGeom>
-          <a:ln w="19050"/>
-          <a:effectLst/>
-        </p:spPr>
-        <p:style>
-          <a:lnRef idx="1">
-            <a:schemeClr val="accent6"/>
-          </a:lnRef>
-          <a:fillRef idx="2">
-            <a:schemeClr val="accent6"/>
-          </a:fillRef>
-          <a:effectRef idx="1">
-            <a:schemeClr val="accent6"/>
-          </a:effectRef>
-          <a:fontRef idx="minor">
-            <a:schemeClr val="dk1"/>
-          </a:fontRef>
-        </p:style>
-        <p:txBody>
-          <a:bodyPr rtlCol="0" anchor="ctr"/>
-          <a:lstStyle/>
-          <a:p>
-            <a:pPr algn="ctr"/>
-            <a:r>
-              <a:rPr lang="en-US" sz="1050" b="1" dirty="0" err="1">
+              </a:endParaRPr>
+            </a:p>
+          </p:txBody>
+        </p:sp>
+        <p:sp>
+          <p:nvSpPr>
+            <p:cNvPr id="130" name="Rectangle 8">
+              <a:extLst>
+                <a:ext uri="{FF2B5EF4-FFF2-40B4-BE49-F238E27FC236}">
+                  <a16:creationId xmlns:a16="http://schemas.microsoft.com/office/drawing/2014/main" id="{C189C249-8222-4381-9819-B2B73C7C6170}"/>
+                </a:ext>
+              </a:extLst>
+            </p:cNvPr>
+            <p:cNvSpPr/>
+            <p:nvPr/>
+          </p:nvSpPr>
+          <p:spPr>
+            <a:xfrm>
+              <a:off x="7612166" y="3774146"/>
+              <a:ext cx="1259718" cy="346760"/>
+            </a:xfrm>
+            <a:prstGeom prst="rect">
+              <a:avLst/>
+            </a:prstGeom>
+            <a:ln w="19050"/>
+            <a:effectLst/>
+          </p:spPr>
+          <p:style>
+            <a:lnRef idx="1">
+              <a:schemeClr val="accent6"/>
+            </a:lnRef>
+            <a:fillRef idx="2">
+              <a:schemeClr val="accent6"/>
+            </a:fillRef>
+            <a:effectRef idx="1">
+              <a:schemeClr val="accent6"/>
+            </a:effectRef>
+            <a:fontRef idx="minor">
+              <a:schemeClr val="dk1"/>
+            </a:fontRef>
+          </p:style>
+          <p:txBody>
+            <a:bodyPr rtlCol="0" anchor="ctr"/>
+            <a:lstStyle/>
+            <a:p>
+              <a:pPr algn="ctr"/>
+              <a:r>
+                <a:rPr lang="en-US" sz="1030" b="1" dirty="0" err="1">
+                  <a:solidFill>
+                    <a:schemeClr val="accent6">
+                      <a:lumMod val="75000"/>
+                    </a:schemeClr>
+                  </a:solidFill>
+                </a:rPr>
+                <a:t>JsonAdaptedMenu</a:t>
+              </a:r>
+              <a:endParaRPr lang="en-SG" sz="1030" b="1" dirty="0">
                 <a:solidFill>
                   <a:schemeClr val="accent6">
                     <a:lumMod val="75000"/>
                   </a:schemeClr>
                 </a:solidFill>
-              </a:rPr>
-              <a:t>JsonAdaptedTag</a:t>
-            </a:r>
-            <a:endParaRPr lang="en-SG" sz="1050" b="1" dirty="0">
-              <a:solidFill>
-                <a:schemeClr val="accent6">
-                  <a:lumMod val="75000"/>
-                </a:schemeClr>
-              </a:solidFill>
-            </a:endParaRPr>
-          </a:p>
-        </p:txBody>
-      </p:sp>
-      <p:sp>
-        <p:nvSpPr>
-          <p:cNvPr id="74" name="Rectangle 8"/>
-          <p:cNvSpPr/>
-          <p:nvPr/>
-        </p:nvSpPr>
-        <p:spPr>
-          <a:xfrm>
-            <a:off x="7615738" y="3159624"/>
-            <a:ext cx="1259718" cy="346760"/>
-          </a:xfrm>
-          <a:prstGeom prst="rect">
-            <a:avLst/>
-          </a:prstGeom>
-          <a:ln w="19050"/>
-          <a:effectLst/>
-        </p:spPr>
-        <p:style>
-          <a:lnRef idx="1">
-            <a:schemeClr val="accent6"/>
-          </a:lnRef>
-          <a:fillRef idx="2">
-            <a:schemeClr val="accent6"/>
-          </a:fillRef>
-          <a:effectRef idx="1">
-            <a:schemeClr val="accent6"/>
-          </a:effectRef>
-          <a:fontRef idx="minor">
-            <a:schemeClr val="dk1"/>
-          </a:fontRef>
-        </p:style>
-        <p:txBody>
-          <a:bodyPr rtlCol="0" anchor="ctr"/>
-          <a:lstStyle/>
-          <a:p>
-            <a:pPr algn="ctr"/>
-            <a:r>
-              <a:rPr lang="en-US" sz="1030" b="1" dirty="0" err="1">
-                <a:solidFill>
-                  <a:schemeClr val="accent6">
-                    <a:lumMod val="75000"/>
-                  </a:schemeClr>
-                </a:solidFill>
-              </a:rPr>
-              <a:t>JsonAdaptedPerson</a:t>
-            </a:r>
-            <a:endParaRPr lang="en-SG" sz="1030" b="1" dirty="0">
-              <a:solidFill>
-                <a:schemeClr val="accent6">
-                  <a:lumMod val="75000"/>
-                </a:schemeClr>
-              </a:solidFill>
-            </a:endParaRPr>
-          </a:p>
-        </p:txBody>
-      </p:sp>
-      <p:cxnSp>
-        <p:nvCxnSpPr>
-          <p:cNvPr id="77" name="Elbow Connector 122"/>
-          <p:cNvCxnSpPr>
-            <a:stCxn id="66" idx="3"/>
-            <a:endCxn id="74" idx="1"/>
-          </p:cNvCxnSpPr>
-          <p:nvPr/>
-        </p:nvCxnSpPr>
-        <p:spPr>
-          <a:xfrm flipV="1">
-            <a:off x="7220507" y="3333004"/>
-            <a:ext cx="395231" cy="786"/>
-          </a:xfrm>
-          <a:prstGeom prst="bentConnector3">
-            <a:avLst>
-              <a:gd name="adj1" fmla="val 50000"/>
-            </a:avLst>
-          </a:prstGeom>
-          <a:ln w="19050">
-            <a:prstDash val="sysDot"/>
-            <a:headEnd type="none" w="med" len="med"/>
-            <a:tailEnd type="arrow" w="med" len="med"/>
-          </a:ln>
-          <a:effectLst/>
-        </p:spPr>
-        <p:style>
-          <a:lnRef idx="1">
-            <a:schemeClr val="accent6"/>
-          </a:lnRef>
-          <a:fillRef idx="2">
-            <a:schemeClr val="accent6"/>
-          </a:fillRef>
-          <a:effectRef idx="1">
-            <a:schemeClr val="accent6"/>
-          </a:effectRef>
-          <a:fontRef idx="minor">
-            <a:schemeClr val="dk1"/>
-          </a:fontRef>
-        </p:style>
-      </p:cxnSp>
+              </a:endParaRPr>
+            </a:p>
+          </p:txBody>
+        </p:sp>
+        <p:cxnSp>
+          <p:nvCxnSpPr>
+            <p:cNvPr id="131" name="Elbow Connector 122">
+              <a:extLst>
+                <a:ext uri="{FF2B5EF4-FFF2-40B4-BE49-F238E27FC236}">
+                  <a16:creationId xmlns:a16="http://schemas.microsoft.com/office/drawing/2014/main" id="{1FFD6905-D76E-47ED-91D6-09031B549DB5}"/>
+                </a:ext>
+              </a:extLst>
+            </p:cNvPr>
+            <p:cNvCxnSpPr>
+              <a:cxnSpLocks/>
+              <a:stCxn id="127" idx="3"/>
+              <a:endCxn id="130" idx="1"/>
+            </p:cNvCxnSpPr>
+            <p:nvPr/>
+          </p:nvCxnSpPr>
+          <p:spPr>
+            <a:xfrm flipV="1">
+              <a:off x="7216935" y="3947526"/>
+              <a:ext cx="395231" cy="786"/>
+            </a:xfrm>
+            <a:prstGeom prst="bentConnector3">
+              <a:avLst>
+                <a:gd name="adj1" fmla="val 50000"/>
+              </a:avLst>
+            </a:prstGeom>
+            <a:ln w="19050">
+              <a:prstDash val="sysDot"/>
+              <a:headEnd type="none" w="med" len="med"/>
+              <a:tailEnd type="arrow" w="med" len="med"/>
+            </a:ln>
+            <a:effectLst/>
+          </p:spPr>
+          <p:style>
+            <a:lnRef idx="1">
+              <a:schemeClr val="accent6"/>
+            </a:lnRef>
+            <a:fillRef idx="2">
+              <a:schemeClr val="accent6"/>
+            </a:fillRef>
+            <a:effectRef idx="1">
+              <a:schemeClr val="accent6"/>
+            </a:effectRef>
+            <a:fontRef idx="minor">
+              <a:schemeClr val="dk1"/>
+            </a:fontRef>
+          </p:style>
+        </p:cxnSp>
+      </p:grpSp>
     </p:spTree>
     <p:extLst>
       <p:ext uri="{BB962C8B-B14F-4D97-AF65-F5344CB8AC3E}">

</xml_diff>

<commit_message>
Update class diagram for Model, Storage and UI in dev guide
</commit_message>
<xml_diff>
--- a/docs/diagrams/StorageComponentClassDiagram.pptx
+++ b/docs/diagrams/StorageComponentClassDiagram.pptx
@@ -8,7 +8,7 @@
     <p:notesMasterId r:id="rId3"/>
   </p:notesMasterIdLst>
   <p:sldIdLst>
-    <p:sldId id="264" r:id="rId2"/>
+    <p:sldId id="265" r:id="rId2"/>
   </p:sldIdLst>
   <p:sldSz cx="9144000" cy="6858000" type="screen4x3"/>
   <p:notesSz cx="6858000" cy="9144000"/>
@@ -109,7 +109,7 @@
   </p:defaultTextStyle>
   <p:extLst>
     <p:ext uri="{EFAFB233-063F-42B5-8137-9DF3F51BA10A}">
-      <p15:sldGuideLst xmlns:p15="http://schemas.microsoft.com/office/powerpoint/2012/main">
+      <p15:sldGuideLst xmlns="" xmlns:p15="http://schemas.microsoft.com/office/powerpoint/2012/main">
         <p15:guide id="1" orient="horz" pos="1488">
           <p15:clr>
             <a:srgbClr val="A4A3A4"/>
@@ -208,7 +208,7 @@
           <a:p>
             <a:fld id="{F5CC4B3F-88C1-4FFA-B1B6-F41C21DC6924}" type="datetimeFigureOut">
               <a:rPr lang="en-US" smtClean="0"/>
-              <a:t>12/1/2018</a:t>
+              <a:t>12/3/19</a:t>
             </a:fld>
             <a:endParaRPr lang="en-US"/>
           </a:p>
@@ -654,7 +654,7 @@
           <a:p>
             <a:fld id="{78C97017-6FC3-485B-9764-EAC9E56C1D49}" type="datetimeFigureOut">
               <a:rPr lang="en-US" smtClean="0"/>
-              <a:t>12/1/2018</a:t>
+              <a:t>12/3/19</a:t>
             </a:fld>
             <a:endParaRPr lang="en-US"/>
           </a:p>
@@ -822,7 +822,7 @@
           <a:p>
             <a:fld id="{78C97017-6FC3-485B-9764-EAC9E56C1D49}" type="datetimeFigureOut">
               <a:rPr lang="en-US" smtClean="0"/>
-              <a:t>12/1/2018</a:t>
+              <a:t>12/3/19</a:t>
             </a:fld>
             <a:endParaRPr lang="en-US"/>
           </a:p>
@@ -1000,7 +1000,7 @@
           <a:p>
             <a:fld id="{78C97017-6FC3-485B-9764-EAC9E56C1D49}" type="datetimeFigureOut">
               <a:rPr lang="en-US" smtClean="0"/>
-              <a:t>12/1/2018</a:t>
+              <a:t>12/3/19</a:t>
             </a:fld>
             <a:endParaRPr lang="en-US"/>
           </a:p>
@@ -1168,7 +1168,7 @@
           <a:p>
             <a:fld id="{78C97017-6FC3-485B-9764-EAC9E56C1D49}" type="datetimeFigureOut">
               <a:rPr lang="en-US" smtClean="0"/>
-              <a:t>12/1/2018</a:t>
+              <a:t>12/3/19</a:t>
             </a:fld>
             <a:endParaRPr lang="en-US"/>
           </a:p>
@@ -1413,7 +1413,7 @@
           <a:p>
             <a:fld id="{78C97017-6FC3-485B-9764-EAC9E56C1D49}" type="datetimeFigureOut">
               <a:rPr lang="en-US" smtClean="0"/>
-              <a:t>12/1/2018</a:t>
+              <a:t>12/3/19</a:t>
             </a:fld>
             <a:endParaRPr lang="en-US"/>
           </a:p>
@@ -1698,7 +1698,7 @@
           <a:p>
             <a:fld id="{78C97017-6FC3-485B-9764-EAC9E56C1D49}" type="datetimeFigureOut">
               <a:rPr lang="en-US" smtClean="0"/>
-              <a:t>12/1/2018</a:t>
+              <a:t>12/3/19</a:t>
             </a:fld>
             <a:endParaRPr lang="en-US"/>
           </a:p>
@@ -2117,7 +2117,7 @@
           <a:p>
             <a:fld id="{78C97017-6FC3-485B-9764-EAC9E56C1D49}" type="datetimeFigureOut">
               <a:rPr lang="en-US" smtClean="0"/>
-              <a:t>12/1/2018</a:t>
+              <a:t>12/3/19</a:t>
             </a:fld>
             <a:endParaRPr lang="en-US"/>
           </a:p>
@@ -2234,7 +2234,7 @@
           <a:p>
             <a:fld id="{78C97017-6FC3-485B-9764-EAC9E56C1D49}" type="datetimeFigureOut">
               <a:rPr lang="en-US" smtClean="0"/>
-              <a:t>12/1/2018</a:t>
+              <a:t>12/3/19</a:t>
             </a:fld>
             <a:endParaRPr lang="en-US"/>
           </a:p>
@@ -2329,7 +2329,7 @@
           <a:p>
             <a:fld id="{78C97017-6FC3-485B-9764-EAC9E56C1D49}" type="datetimeFigureOut">
               <a:rPr lang="en-US" smtClean="0"/>
-              <a:t>12/1/2018</a:t>
+              <a:t>12/3/19</a:t>
             </a:fld>
             <a:endParaRPr lang="en-US"/>
           </a:p>
@@ -2604,7 +2604,7 @@
           <a:p>
             <a:fld id="{78C97017-6FC3-485B-9764-EAC9E56C1D49}" type="datetimeFigureOut">
               <a:rPr lang="en-US" smtClean="0"/>
-              <a:t>12/1/2018</a:t>
+              <a:t>12/3/19</a:t>
             </a:fld>
             <a:endParaRPr lang="en-US"/>
           </a:p>
@@ -2856,7 +2856,7 @@
           <a:p>
             <a:fld id="{78C97017-6FC3-485B-9764-EAC9E56C1D49}" type="datetimeFigureOut">
               <a:rPr lang="en-US" smtClean="0"/>
-              <a:t>12/1/2018</a:t>
+              <a:t>12/3/19</a:t>
             </a:fld>
             <a:endParaRPr lang="en-US"/>
           </a:p>
@@ -3067,7 +3067,7 @@
           <a:p>
             <a:fld id="{78C97017-6FC3-485B-9764-EAC9E56C1D49}" type="datetimeFigureOut">
               <a:rPr lang="en-US" smtClean="0"/>
-              <a:t>12/1/2018</a:t>
+              <a:t>12/3/19</a:t>
             </a:fld>
             <a:endParaRPr lang="en-US"/>
           </a:p>
@@ -3444,14 +3444,14 @@
       </p:grpSpPr>
       <p:sp>
         <p:nvSpPr>
-          <p:cNvPr id="118" name="Rectangle 65"/>
+          <p:cNvPr id="2" name="Rectangle 65"/>
           <p:cNvSpPr/>
           <p:nvPr/>
         </p:nvSpPr>
         <p:spPr>
           <a:xfrm>
-            <a:off x="1119865" y="2086382"/>
-            <a:ext cx="7871735" cy="1723618"/>
+            <a:off x="304800" y="2133600"/>
+            <a:ext cx="8100335" cy="1723618"/>
           </a:xfrm>
           <a:prstGeom prst="roundRect">
             <a:avLst>
@@ -3509,13 +3509,13 @@
       </p:sp>
       <p:sp>
         <p:nvSpPr>
-          <p:cNvPr id="2" name="Rectangle 8"/>
+          <p:cNvPr id="3" name="Rectangle 8"/>
           <p:cNvSpPr/>
           <p:nvPr/>
         </p:nvSpPr>
         <p:spPr>
           <a:xfrm>
-            <a:off x="2877180" y="3158440"/>
+            <a:off x="2290715" y="3205658"/>
             <a:ext cx="1323049" cy="346760"/>
           </a:xfrm>
           <a:prstGeom prst="rect">
@@ -3570,12 +3570,12 @@
               </a:rPr>
             </a:br>
             <a:r>
-              <a:rPr lang="en-US" sz="1050" dirty="0" err="1">
+              <a:rPr lang="en-US" sz="1050" dirty="0" err="1" smtClean="0">
                 <a:solidFill>
                   <a:schemeClr val="bg1"/>
                 </a:solidFill>
               </a:rPr>
-              <a:t>AddressBookStorage</a:t>
+              <a:t>TopDeckStorage</a:t>
             </a:r>
             <a:endParaRPr lang="en-SG" sz="1050" dirty="0">
               <a:solidFill>
@@ -3587,13 +3587,13 @@
       </p:sp>
       <p:sp>
         <p:nvSpPr>
-          <p:cNvPr id="9" name="Rectangle 62"/>
+          <p:cNvPr id="4" name="Rectangle 62"/>
           <p:cNvSpPr/>
           <p:nvPr/>
         </p:nvSpPr>
         <p:spPr>
           <a:xfrm rot="16200000">
-            <a:off x="1683963" y="2868687"/>
+            <a:off x="1097498" y="2915905"/>
             <a:ext cx="1093635" cy="346760"/>
           </a:xfrm>
           <a:prstGeom prst="rect">
@@ -3650,13 +3650,13 @@
       </p:sp>
       <p:sp>
         <p:nvSpPr>
-          <p:cNvPr id="119" name="Rectangle 62"/>
+          <p:cNvPr id="5" name="Rectangle 62"/>
           <p:cNvSpPr/>
           <p:nvPr/>
         </p:nvSpPr>
         <p:spPr>
           <a:xfrm rot="16200000">
-            <a:off x="956202" y="2861202"/>
+            <a:off x="369737" y="2908420"/>
             <a:ext cx="1093635" cy="346760"/>
           </a:xfrm>
           <a:prstGeom prst="rect">
@@ -3724,13 +3724,13 @@
       </p:sp>
       <p:sp>
         <p:nvSpPr>
-          <p:cNvPr id="120" name="Isosceles Triangle 102"/>
+          <p:cNvPr id="6" name="Isosceles Triangle 102"/>
           <p:cNvSpPr/>
           <p:nvPr/>
         </p:nvSpPr>
         <p:spPr>
           <a:xfrm rot="16200000">
-            <a:off x="1626910" y="2952291"/>
+            <a:off x="1040445" y="2999509"/>
             <a:ext cx="270504" cy="175523"/>
           </a:xfrm>
           <a:prstGeom prst="triangle">
@@ -3779,16 +3779,16 @@
       </p:sp>
       <p:cxnSp>
         <p:nvCxnSpPr>
-          <p:cNvPr id="58" name="Straight Arrow Connector 57"/>
+          <p:cNvPr id="7" name="Straight Arrow Connector 6"/>
           <p:cNvCxnSpPr>
-            <a:stCxn id="42" idx="3"/>
-            <a:endCxn id="2" idx="1"/>
+            <a:stCxn id="10" idx="3"/>
+            <a:endCxn id="3" idx="1"/>
           </p:cNvCxnSpPr>
           <p:nvPr/>
         </p:nvCxnSpPr>
         <p:spPr>
           <a:xfrm>
-            <a:off x="2656370" y="3326536"/>
+            <a:off x="2069905" y="3373754"/>
             <a:ext cx="220810" cy="5284"/>
           </a:xfrm>
           <a:prstGeom prst="straightConnector1">
@@ -3822,13 +3822,13 @@
       </p:cxnSp>
       <p:cxnSp>
         <p:nvCxnSpPr>
-          <p:cNvPr id="75" name="Elbow Connector 122"/>
+          <p:cNvPr id="8" name="Elbow Connector 122"/>
           <p:cNvCxnSpPr/>
           <p:nvPr/>
         </p:nvCxnSpPr>
         <p:spPr>
           <a:xfrm>
-            <a:off x="910091" y="3040053"/>
+            <a:off x="323626" y="3087271"/>
             <a:ext cx="419548" cy="2860"/>
           </a:xfrm>
           <a:prstGeom prst="bentConnector3">
@@ -3865,15 +3865,15 @@
       </p:cxnSp>
       <p:cxnSp>
         <p:nvCxnSpPr>
-          <p:cNvPr id="21" name="Straight Connector 20"/>
+          <p:cNvPr id="9" name="Straight Connector 8"/>
           <p:cNvCxnSpPr>
-            <a:stCxn id="120" idx="3"/>
+            <a:stCxn id="6" idx="3"/>
           </p:cNvCxnSpPr>
           <p:nvPr/>
         </p:nvCxnSpPr>
         <p:spPr>
           <a:xfrm flipV="1">
-            <a:off x="1849924" y="3040052"/>
+            <a:off x="1263459" y="3087270"/>
             <a:ext cx="216105" cy="1"/>
           </a:xfrm>
           <a:prstGeom prst="line">
@@ -3908,13 +3908,13 @@
       </p:cxnSp>
       <p:sp>
         <p:nvSpPr>
-          <p:cNvPr id="42" name="Flowchart: Decision 96"/>
+          <p:cNvPr id="10" name="Flowchart: Decision 96"/>
           <p:cNvSpPr/>
           <p:nvPr/>
         </p:nvSpPr>
         <p:spPr>
           <a:xfrm>
-            <a:off x="2420322" y="3239846"/>
+            <a:off x="1833857" y="3287064"/>
             <a:ext cx="236048" cy="173380"/>
           </a:xfrm>
           <a:prstGeom prst="flowChartDecision">
@@ -3959,16 +3959,16 @@
       </p:sp>
       <p:cxnSp>
         <p:nvCxnSpPr>
-          <p:cNvPr id="97" name="Elbow Connector 63"/>
+          <p:cNvPr id="11" name="Elbow Connector 63"/>
           <p:cNvCxnSpPr>
-            <a:stCxn id="99" idx="3"/>
-            <a:endCxn id="50" idx="1"/>
+            <a:stCxn id="12" idx="3"/>
+            <a:endCxn id="14" idx="1"/>
           </p:cNvCxnSpPr>
           <p:nvPr/>
         </p:nvCxnSpPr>
         <p:spPr>
           <a:xfrm flipV="1">
-            <a:off x="4398041" y="3331820"/>
+            <a:off x="3811576" y="3379038"/>
             <a:ext cx="223324" cy="1"/>
           </a:xfrm>
           <a:prstGeom prst="bentConnector3">
@@ -4005,13 +4005,13 @@
       </p:cxnSp>
       <p:sp>
         <p:nvSpPr>
-          <p:cNvPr id="99" name="Isosceles Triangle 102"/>
+          <p:cNvPr id="12" name="Isosceles Triangle 102"/>
           <p:cNvSpPr/>
           <p:nvPr/>
         </p:nvSpPr>
         <p:spPr>
           <a:xfrm rot="5400000" flipV="1">
-            <a:off x="4175027" y="3244059"/>
+            <a:off x="3588562" y="3291277"/>
             <a:ext cx="270504" cy="175523"/>
           </a:xfrm>
           <a:prstGeom prst="triangle">
@@ -4060,16 +4060,16 @@
       </p:sp>
       <p:cxnSp>
         <p:nvCxnSpPr>
-          <p:cNvPr id="124" name="Elbow Connector 122"/>
+          <p:cNvPr id="13" name="Elbow Connector 122"/>
           <p:cNvCxnSpPr>
-            <a:stCxn id="50" idx="3"/>
-            <a:endCxn id="66" idx="1"/>
+            <a:stCxn id="14" idx="3"/>
+            <a:endCxn id="21" idx="1"/>
           </p:cNvCxnSpPr>
           <p:nvPr/>
         </p:nvCxnSpPr>
         <p:spPr>
           <a:xfrm>
-            <a:off x="5791200" y="3331820"/>
+            <a:off x="5204735" y="3379038"/>
             <a:ext cx="228600" cy="1970"/>
           </a:xfrm>
           <a:prstGeom prst="bentConnector3">
@@ -4106,13 +4106,13 @@
       </p:cxnSp>
       <p:sp>
         <p:nvSpPr>
-          <p:cNvPr id="50" name="Rectangle 8"/>
+          <p:cNvPr id="14" name="Rectangle 8"/>
           <p:cNvSpPr/>
           <p:nvPr/>
         </p:nvSpPr>
         <p:spPr>
           <a:xfrm>
-            <a:off x="4621365" y="3158440"/>
+            <a:off x="4034900" y="3205658"/>
             <a:ext cx="1169835" cy="346760"/>
           </a:xfrm>
           <a:prstGeom prst="rect">
@@ -4141,14 +4141,24 @@
           <a:p>
             <a:pPr algn="ctr"/>
             <a:r>
-              <a:rPr lang="en-US" sz="1050" b="1" dirty="0" err="1">
+              <a:rPr lang="en-US" sz="1050" b="1" dirty="0" err="1" smtClean="0">
                 <a:solidFill>
                   <a:schemeClr val="accent6">
                     <a:lumMod val="75000"/>
                   </a:schemeClr>
                 </a:solidFill>
               </a:rPr>
-              <a:t>JsonAddressBook</a:t>
+              <a:t>JsonTopDeck</a:t>
+            </a:r>
+            <a:r>
+              <a:rPr lang="en-US" sz="1050" b="1" dirty="0">
+                <a:solidFill>
+                  <a:schemeClr val="accent6">
+                    <a:lumMod val="75000"/>
+                  </a:schemeClr>
+                </a:solidFill>
+              </a:rPr>
+              <a:t/>
             </a:r>
             <a:br>
               <a:rPr lang="en-US" sz="1050" b="1" dirty="0">
@@ -4181,13 +4191,13 @@
       </p:sp>
       <p:sp>
         <p:nvSpPr>
-          <p:cNvPr id="52" name="Rectangle 8"/>
+          <p:cNvPr id="15" name="Rectangle 8"/>
           <p:cNvSpPr/>
           <p:nvPr/>
         </p:nvSpPr>
         <p:spPr>
           <a:xfrm>
-            <a:off x="2873943" y="2558040"/>
+            <a:off x="2287478" y="2605258"/>
             <a:ext cx="1323049" cy="346760"/>
           </a:xfrm>
           <a:prstGeom prst="rect">
@@ -4259,16 +4269,16 @@
       </p:sp>
       <p:cxnSp>
         <p:nvCxnSpPr>
-          <p:cNvPr id="54" name="Straight Arrow Connector 53"/>
+          <p:cNvPr id="16" name="Straight Arrow Connector 15"/>
           <p:cNvCxnSpPr>
-            <a:stCxn id="56" idx="3"/>
-            <a:endCxn id="52" idx="1"/>
+            <a:stCxn id="17" idx="3"/>
+            <a:endCxn id="15" idx="1"/>
           </p:cNvCxnSpPr>
           <p:nvPr/>
         </p:nvCxnSpPr>
         <p:spPr>
           <a:xfrm>
-            <a:off x="2653133" y="2726136"/>
+            <a:off x="2066668" y="2773354"/>
             <a:ext cx="220810" cy="5284"/>
           </a:xfrm>
           <a:prstGeom prst="straightConnector1">
@@ -4302,13 +4312,13 @@
       </p:cxnSp>
       <p:sp>
         <p:nvSpPr>
-          <p:cNvPr id="56" name="Flowchart: Decision 96"/>
+          <p:cNvPr id="17" name="Flowchart: Decision 96"/>
           <p:cNvSpPr/>
           <p:nvPr/>
         </p:nvSpPr>
         <p:spPr>
           <a:xfrm>
-            <a:off x="2417085" y="2639446"/>
+            <a:off x="1830620" y="2686664"/>
             <a:ext cx="236048" cy="173380"/>
           </a:xfrm>
           <a:prstGeom prst="flowChartDecision">
@@ -4353,16 +4363,16 @@
       </p:sp>
       <p:cxnSp>
         <p:nvCxnSpPr>
-          <p:cNvPr id="60" name="Elbow Connector 63"/>
+          <p:cNvPr id="18" name="Elbow Connector 63"/>
           <p:cNvCxnSpPr>
-            <a:stCxn id="61" idx="3"/>
-            <a:endCxn id="65" idx="1"/>
+            <a:stCxn id="19" idx="3"/>
+            <a:endCxn id="20" idx="1"/>
           </p:cNvCxnSpPr>
           <p:nvPr/>
         </p:nvCxnSpPr>
         <p:spPr>
           <a:xfrm flipV="1">
-            <a:off x="4394804" y="2731420"/>
+            <a:off x="3808339" y="2778638"/>
             <a:ext cx="223324" cy="1"/>
           </a:xfrm>
           <a:prstGeom prst="bentConnector3">
@@ -4399,13 +4409,13 @@
       </p:cxnSp>
       <p:sp>
         <p:nvSpPr>
-          <p:cNvPr id="61" name="Isosceles Triangle 102"/>
+          <p:cNvPr id="19" name="Isosceles Triangle 102"/>
           <p:cNvSpPr/>
           <p:nvPr/>
         </p:nvSpPr>
         <p:spPr>
           <a:xfrm rot="5400000" flipV="1">
-            <a:off x="4171790" y="2643659"/>
+            <a:off x="3585325" y="2690877"/>
             <a:ext cx="270504" cy="175523"/>
           </a:xfrm>
           <a:prstGeom prst="triangle">
@@ -4454,13 +4464,13 @@
       </p:sp>
       <p:sp>
         <p:nvSpPr>
-          <p:cNvPr id="65" name="Rectangle 8"/>
+          <p:cNvPr id="20" name="Rectangle 8"/>
           <p:cNvSpPr/>
           <p:nvPr/>
         </p:nvSpPr>
         <p:spPr>
           <a:xfrm>
-            <a:off x="4618128" y="2558040"/>
+            <a:off x="4031663" y="2605258"/>
             <a:ext cx="1093635" cy="346760"/>
           </a:xfrm>
           <a:prstGeom prst="rect">
@@ -4507,6 +4517,14 @@
               </a:rPr>
               <a:t>JsonUserPrefs</a:t>
             </a:r>
+            <a:r>
+              <a:rPr lang="en-US" sz="1050" dirty="0">
+                <a:solidFill>
+                  <a:schemeClr val="bg1"/>
+                </a:solidFill>
+              </a:rPr>
+              <a:t/>
+            </a:r>
             <a:br>
               <a:rPr lang="en-US" sz="1050" dirty="0">
                 <a:solidFill>
@@ -4532,13 +4550,13 @@
       </p:sp>
       <p:sp>
         <p:nvSpPr>
-          <p:cNvPr id="66" name="Rectangle 8"/>
+          <p:cNvPr id="21" name="Rectangle 8"/>
           <p:cNvSpPr/>
           <p:nvPr/>
         </p:nvSpPr>
         <p:spPr>
           <a:xfrm>
-            <a:off x="6019800" y="3160410"/>
+            <a:off x="5433335" y="3207628"/>
             <a:ext cx="1200707" cy="346760"/>
           </a:xfrm>
           <a:prstGeom prst="rect">
@@ -4576,6 +4594,16 @@
               </a:rPr>
               <a:t>JsonSerializable</a:t>
             </a:r>
+            <a:r>
+              <a:rPr lang="en-US" sz="1050" b="1" dirty="0">
+                <a:solidFill>
+                  <a:schemeClr val="accent6">
+                    <a:lumMod val="75000"/>
+                  </a:schemeClr>
+                </a:solidFill>
+              </a:rPr>
+              <a:t/>
+            </a:r>
             <a:br>
               <a:rPr lang="en-US" sz="1050" b="1" dirty="0">
                 <a:solidFill>
@@ -4586,14 +4614,14 @@
               </a:rPr>
             </a:br>
             <a:r>
-              <a:rPr lang="en-US" sz="1050" b="1" dirty="0" err="1">
+              <a:rPr lang="en-US" sz="1050" b="1" dirty="0" err="1" smtClean="0">
                 <a:solidFill>
                   <a:schemeClr val="accent6">
                     <a:lumMod val="75000"/>
                   </a:schemeClr>
                 </a:solidFill>
               </a:rPr>
-              <a:t>AddressBook</a:t>
+              <a:t>TopDeck</a:t>
             </a:r>
             <a:endParaRPr lang="en-SG" sz="1050" b="1" dirty="0">
               <a:solidFill>
@@ -4607,17 +4635,17 @@
       </p:sp>
       <p:cxnSp>
         <p:nvCxnSpPr>
-          <p:cNvPr id="70" name="Elbow Connector 122"/>
+          <p:cNvPr id="22" name="Elbow Connector 122"/>
           <p:cNvCxnSpPr>
             <a:cxnSpLocks/>
-            <a:stCxn id="74" idx="0"/>
-            <a:endCxn id="73" idx="2"/>
+            <a:stCxn id="24" idx="0"/>
+            <a:endCxn id="23" idx="2"/>
           </p:cNvCxnSpPr>
           <p:nvPr/>
         </p:nvCxnSpPr>
         <p:spPr>
           <a:xfrm rot="16200000" flipV="1">
-            <a:off x="8077993" y="2992019"/>
+            <a:off x="7491528" y="3039237"/>
             <a:ext cx="335208" cy="1"/>
           </a:xfrm>
           <a:prstGeom prst="bentConnector3">
@@ -4649,13 +4677,13 @@
       </p:cxnSp>
       <p:sp>
         <p:nvSpPr>
-          <p:cNvPr id="73" name="Rectangle 8"/>
+          <p:cNvPr id="23" name="Rectangle 8"/>
           <p:cNvSpPr/>
           <p:nvPr/>
         </p:nvSpPr>
         <p:spPr>
           <a:xfrm>
-            <a:off x="7615736" y="2477656"/>
+            <a:off x="7029271" y="2524874"/>
             <a:ext cx="1259719" cy="346760"/>
           </a:xfrm>
           <a:prstGeom prst="rect">
@@ -4705,13 +4733,13 @@
       </p:sp>
       <p:sp>
         <p:nvSpPr>
-          <p:cNvPr id="74" name="Rectangle 8"/>
+          <p:cNvPr id="24" name="Rectangle 8"/>
           <p:cNvSpPr/>
           <p:nvPr/>
         </p:nvSpPr>
         <p:spPr>
           <a:xfrm>
-            <a:off x="7615738" y="3159624"/>
+            <a:off x="7029273" y="3206842"/>
             <a:ext cx="1259718" cy="346760"/>
           </a:xfrm>
           <a:prstGeom prst="rect">
@@ -4740,14 +4768,14 @@
           <a:p>
             <a:pPr algn="ctr"/>
             <a:r>
-              <a:rPr lang="en-US" sz="1030" b="1" dirty="0" err="1">
+              <a:rPr lang="en-US" sz="1030" b="1" dirty="0" err="1" smtClean="0">
                 <a:solidFill>
                   <a:schemeClr val="accent6">
                     <a:lumMod val="75000"/>
                   </a:schemeClr>
                 </a:solidFill>
               </a:rPr>
-              <a:t>JsonAdaptedPerson</a:t>
+              <a:t>JsonAdaptedCard</a:t>
             </a:r>
             <a:endParaRPr lang="en-SG" sz="1030" b="1" dirty="0">
               <a:solidFill>
@@ -4761,16 +4789,16 @@
       </p:sp>
       <p:cxnSp>
         <p:nvCxnSpPr>
-          <p:cNvPr id="77" name="Elbow Connector 122"/>
+          <p:cNvPr id="25" name="Elbow Connector 122"/>
           <p:cNvCxnSpPr>
-            <a:stCxn id="66" idx="3"/>
-            <a:endCxn id="74" idx="1"/>
+            <a:stCxn id="21" idx="3"/>
+            <a:endCxn id="24" idx="1"/>
           </p:cNvCxnSpPr>
           <p:nvPr/>
         </p:nvCxnSpPr>
         <p:spPr>
           <a:xfrm flipV="1">
-            <a:off x="7220507" y="3333004"/>
+            <a:off x="6634042" y="3380222"/>
             <a:ext cx="395231" cy="786"/>
           </a:xfrm>
           <a:prstGeom prst="bentConnector3">
@@ -4803,7 +4831,7 @@
     </p:spTree>
     <p:extLst>
       <p:ext uri="{BB962C8B-B14F-4D97-AF65-F5344CB8AC3E}">
-        <p14:creationId xmlns:p14="http://schemas.microsoft.com/office/powerpoint/2010/main" val="1478832369"/>
+        <p14:creationId xmlns:p14="http://schemas.microsoft.com/office/powerpoint/2010/main" val="3711047189"/>
       </p:ext>
     </p:extLst>
   </p:cSld>

</xml_diff>

<commit_message>
Update Storage component in DG
</commit_message>
<xml_diff>
--- a/docs/diagrams/StorageComponentClassDiagram.pptx
+++ b/docs/diagrams/StorageComponentClassDiagram.pptx
@@ -208,7 +208,7 @@
           <a:p>
             <a:fld id="{F5CC4B3F-88C1-4FFA-B1B6-F41C21DC6924}" type="datetimeFigureOut">
               <a:rPr lang="en-US" smtClean="0"/>
-              <a:t>12/1/2018</a:t>
+              <a:t>3/31/2019</a:t>
             </a:fld>
             <a:endParaRPr lang="en-US"/>
           </a:p>
@@ -654,7 +654,7 @@
           <a:p>
             <a:fld id="{78C97017-6FC3-485B-9764-EAC9E56C1D49}" type="datetimeFigureOut">
               <a:rPr lang="en-US" smtClean="0"/>
-              <a:t>12/1/2018</a:t>
+              <a:t>3/31/2019</a:t>
             </a:fld>
             <a:endParaRPr lang="en-US"/>
           </a:p>
@@ -822,7 +822,7 @@
           <a:p>
             <a:fld id="{78C97017-6FC3-485B-9764-EAC9E56C1D49}" type="datetimeFigureOut">
               <a:rPr lang="en-US" smtClean="0"/>
-              <a:t>12/1/2018</a:t>
+              <a:t>3/31/2019</a:t>
             </a:fld>
             <a:endParaRPr lang="en-US"/>
           </a:p>
@@ -1000,7 +1000,7 @@
           <a:p>
             <a:fld id="{78C97017-6FC3-485B-9764-EAC9E56C1D49}" type="datetimeFigureOut">
               <a:rPr lang="en-US" smtClean="0"/>
-              <a:t>12/1/2018</a:t>
+              <a:t>3/31/2019</a:t>
             </a:fld>
             <a:endParaRPr lang="en-US"/>
           </a:p>
@@ -1168,7 +1168,7 @@
           <a:p>
             <a:fld id="{78C97017-6FC3-485B-9764-EAC9E56C1D49}" type="datetimeFigureOut">
               <a:rPr lang="en-US" smtClean="0"/>
-              <a:t>12/1/2018</a:t>
+              <a:t>3/31/2019</a:t>
             </a:fld>
             <a:endParaRPr lang="en-US"/>
           </a:p>
@@ -1413,7 +1413,7 @@
           <a:p>
             <a:fld id="{78C97017-6FC3-485B-9764-EAC9E56C1D49}" type="datetimeFigureOut">
               <a:rPr lang="en-US" smtClean="0"/>
-              <a:t>12/1/2018</a:t>
+              <a:t>3/31/2019</a:t>
             </a:fld>
             <a:endParaRPr lang="en-US"/>
           </a:p>
@@ -1698,7 +1698,7 @@
           <a:p>
             <a:fld id="{78C97017-6FC3-485B-9764-EAC9E56C1D49}" type="datetimeFigureOut">
               <a:rPr lang="en-US" smtClean="0"/>
-              <a:t>12/1/2018</a:t>
+              <a:t>3/31/2019</a:t>
             </a:fld>
             <a:endParaRPr lang="en-US"/>
           </a:p>
@@ -2117,7 +2117,7 @@
           <a:p>
             <a:fld id="{78C97017-6FC3-485B-9764-EAC9E56C1D49}" type="datetimeFigureOut">
               <a:rPr lang="en-US" smtClean="0"/>
-              <a:t>12/1/2018</a:t>
+              <a:t>3/31/2019</a:t>
             </a:fld>
             <a:endParaRPr lang="en-US"/>
           </a:p>
@@ -2234,7 +2234,7 @@
           <a:p>
             <a:fld id="{78C97017-6FC3-485B-9764-EAC9E56C1D49}" type="datetimeFigureOut">
               <a:rPr lang="en-US" smtClean="0"/>
-              <a:t>12/1/2018</a:t>
+              <a:t>3/31/2019</a:t>
             </a:fld>
             <a:endParaRPr lang="en-US"/>
           </a:p>
@@ -2329,7 +2329,7 @@
           <a:p>
             <a:fld id="{78C97017-6FC3-485B-9764-EAC9E56C1D49}" type="datetimeFigureOut">
               <a:rPr lang="en-US" smtClean="0"/>
-              <a:t>12/1/2018</a:t>
+              <a:t>3/31/2019</a:t>
             </a:fld>
             <a:endParaRPr lang="en-US"/>
           </a:p>
@@ -2604,7 +2604,7 @@
           <a:p>
             <a:fld id="{78C97017-6FC3-485B-9764-EAC9E56C1D49}" type="datetimeFigureOut">
               <a:rPr lang="en-US" smtClean="0"/>
-              <a:t>12/1/2018</a:t>
+              <a:t>3/31/2019</a:t>
             </a:fld>
             <a:endParaRPr lang="en-US"/>
           </a:p>
@@ -2856,7 +2856,7 @@
           <a:p>
             <a:fld id="{78C97017-6FC3-485B-9764-EAC9E56C1D49}" type="datetimeFigureOut">
               <a:rPr lang="en-US" smtClean="0"/>
-              <a:t>12/1/2018</a:t>
+              <a:t>3/31/2019</a:t>
             </a:fld>
             <a:endParaRPr lang="en-US"/>
           </a:p>
@@ -3067,7 +3067,7 @@
           <a:p>
             <a:fld id="{78C97017-6FC3-485B-9764-EAC9E56C1D49}" type="datetimeFigureOut">
               <a:rPr lang="en-US" smtClean="0"/>
-              <a:t>12/1/2018</a:t>
+              <a:t>3/31/2019</a:t>
             </a:fld>
             <a:endParaRPr lang="en-US"/>
           </a:p>
@@ -3451,7 +3451,7 @@
         <p:spPr>
           <a:xfrm>
             <a:off x="1119865" y="2086382"/>
-            <a:ext cx="7871735" cy="1723618"/>
+            <a:ext cx="5052335" cy="1723618"/>
           </a:xfrm>
           <a:prstGeom prst="roundRect">
             <a:avLst>
@@ -3515,7 +3515,7 @@
         </p:nvSpPr>
         <p:spPr>
           <a:xfrm>
-            <a:off x="2877180" y="3158440"/>
+            <a:off x="2938986" y="3321330"/>
             <a:ext cx="1323049" cy="346760"/>
           </a:xfrm>
           <a:prstGeom prst="rect">
@@ -3575,7 +3575,7 @@
                   <a:schemeClr val="bg1"/>
                 </a:solidFill>
               </a:rPr>
-              <a:t>AddressBookStorage</a:t>
+              <a:t>LessonListStorage</a:t>
             </a:r>
             <a:endParaRPr lang="en-SG" sz="1050" dirty="0">
               <a:solidFill>
@@ -3781,6 +3781,7 @@
         <p:nvCxnSpPr>
           <p:cNvPr id="58" name="Straight Arrow Connector 57"/>
           <p:cNvCxnSpPr>
+            <a:cxnSpLocks/>
             <a:stCxn id="42" idx="3"/>
             <a:endCxn id="2" idx="1"/>
           </p:cNvCxnSpPr>
@@ -3788,8 +3789,8 @@
         </p:nvCxnSpPr>
         <p:spPr>
           <a:xfrm>
-            <a:off x="2656370" y="3326536"/>
-            <a:ext cx="220810" cy="5284"/>
+            <a:off x="2654920" y="3494710"/>
+            <a:ext cx="284066" cy="0"/>
           </a:xfrm>
           <a:prstGeom prst="straightConnector1">
             <a:avLst/>
@@ -3914,7 +3915,7 @@
         </p:nvSpPr>
         <p:spPr>
           <a:xfrm>
-            <a:off x="2420322" y="3239846"/>
+            <a:off x="2418872" y="3408020"/>
             <a:ext cx="236048" cy="173380"/>
           </a:xfrm>
           <a:prstGeom prst="flowChartDecision">
@@ -3968,8 +3969,8 @@
         </p:nvCxnSpPr>
         <p:spPr>
           <a:xfrm flipV="1">
-            <a:off x="4398041" y="3331820"/>
-            <a:ext cx="223324" cy="1"/>
+            <a:off x="4454474" y="3503943"/>
+            <a:ext cx="342386" cy="1"/>
           </a:xfrm>
           <a:prstGeom prst="bentConnector3">
             <a:avLst>
@@ -4011,7 +4012,7 @@
         </p:nvSpPr>
         <p:spPr>
           <a:xfrm rot="5400000" flipV="1">
-            <a:off x="4175027" y="3244059"/>
+            <a:off x="4231460" y="3416182"/>
             <a:ext cx="270504" cy="175523"/>
           </a:xfrm>
           <a:prstGeom prst="triangle">
@@ -4058,52 +4059,6 @@
           </a:p>
         </p:txBody>
       </p:sp>
-      <p:cxnSp>
-        <p:nvCxnSpPr>
-          <p:cNvPr id="124" name="Elbow Connector 122"/>
-          <p:cNvCxnSpPr>
-            <a:stCxn id="50" idx="3"/>
-            <a:endCxn id="66" idx="1"/>
-          </p:cNvCxnSpPr>
-          <p:nvPr/>
-        </p:nvCxnSpPr>
-        <p:spPr>
-          <a:xfrm>
-            <a:off x="5791200" y="3331820"/>
-            <a:ext cx="228600" cy="1970"/>
-          </a:xfrm>
-          <a:prstGeom prst="bentConnector3">
-            <a:avLst>
-              <a:gd name="adj1" fmla="val 50000"/>
-            </a:avLst>
-          </a:prstGeom>
-          <a:ln w="19050">
-            <a:solidFill>
-              <a:schemeClr val="accent6">
-                <a:lumMod val="75000"/>
-              </a:schemeClr>
-            </a:solidFill>
-            <a:prstDash val="sysDot"/>
-            <a:headEnd type="none" w="med" len="med"/>
-            <a:tailEnd type="arrow" w="med" len="med"/>
-          </a:ln>
-          <a:effectLst/>
-        </p:spPr>
-        <p:style>
-          <a:lnRef idx="1">
-            <a:schemeClr val="accent2"/>
-          </a:lnRef>
-          <a:fillRef idx="2">
-            <a:schemeClr val="accent2"/>
-          </a:fillRef>
-          <a:effectRef idx="1">
-            <a:schemeClr val="accent2"/>
-          </a:effectRef>
-          <a:fontRef idx="minor">
-            <a:schemeClr val="dk1"/>
-          </a:fontRef>
-        </p:style>
-      </p:cxnSp>
       <p:sp>
         <p:nvSpPr>
           <p:cNvPr id="50" name="Rectangle 8"/>
@@ -4112,7 +4067,7 @@
         </p:nvSpPr>
         <p:spPr>
           <a:xfrm>
-            <a:off x="4621365" y="3158440"/>
+            <a:off x="4796860" y="3330563"/>
             <a:ext cx="1169835" cy="346760"/>
           </a:xfrm>
           <a:prstGeom prst="rect">
@@ -4148,17 +4103,18 @@
                   </a:schemeClr>
                 </a:solidFill>
               </a:rPr>
-              <a:t>JsonAddressBook</a:t>
-            </a:r>
-            <a:br>
-              <a:rPr lang="en-US" sz="1050" b="1" dirty="0">
-                <a:solidFill>
-                  <a:schemeClr val="accent6">
-                    <a:lumMod val="75000"/>
-                  </a:schemeClr>
-                </a:solidFill>
-              </a:rPr>
-            </a:br>
+              <a:t>CsvLessonList</a:t>
+            </a:r>
+            <a:endParaRPr lang="en-US" sz="1050" b="1" dirty="0">
+              <a:solidFill>
+                <a:schemeClr val="accent6">
+                  <a:lumMod val="75000"/>
+                </a:schemeClr>
+              </a:solidFill>
+            </a:endParaRPr>
+          </a:p>
+          <a:p>
+            <a:pPr algn="ctr"/>
             <a:r>
               <a:rPr lang="en-US" sz="1050" b="1" dirty="0">
                 <a:solidFill>
@@ -4187,7 +4143,7 @@
         </p:nvSpPr>
         <p:spPr>
           <a:xfrm>
-            <a:off x="2873943" y="2558040"/>
+            <a:off x="2931372" y="2408135"/>
             <a:ext cx="1323049" cy="346760"/>
           </a:xfrm>
           <a:prstGeom prst="rect">
@@ -4267,9 +4223,9 @@
           <p:nvPr/>
         </p:nvCxnSpPr>
         <p:spPr>
-          <a:xfrm>
-            <a:off x="2653133" y="2726136"/>
-            <a:ext cx="220810" cy="5284"/>
+          <a:xfrm flipV="1">
+            <a:off x="2644257" y="2581515"/>
+            <a:ext cx="287115" cy="1468"/>
           </a:xfrm>
           <a:prstGeom prst="straightConnector1">
             <a:avLst/>
@@ -4308,7 +4264,7 @@
         </p:nvSpPr>
         <p:spPr>
           <a:xfrm>
-            <a:off x="2417085" y="2639446"/>
+            <a:off x="2408209" y="2496293"/>
             <a:ext cx="236048" cy="173380"/>
           </a:xfrm>
           <a:prstGeom prst="flowChartDecision">
@@ -4355,15 +4311,16 @@
         <p:nvCxnSpPr>
           <p:cNvPr id="60" name="Elbow Connector 63"/>
           <p:cNvCxnSpPr>
+            <a:cxnSpLocks/>
             <a:stCxn id="61" idx="3"/>
             <a:endCxn id="65" idx="1"/>
           </p:cNvCxnSpPr>
           <p:nvPr/>
         </p:nvCxnSpPr>
         <p:spPr>
-          <a:xfrm flipV="1">
-            <a:off x="4394804" y="2731420"/>
-            <a:ext cx="223324" cy="1"/>
+          <a:xfrm>
+            <a:off x="4429945" y="2580564"/>
+            <a:ext cx="365408" cy="3624"/>
           </a:xfrm>
           <a:prstGeom prst="bentConnector3">
             <a:avLst>
@@ -4405,7 +4362,7 @@
         </p:nvSpPr>
         <p:spPr>
           <a:xfrm rot="5400000" flipV="1">
-            <a:off x="4171790" y="2643659"/>
+            <a:off x="4206931" y="2492802"/>
             <a:ext cx="270504" cy="175523"/>
           </a:xfrm>
           <a:prstGeom prst="triangle">
@@ -4460,8 +4417,8 @@
         </p:nvSpPr>
         <p:spPr>
           <a:xfrm>
-            <a:off x="4618128" y="2558040"/>
-            <a:ext cx="1093635" cy="346760"/>
+            <a:off x="4795353" y="2410808"/>
+            <a:ext cx="1163728" cy="346760"/>
           </a:xfrm>
           <a:prstGeom prst="rect">
             <a:avLst/>
@@ -4532,14 +4489,323 @@
       </p:sp>
       <p:sp>
         <p:nvSpPr>
-          <p:cNvPr id="66" name="Rectangle 8"/>
+          <p:cNvPr id="26" name="Flowchart: Decision 96">
+            <a:extLst>
+              <a:ext uri="{FF2B5EF4-FFF2-40B4-BE49-F238E27FC236}">
+                <a16:creationId xmlns:a16="http://schemas.microsoft.com/office/drawing/2014/main" id="{ADC8A2FF-760B-4FC9-BB6B-7254857C64AD}"/>
+              </a:ext>
+            </a:extLst>
+          </p:cNvPr>
           <p:cNvSpPr/>
           <p:nvPr/>
         </p:nvSpPr>
         <p:spPr>
           <a:xfrm>
-            <a:off x="6019800" y="3160410"/>
-            <a:ext cx="1200707" cy="346760"/>
+            <a:off x="2413611" y="2962545"/>
+            <a:ext cx="236048" cy="173380"/>
+          </a:xfrm>
+          <a:prstGeom prst="flowChartDecision">
+            <a:avLst/>
+          </a:prstGeom>
+          <a:noFill/>
+          <a:ln w="19050">
+            <a:solidFill>
+              <a:schemeClr val="accent6">
+                <a:lumMod val="75000"/>
+              </a:schemeClr>
+            </a:solidFill>
+          </a:ln>
+          <a:effectLst/>
+        </p:spPr>
+        <p:style>
+          <a:lnRef idx="1">
+            <a:schemeClr val="accent2"/>
+          </a:lnRef>
+          <a:fillRef idx="2">
+            <a:schemeClr val="accent2"/>
+          </a:fillRef>
+          <a:effectRef idx="1">
+            <a:schemeClr val="accent2"/>
+          </a:effectRef>
+          <a:fontRef idx="minor">
+            <a:schemeClr val="dk1"/>
+          </a:fontRef>
+        </p:style>
+        <p:txBody>
+          <a:bodyPr rtlCol="0" anchor="ctr"/>
+          <a:lstStyle/>
+          <a:p>
+            <a:pPr algn="ctr"/>
+            <a:endParaRPr lang="en-US" sz="1050">
+              <a:solidFill>
+                <a:schemeClr val="bg1"/>
+              </a:solidFill>
+            </a:endParaRPr>
+          </a:p>
+        </p:txBody>
+      </p:sp>
+      <p:sp>
+        <p:nvSpPr>
+          <p:cNvPr id="36" name="Rectangle 8">
+            <a:extLst>
+              <a:ext uri="{FF2B5EF4-FFF2-40B4-BE49-F238E27FC236}">
+                <a16:creationId xmlns:a16="http://schemas.microsoft.com/office/drawing/2014/main" id="{13CBBA6C-6F94-4295-8356-632F9B912430}"/>
+              </a:ext>
+            </a:extLst>
+          </p:cNvPr>
+          <p:cNvSpPr/>
+          <p:nvPr/>
+        </p:nvSpPr>
+        <p:spPr>
+          <a:xfrm>
+            <a:off x="2931372" y="2873454"/>
+            <a:ext cx="1323049" cy="346760"/>
+          </a:xfrm>
+          <a:prstGeom prst="rect">
+            <a:avLst/>
+          </a:prstGeom>
+          <a:solidFill>
+            <a:schemeClr val="accent6">
+              <a:lumMod val="75000"/>
+            </a:schemeClr>
+          </a:solidFill>
+          <a:ln w="19050">
+            <a:solidFill>
+              <a:schemeClr val="accent6">
+                <a:lumMod val="75000"/>
+              </a:schemeClr>
+            </a:solidFill>
+          </a:ln>
+          <a:effectLst/>
+        </p:spPr>
+        <p:style>
+          <a:lnRef idx="1">
+            <a:schemeClr val="accent2"/>
+          </a:lnRef>
+          <a:fillRef idx="2">
+            <a:schemeClr val="accent2"/>
+          </a:fillRef>
+          <a:effectRef idx="1">
+            <a:schemeClr val="accent2"/>
+          </a:effectRef>
+          <a:fontRef idx="minor">
+            <a:schemeClr val="dk1"/>
+          </a:fontRef>
+        </p:style>
+        <p:txBody>
+          <a:bodyPr rtlCol="0" anchor="ctr"/>
+          <a:lstStyle/>
+          <a:p>
+            <a:pPr algn="ctr"/>
+            <a:r>
+              <a:rPr lang="en-US" sz="1050" dirty="0">
+                <a:solidFill>
+                  <a:schemeClr val="bg1"/>
+                </a:solidFill>
+              </a:rPr>
+              <a:t>&lt;&lt;interface&gt;&gt;</a:t>
+            </a:r>
+            <a:br>
+              <a:rPr lang="en-US" sz="1050" dirty="0">
+                <a:solidFill>
+                  <a:schemeClr val="bg1"/>
+                </a:solidFill>
+              </a:rPr>
+            </a:br>
+            <a:r>
+              <a:rPr lang="en-US" sz="1050" dirty="0" err="1">
+                <a:solidFill>
+                  <a:schemeClr val="bg1"/>
+                </a:solidFill>
+              </a:rPr>
+              <a:t>UserStorage</a:t>
+            </a:r>
+            <a:endParaRPr lang="en-SG" sz="1050" dirty="0">
+              <a:solidFill>
+                <a:schemeClr val="bg1"/>
+              </a:solidFill>
+            </a:endParaRPr>
+          </a:p>
+        </p:txBody>
+      </p:sp>
+      <p:cxnSp>
+        <p:nvCxnSpPr>
+          <p:cNvPr id="37" name="Straight Arrow Connector 36">
+            <a:extLst>
+              <a:ext uri="{FF2B5EF4-FFF2-40B4-BE49-F238E27FC236}">
+                <a16:creationId xmlns:a16="http://schemas.microsoft.com/office/drawing/2014/main" id="{64D55DB2-783E-439D-BF49-1855C0D5D282}"/>
+              </a:ext>
+            </a:extLst>
+          </p:cNvPr>
+          <p:cNvCxnSpPr>
+            <a:cxnSpLocks/>
+            <a:endCxn id="36" idx="1"/>
+          </p:cNvCxnSpPr>
+          <p:nvPr/>
+        </p:nvCxnSpPr>
+        <p:spPr>
+          <a:xfrm>
+            <a:off x="2647306" y="3046834"/>
+            <a:ext cx="284066" cy="0"/>
+          </a:xfrm>
+          <a:prstGeom prst="straightConnector1">
+            <a:avLst/>
+          </a:prstGeom>
+          <a:ln w="19050">
+            <a:solidFill>
+              <a:schemeClr val="accent6">
+                <a:lumMod val="75000"/>
+              </a:schemeClr>
+            </a:solidFill>
+            <a:headEnd type="none" w="med" len="med"/>
+            <a:tailEnd type="arrow" w="med" len="med"/>
+          </a:ln>
+          <a:effectLst/>
+        </p:spPr>
+        <p:style>
+          <a:lnRef idx="1">
+            <a:schemeClr val="accent2"/>
+          </a:lnRef>
+          <a:fillRef idx="2">
+            <a:schemeClr val="accent2"/>
+          </a:fillRef>
+          <a:effectRef idx="1">
+            <a:schemeClr val="accent2"/>
+          </a:effectRef>
+          <a:fontRef idx="minor">
+            <a:schemeClr val="dk1"/>
+          </a:fontRef>
+        </p:style>
+      </p:cxnSp>
+      <p:cxnSp>
+        <p:nvCxnSpPr>
+          <p:cNvPr id="38" name="Elbow Connector 63">
+            <a:extLst>
+              <a:ext uri="{FF2B5EF4-FFF2-40B4-BE49-F238E27FC236}">
+                <a16:creationId xmlns:a16="http://schemas.microsoft.com/office/drawing/2014/main" id="{BA142AA2-E881-42CD-8FDA-6B057172389F}"/>
+              </a:ext>
+            </a:extLst>
+          </p:cNvPr>
+          <p:cNvCxnSpPr>
+            <a:stCxn id="39" idx="3"/>
+            <a:endCxn id="40" idx="1"/>
+          </p:cNvCxnSpPr>
+          <p:nvPr/>
+        </p:nvCxnSpPr>
+        <p:spPr>
+          <a:xfrm flipV="1">
+            <a:off x="4446860" y="3056067"/>
+            <a:ext cx="342386" cy="1"/>
+          </a:xfrm>
+          <a:prstGeom prst="bentConnector3">
+            <a:avLst>
+              <a:gd name="adj1" fmla="val 50000"/>
+            </a:avLst>
+          </a:prstGeom>
+          <a:ln w="19050">
+            <a:solidFill>
+              <a:schemeClr val="accent6">
+                <a:lumMod val="75000"/>
+              </a:schemeClr>
+            </a:solidFill>
+            <a:prstDash val="sysDot"/>
+            <a:headEnd type="none" w="med" len="med"/>
+            <a:tailEnd type="none" w="med" len="med"/>
+          </a:ln>
+          <a:effectLst/>
+        </p:spPr>
+        <p:style>
+          <a:lnRef idx="1">
+            <a:schemeClr val="accent2"/>
+          </a:lnRef>
+          <a:fillRef idx="2">
+            <a:schemeClr val="accent2"/>
+          </a:fillRef>
+          <a:effectRef idx="1">
+            <a:schemeClr val="accent2"/>
+          </a:effectRef>
+          <a:fontRef idx="minor">
+            <a:schemeClr val="dk1"/>
+          </a:fontRef>
+        </p:style>
+      </p:cxnSp>
+      <p:sp>
+        <p:nvSpPr>
+          <p:cNvPr id="39" name="Isosceles Triangle 102">
+            <a:extLst>
+              <a:ext uri="{FF2B5EF4-FFF2-40B4-BE49-F238E27FC236}">
+                <a16:creationId xmlns:a16="http://schemas.microsoft.com/office/drawing/2014/main" id="{462F6784-0091-44BA-8DE0-D08F98A68D2B}"/>
+              </a:ext>
+            </a:extLst>
+          </p:cNvPr>
+          <p:cNvSpPr/>
+          <p:nvPr/>
+        </p:nvSpPr>
+        <p:spPr>
+          <a:xfrm rot="5400000" flipV="1">
+            <a:off x="4223846" y="2968306"/>
+            <a:ext cx="270504" cy="175523"/>
+          </a:xfrm>
+          <a:prstGeom prst="triangle">
+            <a:avLst/>
+          </a:prstGeom>
+          <a:solidFill>
+            <a:schemeClr val="accent6">
+              <a:lumMod val="75000"/>
+            </a:schemeClr>
+          </a:solidFill>
+          <a:ln w="19050">
+            <a:solidFill>
+              <a:schemeClr val="accent6">
+                <a:lumMod val="75000"/>
+              </a:schemeClr>
+            </a:solidFill>
+          </a:ln>
+          <a:effectLst/>
+        </p:spPr>
+        <p:style>
+          <a:lnRef idx="1">
+            <a:schemeClr val="accent2"/>
+          </a:lnRef>
+          <a:fillRef idx="2">
+            <a:schemeClr val="accent2"/>
+          </a:fillRef>
+          <a:effectRef idx="1">
+            <a:schemeClr val="accent2"/>
+          </a:effectRef>
+          <a:fontRef idx="minor">
+            <a:schemeClr val="dk1"/>
+          </a:fontRef>
+        </p:style>
+        <p:txBody>
+          <a:bodyPr rtlCol="0" anchor="ctr"/>
+          <a:lstStyle/>
+          <a:p>
+            <a:pPr algn="ctr"/>
+            <a:endParaRPr lang="en-SG" sz="1050">
+              <a:solidFill>
+                <a:schemeClr val="bg1"/>
+              </a:solidFill>
+            </a:endParaRPr>
+          </a:p>
+        </p:txBody>
+      </p:sp>
+      <p:sp>
+        <p:nvSpPr>
+          <p:cNvPr id="40" name="Rectangle 8">
+            <a:extLst>
+              <a:ext uri="{FF2B5EF4-FFF2-40B4-BE49-F238E27FC236}">
+                <a16:creationId xmlns:a16="http://schemas.microsoft.com/office/drawing/2014/main" id="{3EB088F6-40CE-4F7C-A34C-A685DF821133}"/>
+              </a:ext>
+            </a:extLst>
+          </p:cNvPr>
+          <p:cNvSpPr/>
+          <p:nvPr/>
+        </p:nvSpPr>
+        <p:spPr>
+          <a:xfrm>
+            <a:off x="4789246" y="2882687"/>
+            <a:ext cx="1169835" cy="346760"/>
           </a:xfrm>
           <a:prstGeom prst="rect">
             <a:avLst/>
@@ -4574,26 +4840,7 @@
                   </a:schemeClr>
                 </a:solidFill>
               </a:rPr>
-              <a:t>JsonSerializable</a:t>
-            </a:r>
-            <a:br>
-              <a:rPr lang="en-US" sz="1050" b="1" dirty="0">
-                <a:solidFill>
-                  <a:schemeClr val="accent6">
-                    <a:lumMod val="75000"/>
-                  </a:schemeClr>
-                </a:solidFill>
-              </a:rPr>
-            </a:br>
-            <a:r>
-              <a:rPr lang="en-US" sz="1050" b="1" dirty="0" err="1">
-                <a:solidFill>
-                  <a:schemeClr val="accent6">
-                    <a:lumMod val="75000"/>
-                  </a:schemeClr>
-                </a:solidFill>
-              </a:rPr>
-              <a:t>AddressBook</a:t>
+              <a:t>CsvUserStorage</a:t>
             </a:r>
             <a:endParaRPr lang="en-SG" sz="1050" b="1" dirty="0">
               <a:solidFill>
@@ -4605,201 +4852,6 @@
           </a:p>
         </p:txBody>
       </p:sp>
-      <p:cxnSp>
-        <p:nvCxnSpPr>
-          <p:cNvPr id="70" name="Elbow Connector 122"/>
-          <p:cNvCxnSpPr>
-            <a:cxnSpLocks/>
-            <a:stCxn id="74" idx="0"/>
-            <a:endCxn id="73" idx="2"/>
-          </p:cNvCxnSpPr>
-          <p:nvPr/>
-        </p:nvCxnSpPr>
-        <p:spPr>
-          <a:xfrm rot="16200000" flipV="1">
-            <a:off x="8077993" y="2992019"/>
-            <a:ext cx="335208" cy="1"/>
-          </a:xfrm>
-          <a:prstGeom prst="bentConnector3">
-            <a:avLst>
-              <a:gd name="adj1" fmla="val 50000"/>
-            </a:avLst>
-          </a:prstGeom>
-          <a:ln w="19050">
-            <a:prstDash val="sysDot"/>
-            <a:headEnd type="none" w="med" len="med"/>
-            <a:tailEnd type="arrow" w="med" len="med"/>
-          </a:ln>
-          <a:effectLst/>
-        </p:spPr>
-        <p:style>
-          <a:lnRef idx="1">
-            <a:schemeClr val="accent6"/>
-          </a:lnRef>
-          <a:fillRef idx="2">
-            <a:schemeClr val="accent6"/>
-          </a:fillRef>
-          <a:effectRef idx="1">
-            <a:schemeClr val="accent6"/>
-          </a:effectRef>
-          <a:fontRef idx="minor">
-            <a:schemeClr val="dk1"/>
-          </a:fontRef>
-        </p:style>
-      </p:cxnSp>
-      <p:sp>
-        <p:nvSpPr>
-          <p:cNvPr id="73" name="Rectangle 8"/>
-          <p:cNvSpPr/>
-          <p:nvPr/>
-        </p:nvSpPr>
-        <p:spPr>
-          <a:xfrm>
-            <a:off x="7615736" y="2477656"/>
-            <a:ext cx="1259719" cy="346760"/>
-          </a:xfrm>
-          <a:prstGeom prst="rect">
-            <a:avLst/>
-          </a:prstGeom>
-          <a:ln w="19050"/>
-          <a:effectLst/>
-        </p:spPr>
-        <p:style>
-          <a:lnRef idx="1">
-            <a:schemeClr val="accent6"/>
-          </a:lnRef>
-          <a:fillRef idx="2">
-            <a:schemeClr val="accent6"/>
-          </a:fillRef>
-          <a:effectRef idx="1">
-            <a:schemeClr val="accent6"/>
-          </a:effectRef>
-          <a:fontRef idx="minor">
-            <a:schemeClr val="dk1"/>
-          </a:fontRef>
-        </p:style>
-        <p:txBody>
-          <a:bodyPr rtlCol="0" anchor="ctr"/>
-          <a:lstStyle/>
-          <a:p>
-            <a:pPr algn="ctr"/>
-            <a:r>
-              <a:rPr lang="en-US" sz="1050" b="1" dirty="0" err="1">
-                <a:solidFill>
-                  <a:schemeClr val="accent6">
-                    <a:lumMod val="75000"/>
-                  </a:schemeClr>
-                </a:solidFill>
-              </a:rPr>
-              <a:t>JsonAdaptedTag</a:t>
-            </a:r>
-            <a:endParaRPr lang="en-SG" sz="1050" b="1" dirty="0">
-              <a:solidFill>
-                <a:schemeClr val="accent6">
-                  <a:lumMod val="75000"/>
-                </a:schemeClr>
-              </a:solidFill>
-            </a:endParaRPr>
-          </a:p>
-        </p:txBody>
-      </p:sp>
-      <p:sp>
-        <p:nvSpPr>
-          <p:cNvPr id="74" name="Rectangle 8"/>
-          <p:cNvSpPr/>
-          <p:nvPr/>
-        </p:nvSpPr>
-        <p:spPr>
-          <a:xfrm>
-            <a:off x="7615738" y="3159624"/>
-            <a:ext cx="1259718" cy="346760"/>
-          </a:xfrm>
-          <a:prstGeom prst="rect">
-            <a:avLst/>
-          </a:prstGeom>
-          <a:ln w="19050"/>
-          <a:effectLst/>
-        </p:spPr>
-        <p:style>
-          <a:lnRef idx="1">
-            <a:schemeClr val="accent6"/>
-          </a:lnRef>
-          <a:fillRef idx="2">
-            <a:schemeClr val="accent6"/>
-          </a:fillRef>
-          <a:effectRef idx="1">
-            <a:schemeClr val="accent6"/>
-          </a:effectRef>
-          <a:fontRef idx="minor">
-            <a:schemeClr val="dk1"/>
-          </a:fontRef>
-        </p:style>
-        <p:txBody>
-          <a:bodyPr rtlCol="0" anchor="ctr"/>
-          <a:lstStyle/>
-          <a:p>
-            <a:pPr algn="ctr"/>
-            <a:r>
-              <a:rPr lang="en-US" sz="1030" b="1" dirty="0" err="1">
-                <a:solidFill>
-                  <a:schemeClr val="accent6">
-                    <a:lumMod val="75000"/>
-                  </a:schemeClr>
-                </a:solidFill>
-              </a:rPr>
-              <a:t>JsonAdaptedPerson</a:t>
-            </a:r>
-            <a:endParaRPr lang="en-SG" sz="1030" b="1" dirty="0">
-              <a:solidFill>
-                <a:schemeClr val="accent6">
-                  <a:lumMod val="75000"/>
-                </a:schemeClr>
-              </a:solidFill>
-            </a:endParaRPr>
-          </a:p>
-        </p:txBody>
-      </p:sp>
-      <p:cxnSp>
-        <p:nvCxnSpPr>
-          <p:cNvPr id="77" name="Elbow Connector 122"/>
-          <p:cNvCxnSpPr>
-            <a:stCxn id="66" idx="3"/>
-            <a:endCxn id="74" idx="1"/>
-          </p:cNvCxnSpPr>
-          <p:nvPr/>
-        </p:nvCxnSpPr>
-        <p:spPr>
-          <a:xfrm flipV="1">
-            <a:off x="7220507" y="3333004"/>
-            <a:ext cx="395231" cy="786"/>
-          </a:xfrm>
-          <a:prstGeom prst="bentConnector3">
-            <a:avLst>
-              <a:gd name="adj1" fmla="val 50000"/>
-            </a:avLst>
-          </a:prstGeom>
-          <a:ln w="19050">
-            <a:prstDash val="sysDot"/>
-            <a:headEnd type="none" w="med" len="med"/>
-            <a:tailEnd type="arrow" w="med" len="med"/>
-          </a:ln>
-          <a:effectLst/>
-        </p:spPr>
-        <p:style>
-          <a:lnRef idx="1">
-            <a:schemeClr val="accent6"/>
-          </a:lnRef>
-          <a:fillRef idx="2">
-            <a:schemeClr val="accent6"/>
-          </a:fillRef>
-          <a:effectRef idx="1">
-            <a:schemeClr val="accent6"/>
-          </a:effectRef>
-          <a:fontRef idx="minor">
-            <a:schemeClr val="dk1"/>
-          </a:fontRef>
-        </p:style>
-      </p:cxnSp>
     </p:spTree>
     <p:extLst>
       <p:ext uri="{BB962C8B-B14F-4D97-AF65-F5344CB8AC3E}">

</xml_diff>

<commit_message>
Updated Storage Component Class Diagram
</commit_message>
<xml_diff>
--- a/docs/diagrams/StorageComponentClassDiagram.pptx
+++ b/docs/diagrams/StorageComponentClassDiagram.pptx
@@ -208,7 +208,7 @@
           <a:p>
             <a:fld id="{F5CC4B3F-88C1-4FFA-B1B6-F41C21DC6924}" type="datetimeFigureOut">
               <a:rPr lang="en-US" smtClean="0"/>
-              <a:t>12/1/2018</a:t>
+              <a:t>4/11/2019</a:t>
             </a:fld>
             <a:endParaRPr lang="en-US"/>
           </a:p>
@@ -654,7 +654,7 @@
           <a:p>
             <a:fld id="{78C97017-6FC3-485B-9764-EAC9E56C1D49}" type="datetimeFigureOut">
               <a:rPr lang="en-US" smtClean="0"/>
-              <a:t>12/1/2018</a:t>
+              <a:t>4/11/2019</a:t>
             </a:fld>
             <a:endParaRPr lang="en-US"/>
           </a:p>
@@ -822,7 +822,7 @@
           <a:p>
             <a:fld id="{78C97017-6FC3-485B-9764-EAC9E56C1D49}" type="datetimeFigureOut">
               <a:rPr lang="en-US" smtClean="0"/>
-              <a:t>12/1/2018</a:t>
+              <a:t>4/11/2019</a:t>
             </a:fld>
             <a:endParaRPr lang="en-US"/>
           </a:p>
@@ -1000,7 +1000,7 @@
           <a:p>
             <a:fld id="{78C97017-6FC3-485B-9764-EAC9E56C1D49}" type="datetimeFigureOut">
               <a:rPr lang="en-US" smtClean="0"/>
-              <a:t>12/1/2018</a:t>
+              <a:t>4/11/2019</a:t>
             </a:fld>
             <a:endParaRPr lang="en-US"/>
           </a:p>
@@ -1168,7 +1168,7 @@
           <a:p>
             <a:fld id="{78C97017-6FC3-485B-9764-EAC9E56C1D49}" type="datetimeFigureOut">
               <a:rPr lang="en-US" smtClean="0"/>
-              <a:t>12/1/2018</a:t>
+              <a:t>4/11/2019</a:t>
             </a:fld>
             <a:endParaRPr lang="en-US"/>
           </a:p>
@@ -1413,7 +1413,7 @@
           <a:p>
             <a:fld id="{78C97017-6FC3-485B-9764-EAC9E56C1D49}" type="datetimeFigureOut">
               <a:rPr lang="en-US" smtClean="0"/>
-              <a:t>12/1/2018</a:t>
+              <a:t>4/11/2019</a:t>
             </a:fld>
             <a:endParaRPr lang="en-US"/>
           </a:p>
@@ -1698,7 +1698,7 @@
           <a:p>
             <a:fld id="{78C97017-6FC3-485B-9764-EAC9E56C1D49}" type="datetimeFigureOut">
               <a:rPr lang="en-US" smtClean="0"/>
-              <a:t>12/1/2018</a:t>
+              <a:t>4/11/2019</a:t>
             </a:fld>
             <a:endParaRPr lang="en-US"/>
           </a:p>
@@ -2117,7 +2117,7 @@
           <a:p>
             <a:fld id="{78C97017-6FC3-485B-9764-EAC9E56C1D49}" type="datetimeFigureOut">
               <a:rPr lang="en-US" smtClean="0"/>
-              <a:t>12/1/2018</a:t>
+              <a:t>4/11/2019</a:t>
             </a:fld>
             <a:endParaRPr lang="en-US"/>
           </a:p>
@@ -2234,7 +2234,7 @@
           <a:p>
             <a:fld id="{78C97017-6FC3-485B-9764-EAC9E56C1D49}" type="datetimeFigureOut">
               <a:rPr lang="en-US" smtClean="0"/>
-              <a:t>12/1/2018</a:t>
+              <a:t>4/11/2019</a:t>
             </a:fld>
             <a:endParaRPr lang="en-US"/>
           </a:p>
@@ -2329,7 +2329,7 @@
           <a:p>
             <a:fld id="{78C97017-6FC3-485B-9764-EAC9E56C1D49}" type="datetimeFigureOut">
               <a:rPr lang="en-US" smtClean="0"/>
-              <a:t>12/1/2018</a:t>
+              <a:t>4/11/2019</a:t>
             </a:fld>
             <a:endParaRPr lang="en-US"/>
           </a:p>
@@ -2604,7 +2604,7 @@
           <a:p>
             <a:fld id="{78C97017-6FC3-485B-9764-EAC9E56C1D49}" type="datetimeFigureOut">
               <a:rPr lang="en-US" smtClean="0"/>
-              <a:t>12/1/2018</a:t>
+              <a:t>4/11/2019</a:t>
             </a:fld>
             <a:endParaRPr lang="en-US"/>
           </a:p>
@@ -2856,7 +2856,7 @@
           <a:p>
             <a:fld id="{78C97017-6FC3-485B-9764-EAC9E56C1D49}" type="datetimeFigureOut">
               <a:rPr lang="en-US" smtClean="0"/>
-              <a:t>12/1/2018</a:t>
+              <a:t>4/11/2019</a:t>
             </a:fld>
             <a:endParaRPr lang="en-US"/>
           </a:p>
@@ -3067,7 +3067,7 @@
           <a:p>
             <a:fld id="{78C97017-6FC3-485B-9764-EAC9E56C1D49}" type="datetimeFigureOut">
               <a:rPr lang="en-US" smtClean="0"/>
-              <a:t>12/1/2018</a:t>
+              <a:t>4/11/2019</a:t>
             </a:fld>
             <a:endParaRPr lang="en-US"/>
           </a:p>
@@ -3575,7 +3575,7 @@
                   <a:schemeClr val="bg1"/>
                 </a:solidFill>
               </a:rPr>
-              <a:t>AddressBookStorage</a:t>
+              <a:t>StatisticsStorage</a:t>
             </a:r>
             <a:endParaRPr lang="en-SG" sz="1050" dirty="0">
               <a:solidFill>
@@ -4148,7 +4148,7 @@
                   </a:schemeClr>
                 </a:solidFill>
               </a:rPr>
-              <a:t>JsonAddressBook</a:t>
+              <a:t>JsonStatistics</a:t>
             </a:r>
             <a:br>
               <a:rPr lang="en-US" sz="1050" b="1" dirty="0">
@@ -4586,14 +4586,14 @@
               </a:rPr>
             </a:br>
             <a:r>
-              <a:rPr lang="en-US" sz="1050" b="1" dirty="0" err="1">
+              <a:rPr lang="en-US" sz="1050" b="1" dirty="0">
                 <a:solidFill>
                   <a:schemeClr val="accent6">
                     <a:lumMod val="75000"/>
                   </a:schemeClr>
                 </a:solidFill>
               </a:rPr>
-              <a:t>AddressBook</a:t>
+              <a:t>Statistics</a:t>
             </a:r>
             <a:endParaRPr lang="en-SG" sz="1050" b="1" dirty="0">
               <a:solidFill>
@@ -4605,201 +4605,6 @@
           </a:p>
         </p:txBody>
       </p:sp>
-      <p:cxnSp>
-        <p:nvCxnSpPr>
-          <p:cNvPr id="70" name="Elbow Connector 122"/>
-          <p:cNvCxnSpPr>
-            <a:cxnSpLocks/>
-            <a:stCxn id="74" idx="0"/>
-            <a:endCxn id="73" idx="2"/>
-          </p:cNvCxnSpPr>
-          <p:nvPr/>
-        </p:nvCxnSpPr>
-        <p:spPr>
-          <a:xfrm rot="16200000" flipV="1">
-            <a:off x="8077993" y="2992019"/>
-            <a:ext cx="335208" cy="1"/>
-          </a:xfrm>
-          <a:prstGeom prst="bentConnector3">
-            <a:avLst>
-              <a:gd name="adj1" fmla="val 50000"/>
-            </a:avLst>
-          </a:prstGeom>
-          <a:ln w="19050">
-            <a:prstDash val="sysDot"/>
-            <a:headEnd type="none" w="med" len="med"/>
-            <a:tailEnd type="arrow" w="med" len="med"/>
-          </a:ln>
-          <a:effectLst/>
-        </p:spPr>
-        <p:style>
-          <a:lnRef idx="1">
-            <a:schemeClr val="accent6"/>
-          </a:lnRef>
-          <a:fillRef idx="2">
-            <a:schemeClr val="accent6"/>
-          </a:fillRef>
-          <a:effectRef idx="1">
-            <a:schemeClr val="accent6"/>
-          </a:effectRef>
-          <a:fontRef idx="minor">
-            <a:schemeClr val="dk1"/>
-          </a:fontRef>
-        </p:style>
-      </p:cxnSp>
-      <p:sp>
-        <p:nvSpPr>
-          <p:cNvPr id="73" name="Rectangle 8"/>
-          <p:cNvSpPr/>
-          <p:nvPr/>
-        </p:nvSpPr>
-        <p:spPr>
-          <a:xfrm>
-            <a:off x="7615736" y="2477656"/>
-            <a:ext cx="1259719" cy="346760"/>
-          </a:xfrm>
-          <a:prstGeom prst="rect">
-            <a:avLst/>
-          </a:prstGeom>
-          <a:ln w="19050"/>
-          <a:effectLst/>
-        </p:spPr>
-        <p:style>
-          <a:lnRef idx="1">
-            <a:schemeClr val="accent6"/>
-          </a:lnRef>
-          <a:fillRef idx="2">
-            <a:schemeClr val="accent6"/>
-          </a:fillRef>
-          <a:effectRef idx="1">
-            <a:schemeClr val="accent6"/>
-          </a:effectRef>
-          <a:fontRef idx="minor">
-            <a:schemeClr val="dk1"/>
-          </a:fontRef>
-        </p:style>
-        <p:txBody>
-          <a:bodyPr rtlCol="0" anchor="ctr"/>
-          <a:lstStyle/>
-          <a:p>
-            <a:pPr algn="ctr"/>
-            <a:r>
-              <a:rPr lang="en-US" sz="1050" b="1" dirty="0" err="1">
-                <a:solidFill>
-                  <a:schemeClr val="accent6">
-                    <a:lumMod val="75000"/>
-                  </a:schemeClr>
-                </a:solidFill>
-              </a:rPr>
-              <a:t>JsonAdaptedTag</a:t>
-            </a:r>
-            <a:endParaRPr lang="en-SG" sz="1050" b="1" dirty="0">
-              <a:solidFill>
-                <a:schemeClr val="accent6">
-                  <a:lumMod val="75000"/>
-                </a:schemeClr>
-              </a:solidFill>
-            </a:endParaRPr>
-          </a:p>
-        </p:txBody>
-      </p:sp>
-      <p:sp>
-        <p:nvSpPr>
-          <p:cNvPr id="74" name="Rectangle 8"/>
-          <p:cNvSpPr/>
-          <p:nvPr/>
-        </p:nvSpPr>
-        <p:spPr>
-          <a:xfrm>
-            <a:off x="7615738" y="3159624"/>
-            <a:ext cx="1259718" cy="346760"/>
-          </a:xfrm>
-          <a:prstGeom prst="rect">
-            <a:avLst/>
-          </a:prstGeom>
-          <a:ln w="19050"/>
-          <a:effectLst/>
-        </p:spPr>
-        <p:style>
-          <a:lnRef idx="1">
-            <a:schemeClr val="accent6"/>
-          </a:lnRef>
-          <a:fillRef idx="2">
-            <a:schemeClr val="accent6"/>
-          </a:fillRef>
-          <a:effectRef idx="1">
-            <a:schemeClr val="accent6"/>
-          </a:effectRef>
-          <a:fontRef idx="minor">
-            <a:schemeClr val="dk1"/>
-          </a:fontRef>
-        </p:style>
-        <p:txBody>
-          <a:bodyPr rtlCol="0" anchor="ctr"/>
-          <a:lstStyle/>
-          <a:p>
-            <a:pPr algn="ctr"/>
-            <a:r>
-              <a:rPr lang="en-US" sz="1030" b="1" dirty="0" err="1">
-                <a:solidFill>
-                  <a:schemeClr val="accent6">
-                    <a:lumMod val="75000"/>
-                  </a:schemeClr>
-                </a:solidFill>
-              </a:rPr>
-              <a:t>JsonAdaptedPerson</a:t>
-            </a:r>
-            <a:endParaRPr lang="en-SG" sz="1030" b="1" dirty="0">
-              <a:solidFill>
-                <a:schemeClr val="accent6">
-                  <a:lumMod val="75000"/>
-                </a:schemeClr>
-              </a:solidFill>
-            </a:endParaRPr>
-          </a:p>
-        </p:txBody>
-      </p:sp>
-      <p:cxnSp>
-        <p:nvCxnSpPr>
-          <p:cNvPr id="77" name="Elbow Connector 122"/>
-          <p:cNvCxnSpPr>
-            <a:stCxn id="66" idx="3"/>
-            <a:endCxn id="74" idx="1"/>
-          </p:cNvCxnSpPr>
-          <p:nvPr/>
-        </p:nvCxnSpPr>
-        <p:spPr>
-          <a:xfrm flipV="1">
-            <a:off x="7220507" y="3333004"/>
-            <a:ext cx="395231" cy="786"/>
-          </a:xfrm>
-          <a:prstGeom prst="bentConnector3">
-            <a:avLst>
-              <a:gd name="adj1" fmla="val 50000"/>
-            </a:avLst>
-          </a:prstGeom>
-          <a:ln w="19050">
-            <a:prstDash val="sysDot"/>
-            <a:headEnd type="none" w="med" len="med"/>
-            <a:tailEnd type="arrow" w="med" len="med"/>
-          </a:ln>
-          <a:effectLst/>
-        </p:spPr>
-        <p:style>
-          <a:lnRef idx="1">
-            <a:schemeClr val="accent6"/>
-          </a:lnRef>
-          <a:fillRef idx="2">
-            <a:schemeClr val="accent6"/>
-          </a:fillRef>
-          <a:effectRef idx="1">
-            <a:schemeClr val="accent6"/>
-          </a:effectRef>
-          <a:fontRef idx="minor">
-            <a:schemeClr val="dk1"/>
-          </a:fontRef>
-        </p:style>
-      </p:cxnSp>
     </p:spTree>
     <p:extLst>
       <p:ext uri="{BB962C8B-B14F-4D97-AF65-F5344CB8AC3E}">

</xml_diff>

<commit_message>
Update StorageComponentClassDiagram to reflect changes in Statistics feature Fix parameter restrictions in UG
</commit_message>
<xml_diff>
--- a/docs/diagrams/StorageComponentClassDiagram.pptx
+++ b/docs/diagrams/StorageComponentClassDiagram.pptx
@@ -208,7 +208,7 @@
           <a:p>
             <a:fld id="{F5CC4B3F-88C1-4FFA-B1B6-F41C21DC6924}" type="datetimeFigureOut">
               <a:rPr lang="en-US" smtClean="0"/>
-              <a:t>3/4/2019</a:t>
+              <a:t>4/14/2019</a:t>
             </a:fld>
             <a:endParaRPr lang="en-US"/>
           </a:p>
@@ -654,7 +654,7 @@
           <a:p>
             <a:fld id="{78C97017-6FC3-485B-9764-EAC9E56C1D49}" type="datetimeFigureOut">
               <a:rPr lang="en-US" smtClean="0"/>
-              <a:t>3/4/2019</a:t>
+              <a:t>4/14/2019</a:t>
             </a:fld>
             <a:endParaRPr lang="en-US"/>
           </a:p>
@@ -822,7 +822,7 @@
           <a:p>
             <a:fld id="{78C97017-6FC3-485B-9764-EAC9E56C1D49}" type="datetimeFigureOut">
               <a:rPr lang="en-US" smtClean="0"/>
-              <a:t>3/4/2019</a:t>
+              <a:t>4/14/2019</a:t>
             </a:fld>
             <a:endParaRPr lang="en-US"/>
           </a:p>
@@ -1000,7 +1000,7 @@
           <a:p>
             <a:fld id="{78C97017-6FC3-485B-9764-EAC9E56C1D49}" type="datetimeFigureOut">
               <a:rPr lang="en-US" smtClean="0"/>
-              <a:t>3/4/2019</a:t>
+              <a:t>4/14/2019</a:t>
             </a:fld>
             <a:endParaRPr lang="en-US"/>
           </a:p>
@@ -1168,7 +1168,7 @@
           <a:p>
             <a:fld id="{78C97017-6FC3-485B-9764-EAC9E56C1D49}" type="datetimeFigureOut">
               <a:rPr lang="en-US" smtClean="0"/>
-              <a:t>3/4/2019</a:t>
+              <a:t>4/14/2019</a:t>
             </a:fld>
             <a:endParaRPr lang="en-US"/>
           </a:p>
@@ -1413,7 +1413,7 @@
           <a:p>
             <a:fld id="{78C97017-6FC3-485B-9764-EAC9E56C1D49}" type="datetimeFigureOut">
               <a:rPr lang="en-US" smtClean="0"/>
-              <a:t>3/4/2019</a:t>
+              <a:t>4/14/2019</a:t>
             </a:fld>
             <a:endParaRPr lang="en-US"/>
           </a:p>
@@ -1698,7 +1698,7 @@
           <a:p>
             <a:fld id="{78C97017-6FC3-485B-9764-EAC9E56C1D49}" type="datetimeFigureOut">
               <a:rPr lang="en-US" smtClean="0"/>
-              <a:t>3/4/2019</a:t>
+              <a:t>4/14/2019</a:t>
             </a:fld>
             <a:endParaRPr lang="en-US"/>
           </a:p>
@@ -2117,7 +2117,7 @@
           <a:p>
             <a:fld id="{78C97017-6FC3-485B-9764-EAC9E56C1D49}" type="datetimeFigureOut">
               <a:rPr lang="en-US" smtClean="0"/>
-              <a:t>3/4/2019</a:t>
+              <a:t>4/14/2019</a:t>
             </a:fld>
             <a:endParaRPr lang="en-US"/>
           </a:p>
@@ -2234,7 +2234,7 @@
           <a:p>
             <a:fld id="{78C97017-6FC3-485B-9764-EAC9E56C1D49}" type="datetimeFigureOut">
               <a:rPr lang="en-US" smtClean="0"/>
-              <a:t>3/4/2019</a:t>
+              <a:t>4/14/2019</a:t>
             </a:fld>
             <a:endParaRPr lang="en-US"/>
           </a:p>
@@ -2329,7 +2329,7 @@
           <a:p>
             <a:fld id="{78C97017-6FC3-485B-9764-EAC9E56C1D49}" type="datetimeFigureOut">
               <a:rPr lang="en-US" smtClean="0"/>
-              <a:t>3/4/2019</a:t>
+              <a:t>4/14/2019</a:t>
             </a:fld>
             <a:endParaRPr lang="en-US"/>
           </a:p>
@@ -2604,7 +2604,7 @@
           <a:p>
             <a:fld id="{78C97017-6FC3-485B-9764-EAC9E56C1D49}" type="datetimeFigureOut">
               <a:rPr lang="en-US" smtClean="0"/>
-              <a:t>3/4/2019</a:t>
+              <a:t>4/14/2019</a:t>
             </a:fld>
             <a:endParaRPr lang="en-US"/>
           </a:p>
@@ -2856,7 +2856,7 @@
           <a:p>
             <a:fld id="{78C97017-6FC3-485B-9764-EAC9E56C1D49}" type="datetimeFigureOut">
               <a:rPr lang="en-US" smtClean="0"/>
-              <a:t>3/4/2019</a:t>
+              <a:t>4/14/2019</a:t>
             </a:fld>
             <a:endParaRPr lang="en-US"/>
           </a:p>
@@ -3067,7 +3067,7 @@
           <a:p>
             <a:fld id="{78C97017-6FC3-485B-9764-EAC9E56C1D49}" type="datetimeFigureOut">
               <a:rPr lang="en-US" smtClean="0"/>
-              <a:t>3/4/2019</a:t>
+              <a:t>4/14/2019</a:t>
             </a:fld>
             <a:endParaRPr lang="en-US"/>
           </a:p>
@@ -5310,7 +5310,7 @@
                       </a:schemeClr>
                     </a:solidFill>
                   </a:rPr>
-                  <a:t>JsonAdaptedStatistics</a:t>
+                  <a:t>JsonAdaptedRevenue</a:t>
                 </a:r>
                 <a:endParaRPr lang="en-SG" sz="1030" b="1" dirty="0">
                   <a:solidFill>

</xml_diff>